<commit_message>
Webinar v5 Data Science in Healthcare & Pharma
</commit_message>
<xml_diff>
--- a/Webinar/UpGrad - Data Science in Healthcare and Pharma Industry/Data Science in Healthcare & Pharma Industry v4.pptx
+++ b/Webinar/UpGrad - Data Science in Healthcare and Pharma Industry/Data Science in Healthcare & Pharma Industry v4.pptx
@@ -5,18 +5,19 @@
     <p:sldMasterId id="2147483648" r:id="rId1"/>
   </p:sldMasterIdLst>
   <p:notesMasterIdLst>
-    <p:notesMasterId r:id="rId11"/>
+    <p:notesMasterId r:id="rId12"/>
   </p:notesMasterIdLst>
   <p:sldIdLst>
     <p:sldId id="274" r:id="rId2"/>
     <p:sldId id="257" r:id="rId3"/>
     <p:sldId id="258" r:id="rId4"/>
     <p:sldId id="276" r:id="rId5"/>
-    <p:sldId id="277" r:id="rId6"/>
-    <p:sldId id="278" r:id="rId7"/>
-    <p:sldId id="279" r:id="rId8"/>
-    <p:sldId id="282" r:id="rId9"/>
-    <p:sldId id="281" r:id="rId10"/>
+    <p:sldId id="283" r:id="rId6"/>
+    <p:sldId id="277" r:id="rId7"/>
+    <p:sldId id="278" r:id="rId8"/>
+    <p:sldId id="279" r:id="rId9"/>
+    <p:sldId id="282" r:id="rId10"/>
+    <p:sldId id="281" r:id="rId11"/>
   </p:sldIdLst>
   <p:sldSz cx="12192000" cy="6858000"/>
   <p:notesSz cx="6858000" cy="9144000"/>
@@ -124,6 +125,7 @@
             <p14:sldId id="257"/>
             <p14:sldId id="258"/>
             <p14:sldId id="276"/>
+            <p14:sldId id="283"/>
             <p14:sldId id="277"/>
             <p14:sldId id="278"/>
             <p14:sldId id="279"/>
@@ -547,16 +549,90 @@
           <a:bodyPr/>
           <a:lstStyle/>
           <a:p>
-            <a:r>
-              <a:rPr lang="en-US" dirty="0"/>
-              <a:t>Source: </a:t>
-            </a:r>
-            <a:r>
-              <a:rPr lang="en-US" dirty="0">
-                <a:hlinkClick r:id="rId3"/>
-              </a:rPr>
-              <a:t>Product Lifecycle_V8 (happiestminds.com)</a:t>
-            </a:r>
+            <a:endParaRPr lang="en-US" dirty="0"/>
+          </a:p>
+        </p:txBody>
+      </p:sp>
+      <p:sp>
+        <p:nvSpPr>
+          <p:cNvPr id="4" name="Slide Number Placeholder 3"/>
+          <p:cNvSpPr>
+            <a:spLocks noGrp="1"/>
+          </p:cNvSpPr>
+          <p:nvPr>
+            <p:ph type="sldNum" sz="quarter" idx="10"/>
+          </p:nvPr>
+        </p:nvSpPr>
+        <p:spPr/>
+        <p:txBody>
+          <a:bodyPr/>
+          <a:lstStyle/>
+          <a:p>
+            <a:fld id="{A1EA27A9-5E68-4D2C-8C97-692FCAAE1E1E}" type="slidenum">
+              <a:rPr lang="en-US" smtClean="0"/>
+              <a:t>1</a:t>
+            </a:fld>
+            <a:endParaRPr lang="en-US" dirty="0"/>
+          </a:p>
+        </p:txBody>
+      </p:sp>
+    </p:spTree>
+    <p:extLst>
+      <p:ext uri="{BB962C8B-B14F-4D97-AF65-F5344CB8AC3E}">
+        <p14:creationId xmlns:p14="http://schemas.microsoft.com/office/powerpoint/2010/main" val="1358704646"/>
+      </p:ext>
+    </p:extLst>
+  </p:cSld>
+  <p:clrMapOvr>
+    <a:masterClrMapping/>
+  </p:clrMapOvr>
+</p:notes>
+</file>
+
+<file path=ppt/notesSlides/notesSlide2.xml><?xml version="1.0" encoding="utf-8"?>
+<p:notes xmlns:a="http://schemas.openxmlformats.org/drawingml/2006/main" xmlns:r="http://schemas.openxmlformats.org/officeDocument/2006/relationships" xmlns:p="http://schemas.openxmlformats.org/presentationml/2006/main">
+  <p:cSld>
+    <p:spTree>
+      <p:nvGrpSpPr>
+        <p:cNvPr id="1" name=""/>
+        <p:cNvGrpSpPr/>
+        <p:nvPr/>
+      </p:nvGrpSpPr>
+      <p:grpSpPr>
+        <a:xfrm>
+          <a:off x="0" y="0"/>
+          <a:ext cx="0" cy="0"/>
+          <a:chOff x="0" y="0"/>
+          <a:chExt cx="0" cy="0"/>
+        </a:xfrm>
+      </p:grpSpPr>
+      <p:sp>
+        <p:nvSpPr>
+          <p:cNvPr id="2" name="Slide Image Placeholder 1"/>
+          <p:cNvSpPr>
+            <a:spLocks noGrp="1" noRot="1" noChangeAspect="1"/>
+          </p:cNvSpPr>
+          <p:nvPr>
+            <p:ph type="sldImg"/>
+          </p:nvPr>
+        </p:nvSpPr>
+        <p:spPr/>
+      </p:sp>
+      <p:sp>
+        <p:nvSpPr>
+          <p:cNvPr id="3" name="Notes Placeholder 2"/>
+          <p:cNvSpPr>
+            <a:spLocks noGrp="1"/>
+          </p:cNvSpPr>
+          <p:nvPr>
+            <p:ph type="body" idx="1"/>
+          </p:nvPr>
+        </p:nvSpPr>
+        <p:spPr/>
+        <p:txBody>
+          <a:bodyPr/>
+          <a:lstStyle/>
+          <a:p>
             <a:endParaRPr lang="en-US" dirty="0"/>
           </a:p>
         </p:txBody>
@@ -597,7 +673,91 @@
 </p:notes>
 </file>
 
-<file path=ppt/notesSlides/notesSlide2.xml><?xml version="1.0" encoding="utf-8"?>
+<file path=ppt/notesSlides/notesSlide3.xml><?xml version="1.0" encoding="utf-8"?>
+<p:notes xmlns:a="http://schemas.openxmlformats.org/drawingml/2006/main" xmlns:r="http://schemas.openxmlformats.org/officeDocument/2006/relationships" xmlns:p="http://schemas.openxmlformats.org/presentationml/2006/main">
+  <p:cSld>
+    <p:spTree>
+      <p:nvGrpSpPr>
+        <p:cNvPr id="1" name=""/>
+        <p:cNvGrpSpPr/>
+        <p:nvPr/>
+      </p:nvGrpSpPr>
+      <p:grpSpPr>
+        <a:xfrm>
+          <a:off x="0" y="0"/>
+          <a:ext cx="0" cy="0"/>
+          <a:chOff x="0" y="0"/>
+          <a:chExt cx="0" cy="0"/>
+        </a:xfrm>
+      </p:grpSpPr>
+      <p:sp>
+        <p:nvSpPr>
+          <p:cNvPr id="2" name="Slide Image Placeholder 1"/>
+          <p:cNvSpPr>
+            <a:spLocks noGrp="1" noRot="1" noChangeAspect="1"/>
+          </p:cNvSpPr>
+          <p:nvPr>
+            <p:ph type="sldImg"/>
+          </p:nvPr>
+        </p:nvSpPr>
+        <p:spPr/>
+      </p:sp>
+      <p:sp>
+        <p:nvSpPr>
+          <p:cNvPr id="3" name="Notes Placeholder 2"/>
+          <p:cNvSpPr>
+            <a:spLocks noGrp="1"/>
+          </p:cNvSpPr>
+          <p:nvPr>
+            <p:ph type="body" idx="1"/>
+          </p:nvPr>
+        </p:nvSpPr>
+        <p:spPr/>
+        <p:txBody>
+          <a:bodyPr/>
+          <a:lstStyle/>
+          <a:p>
+            <a:endParaRPr lang="en-US" dirty="0"/>
+          </a:p>
+        </p:txBody>
+      </p:sp>
+      <p:sp>
+        <p:nvSpPr>
+          <p:cNvPr id="4" name="Slide Number Placeholder 3"/>
+          <p:cNvSpPr>
+            <a:spLocks noGrp="1"/>
+          </p:cNvSpPr>
+          <p:nvPr>
+            <p:ph type="sldNum" sz="quarter" idx="10"/>
+          </p:nvPr>
+        </p:nvSpPr>
+        <p:spPr/>
+        <p:txBody>
+          <a:bodyPr/>
+          <a:lstStyle/>
+          <a:p>
+            <a:fld id="{A1EA27A9-5E68-4D2C-8C97-692FCAAE1E1E}" type="slidenum">
+              <a:rPr lang="en-US" smtClean="0"/>
+              <a:t>5</a:t>
+            </a:fld>
+            <a:endParaRPr lang="en-US" dirty="0"/>
+          </a:p>
+        </p:txBody>
+      </p:sp>
+    </p:spTree>
+    <p:extLst>
+      <p:ext uri="{BB962C8B-B14F-4D97-AF65-F5344CB8AC3E}">
+        <p14:creationId xmlns:p14="http://schemas.microsoft.com/office/powerpoint/2010/main" val="3974848338"/>
+      </p:ext>
+    </p:extLst>
+  </p:cSld>
+  <p:clrMapOvr>
+    <a:masterClrMapping/>
+  </p:clrMapOvr>
+</p:notes>
+</file>
+
+<file path=ppt/notesSlides/notesSlide4.xml><?xml version="1.0" encoding="utf-8"?>
 <p:notes xmlns:a="http://schemas.openxmlformats.org/drawingml/2006/main" xmlns:r="http://schemas.openxmlformats.org/officeDocument/2006/relationships" xmlns:p="http://schemas.openxmlformats.org/presentationml/2006/main">
   <p:cSld>
     <p:spTree>
@@ -668,7 +828,7 @@
           <a:p>
             <a:fld id="{A1EA27A9-5E68-4D2C-8C97-692FCAAE1E1E}" type="slidenum">
               <a:rPr lang="en-US" smtClean="0"/>
-              <a:t>5</a:t>
+              <a:t>6</a:t>
             </a:fld>
             <a:endParaRPr lang="en-US" dirty="0"/>
           </a:p>
@@ -3515,7 +3675,7 @@
           <p:nvPr/>
         </p:nvPicPr>
         <p:blipFill>
-          <a:blip r:embed="rId2">
+          <a:blip r:embed="rId3">
             <a:extLst>
               <a:ext uri="{28A0092B-C50C-407E-A947-70E740481C1C}">
                 <a14:useLocalDpi xmlns:a14="http://schemas.microsoft.com/office/drawing/2010/main" val="0"/>
@@ -3562,7 +3722,7 @@
           <p:nvPr/>
         </p:nvPicPr>
         <p:blipFill>
-          <a:blip r:embed="rId3"/>
+          <a:blip r:embed="rId4"/>
           <a:stretch>
             <a:fillRect/>
           </a:stretch>
@@ -3685,21 +3845,7 @@
           </a:bodyPr>
           <a:lstStyle/>
           <a:p>
-            <a:pPr marL="0" marR="0" lvl="0" indent="0" defTabSz="914400" rtl="0" eaLnBrk="1" fontAlgn="auto" latinLnBrk="0" hangingPunct="1">
-              <a:lnSpc>
-                <a:spcPct val="100000"/>
-              </a:lnSpc>
-              <a:spcBef>
-                <a:spcPts val="0"/>
-              </a:spcBef>
-              <a:spcAft>
-                <a:spcPts val="0"/>
-              </a:spcAft>
-              <a:buClrTx/>
-              <a:buSzTx/>
-              <a:buFontTx/>
-              <a:buNone/>
-              <a:tabLst/>
+            <a:pPr lvl="0">
               <a:defRPr/>
             </a:pPr>
             <a:r>
@@ -3716,7 +3862,7 @@
                 <a:latin typeface="Arial" panose="020B0604020202020204" pitchFamily="34" charset="0"/>
                 <a:cs typeface="Arial" panose="020B0604020202020204" pitchFamily="34" charset="0"/>
               </a:rPr>
-              <a:t>Dat</a:t>
+              <a:t>Application of Dat</a:t>
             </a:r>
             <a:r>
               <a:rPr lang="en-US" sz="2800" b="1" dirty="0">
@@ -3745,7 +3891,7 @@
                 <a:latin typeface="Arial" panose="020B0604020202020204" pitchFamily="34" charset="0"/>
                 <a:cs typeface="Arial" panose="020B0604020202020204" pitchFamily="34" charset="0"/>
               </a:rPr>
-              <a:t>Healthcare &amp; Pharma Industry</a:t>
+              <a:t>Pharma &amp; Healthcare Industry</a:t>
             </a:r>
             <a:endParaRPr kumimoji="0" lang="en-US" sz="1600" b="0" i="0" u="none" strike="noStrike" kern="1200" cap="none" spc="0" normalizeH="0" baseline="0" noProof="0" dirty="0">
               <a:ln>
@@ -4078,6 +4224,774 @@
 </p:sld>
 </file>
 
+<file path=ppt/slides/slide10.xml><?xml version="1.0" encoding="utf-8"?>
+<p:sld xmlns:a="http://schemas.openxmlformats.org/drawingml/2006/main" xmlns:r="http://schemas.openxmlformats.org/officeDocument/2006/relationships" xmlns:p="http://schemas.openxmlformats.org/presentationml/2006/main">
+  <p:cSld>
+    <p:spTree>
+      <p:nvGrpSpPr>
+        <p:cNvPr id="1" name=""/>
+        <p:cNvGrpSpPr/>
+        <p:nvPr/>
+      </p:nvGrpSpPr>
+      <p:grpSpPr>
+        <a:xfrm>
+          <a:off x="0" y="0"/>
+          <a:ext cx="0" cy="0"/>
+          <a:chOff x="0" y="0"/>
+          <a:chExt cx="0" cy="0"/>
+        </a:xfrm>
+      </p:grpSpPr>
+      <p:pic>
+        <p:nvPicPr>
+          <p:cNvPr id="4098" name="Picture 2" descr="blue white and yellow balloons">
+            <a:extLst>
+              <a:ext uri="{FF2B5EF4-FFF2-40B4-BE49-F238E27FC236}">
+                <a16:creationId xmlns:a16="http://schemas.microsoft.com/office/drawing/2014/main" id="{A3B31C90-4269-427A-B64B-7D4C804FDB83}"/>
+              </a:ext>
+            </a:extLst>
+          </p:cNvPr>
+          <p:cNvPicPr>
+            <a:picLocks noChangeAspect="1" noChangeArrowheads="1"/>
+          </p:cNvPicPr>
+          <p:nvPr/>
+        </p:nvPicPr>
+        <p:blipFill>
+          <a:blip r:embed="rId2">
+            <a:extLst>
+              <a:ext uri="{28A0092B-C50C-407E-A947-70E740481C1C}">
+                <a14:useLocalDpi xmlns:a14="http://schemas.microsoft.com/office/drawing/2010/main" val="0"/>
+              </a:ext>
+            </a:extLst>
+          </a:blip>
+          <a:srcRect/>
+          <a:stretch>
+            <a:fillRect/>
+          </a:stretch>
+        </p:blipFill>
+        <p:spPr bwMode="auto">
+          <a:xfrm>
+            <a:off x="-1" y="-3175"/>
+            <a:ext cx="10286619" cy="6861175"/>
+          </a:xfrm>
+          <a:prstGeom prst="rect">
+            <a:avLst/>
+          </a:prstGeom>
+          <a:noFill/>
+          <a:extLst>
+            <a:ext uri="{909E8E84-426E-40DD-AFC4-6F175D3DCCD1}">
+              <a14:hiddenFill xmlns:a14="http://schemas.microsoft.com/office/drawing/2010/main">
+                <a:solidFill>
+                  <a:srgbClr val="FFFFFF"/>
+                </a:solidFill>
+              </a14:hiddenFill>
+            </a:ext>
+          </a:extLst>
+        </p:spPr>
+      </p:pic>
+      <p:pic>
+        <p:nvPicPr>
+          <p:cNvPr id="2" name="Picture 1">
+            <a:extLst>
+              <a:ext uri="{FF2B5EF4-FFF2-40B4-BE49-F238E27FC236}">
+                <a16:creationId xmlns:a16="http://schemas.microsoft.com/office/drawing/2014/main" id="{7A146ED7-7A7C-4183-B744-408085A0D311}"/>
+              </a:ext>
+            </a:extLst>
+          </p:cNvPr>
+          <p:cNvPicPr>
+            <a:picLocks noChangeAspect="1"/>
+          </p:cNvPicPr>
+          <p:nvPr/>
+        </p:nvPicPr>
+        <p:blipFill>
+          <a:blip r:embed="rId3"/>
+          <a:stretch>
+            <a:fillRect/>
+          </a:stretch>
+        </p:blipFill>
+        <p:spPr>
+          <a:xfrm>
+            <a:off x="10286618" y="808390"/>
+            <a:ext cx="1625172" cy="885949"/>
+          </a:xfrm>
+          <a:prstGeom prst="rect">
+            <a:avLst/>
+          </a:prstGeom>
+        </p:spPr>
+      </p:pic>
+      <p:sp>
+        <p:nvSpPr>
+          <p:cNvPr id="7" name="Rectangle 6">
+            <a:extLst>
+              <a:ext uri="{FF2B5EF4-FFF2-40B4-BE49-F238E27FC236}">
+                <a16:creationId xmlns:a16="http://schemas.microsoft.com/office/drawing/2014/main" id="{B7382D50-F04C-4762-A55A-496A48347DF6}"/>
+              </a:ext>
+            </a:extLst>
+          </p:cNvPr>
+          <p:cNvSpPr/>
+          <p:nvPr/>
+        </p:nvSpPr>
+        <p:spPr>
+          <a:xfrm>
+            <a:off x="-1" y="-3175"/>
+            <a:ext cx="12192000" cy="6857990"/>
+          </a:xfrm>
+          <a:prstGeom prst="rect">
+            <a:avLst/>
+          </a:prstGeom>
+          <a:solidFill>
+            <a:schemeClr val="tx1">
+              <a:alpha val="68000"/>
+            </a:schemeClr>
+          </a:solidFill>
+        </p:spPr>
+        <p:style>
+          <a:lnRef idx="2">
+            <a:schemeClr val="accent1">
+              <a:shade val="50000"/>
+            </a:schemeClr>
+          </a:lnRef>
+          <a:fillRef idx="1">
+            <a:schemeClr val="accent1"/>
+          </a:fillRef>
+          <a:effectRef idx="0">
+            <a:schemeClr val="accent1"/>
+          </a:effectRef>
+          <a:fontRef idx="minor">
+            <a:schemeClr val="lt1"/>
+          </a:fontRef>
+        </p:style>
+        <p:txBody>
+          <a:bodyPr rtlCol="0" anchor="ctr"/>
+          <a:lstStyle/>
+          <a:p>
+            <a:pPr marL="0" marR="0" lvl="0" indent="0" algn="ctr" defTabSz="914400" rtl="0" eaLnBrk="1" fontAlgn="auto" latinLnBrk="0" hangingPunct="1">
+              <a:lnSpc>
+                <a:spcPct val="100000"/>
+              </a:lnSpc>
+              <a:spcBef>
+                <a:spcPts val="0"/>
+              </a:spcBef>
+              <a:spcAft>
+                <a:spcPts val="0"/>
+              </a:spcAft>
+              <a:buClrTx/>
+              <a:buSzTx/>
+              <a:buFontTx/>
+              <a:buNone/>
+              <a:tabLst/>
+              <a:defRPr/>
+            </a:pPr>
+            <a:endParaRPr kumimoji="0" lang="en-US" sz="1800" b="0" i="0" u="none" strike="noStrike" kern="1200" cap="none" spc="0" normalizeH="0" baseline="0" noProof="0" dirty="0">
+              <a:ln>
+                <a:noFill/>
+              </a:ln>
+              <a:solidFill>
+                <a:prstClr val="white"/>
+              </a:solidFill>
+              <a:effectLst/>
+              <a:uLnTx/>
+              <a:uFillTx/>
+              <a:latin typeface="Arial" panose="020B0604020202020204" pitchFamily="34" charset="0"/>
+              <a:cs typeface="Arial" panose="020B0604020202020204" pitchFamily="34" charset="0"/>
+            </a:endParaRPr>
+          </a:p>
+        </p:txBody>
+      </p:sp>
+      <p:sp>
+        <p:nvSpPr>
+          <p:cNvPr id="12" name="TextBox 11">
+            <a:extLst>
+              <a:ext uri="{FF2B5EF4-FFF2-40B4-BE49-F238E27FC236}">
+                <a16:creationId xmlns:a16="http://schemas.microsoft.com/office/drawing/2014/main" id="{1FF38FB6-D98F-4EDC-87DF-742731A3086C}"/>
+              </a:ext>
+            </a:extLst>
+          </p:cNvPr>
+          <p:cNvSpPr txBox="1"/>
+          <p:nvPr/>
+        </p:nvSpPr>
+        <p:spPr>
+          <a:xfrm>
+            <a:off x="173114" y="397598"/>
+            <a:ext cx="7214657" cy="954107"/>
+          </a:xfrm>
+          <a:prstGeom prst="rect">
+            <a:avLst/>
+          </a:prstGeom>
+          <a:noFill/>
+        </p:spPr>
+        <p:txBody>
+          <a:bodyPr wrap="square" rtlCol="0">
+            <a:spAutoFit/>
+          </a:bodyPr>
+          <a:lstStyle/>
+          <a:p>
+            <a:pPr marL="0" marR="0" lvl="0" indent="0" defTabSz="914400" rtl="0" eaLnBrk="1" fontAlgn="auto" latinLnBrk="0" hangingPunct="1">
+              <a:lnSpc>
+                <a:spcPct val="100000"/>
+              </a:lnSpc>
+              <a:spcBef>
+                <a:spcPts val="0"/>
+              </a:spcBef>
+              <a:spcAft>
+                <a:spcPts val="0"/>
+              </a:spcAft>
+              <a:buClrTx/>
+              <a:buSzTx/>
+              <a:buFontTx/>
+              <a:buNone/>
+              <a:tabLst/>
+              <a:defRPr/>
+            </a:pPr>
+            <a:r>
+              <a:rPr kumimoji="0" lang="en-US" sz="2800" i="0" u="none" strike="noStrike" kern="1200" cap="none" spc="0" normalizeH="0" baseline="0" noProof="0" dirty="0">
+                <a:ln>
+                  <a:noFill/>
+                </a:ln>
+                <a:solidFill>
+                  <a:prstClr val="white"/>
+                </a:solidFill>
+                <a:effectLst/>
+                <a:uLnTx/>
+                <a:uFillTx/>
+                <a:latin typeface="Arial" panose="020B0604020202020204" pitchFamily="34" charset="0"/>
+                <a:cs typeface="Arial" panose="020B0604020202020204" pitchFamily="34" charset="0"/>
+              </a:rPr>
+              <a:t>Application of Data Science in </a:t>
+            </a:r>
+          </a:p>
+          <a:p>
+            <a:pPr lvl="0">
+              <a:defRPr/>
+            </a:pPr>
+            <a:r>
+              <a:rPr lang="en-US" sz="2800" dirty="0">
+                <a:solidFill>
+                  <a:prstClr val="white"/>
+                </a:solidFill>
+                <a:latin typeface="Arial" panose="020B0604020202020204" pitchFamily="34" charset="0"/>
+                <a:cs typeface="Arial" panose="020B0604020202020204" pitchFamily="34" charset="0"/>
+              </a:rPr>
+              <a:t>Pharma &amp; Healthcare</a:t>
+            </a:r>
+            <a:endParaRPr kumimoji="0" lang="en-US" sz="1600" i="0" u="none" strike="noStrike" kern="1200" cap="none" spc="0" normalizeH="0" baseline="0" noProof="0" dirty="0">
+              <a:ln>
+                <a:noFill/>
+              </a:ln>
+              <a:solidFill>
+                <a:prstClr val="white"/>
+              </a:solidFill>
+              <a:effectLst/>
+              <a:uLnTx/>
+              <a:uFillTx/>
+              <a:latin typeface="Arial" panose="020B0604020202020204" pitchFamily="34" charset="0"/>
+              <a:cs typeface="Arial" panose="020B0604020202020204" pitchFamily="34" charset="0"/>
+            </a:endParaRPr>
+          </a:p>
+        </p:txBody>
+      </p:sp>
+      <p:cxnSp>
+        <p:nvCxnSpPr>
+          <p:cNvPr id="13" name="Straight Connector 12">
+            <a:extLst>
+              <a:ext uri="{FF2B5EF4-FFF2-40B4-BE49-F238E27FC236}">
+                <a16:creationId xmlns:a16="http://schemas.microsoft.com/office/drawing/2014/main" id="{719DE22A-973E-49BC-BA5E-E323C8BE7983}"/>
+              </a:ext>
+            </a:extLst>
+          </p:cNvPr>
+          <p:cNvCxnSpPr>
+            <a:cxnSpLocks/>
+          </p:cNvCxnSpPr>
+          <p:nvPr/>
+        </p:nvCxnSpPr>
+        <p:spPr>
+          <a:xfrm flipH="1">
+            <a:off x="280210" y="1459426"/>
+            <a:ext cx="3812819" cy="0"/>
+          </a:xfrm>
+          <a:prstGeom prst="line">
+            <a:avLst/>
+          </a:prstGeom>
+          <a:ln>
+            <a:solidFill>
+              <a:schemeClr val="bg1"/>
+            </a:solidFill>
+          </a:ln>
+        </p:spPr>
+        <p:style>
+          <a:lnRef idx="1">
+            <a:schemeClr val="accent1"/>
+          </a:lnRef>
+          <a:fillRef idx="0">
+            <a:schemeClr val="accent1"/>
+          </a:fillRef>
+          <a:effectRef idx="0">
+            <a:schemeClr val="accent1"/>
+          </a:effectRef>
+          <a:fontRef idx="minor">
+            <a:schemeClr val="tx1"/>
+          </a:fontRef>
+        </p:style>
+      </p:cxnSp>
+      <p:sp>
+        <p:nvSpPr>
+          <p:cNvPr id="8" name="TextBox 7">
+            <a:extLst>
+              <a:ext uri="{FF2B5EF4-FFF2-40B4-BE49-F238E27FC236}">
+                <a16:creationId xmlns:a16="http://schemas.microsoft.com/office/drawing/2014/main" id="{5297BC12-3D7A-47D0-A42D-DB005B3C4B1A}"/>
+              </a:ext>
+            </a:extLst>
+          </p:cNvPr>
+          <p:cNvSpPr txBox="1"/>
+          <p:nvPr/>
+        </p:nvSpPr>
+        <p:spPr>
+          <a:xfrm>
+            <a:off x="173115" y="1459426"/>
+            <a:ext cx="2853128" cy="369332"/>
+          </a:xfrm>
+          <a:prstGeom prst="rect">
+            <a:avLst/>
+          </a:prstGeom>
+          <a:noFill/>
+        </p:spPr>
+        <p:txBody>
+          <a:bodyPr wrap="square" rtlCol="0">
+            <a:spAutoFit/>
+          </a:bodyPr>
+          <a:lstStyle/>
+          <a:p>
+            <a:pPr lvl="0">
+              <a:defRPr/>
+            </a:pPr>
+            <a:r>
+              <a:rPr kumimoji="0" lang="en-US" u="none" strike="noStrike" kern="1200" cap="none" spc="0" normalizeH="0" baseline="0" noProof="0" dirty="0">
+                <a:ln>
+                  <a:noFill/>
+                </a:ln>
+                <a:solidFill>
+                  <a:schemeClr val="bg1">
+                    <a:lumMod val="95000"/>
+                  </a:schemeClr>
+                </a:solidFill>
+                <a:effectLst/>
+                <a:uLnTx/>
+                <a:uFillTx/>
+                <a:latin typeface="Arial" panose="020B0604020202020204" pitchFamily="34" charset="0"/>
+                <a:cs typeface="Arial" panose="020B0604020202020204" pitchFamily="34" charset="0"/>
+              </a:rPr>
+              <a:t>Anish Mahapatra</a:t>
+            </a:r>
+            <a:endParaRPr kumimoji="0" lang="en-US" sz="1100" u="none" strike="noStrike" kern="1200" cap="none" spc="0" normalizeH="0" baseline="0" noProof="0" dirty="0">
+              <a:ln>
+                <a:noFill/>
+              </a:ln>
+              <a:solidFill>
+                <a:schemeClr val="bg1">
+                  <a:lumMod val="65000"/>
+                </a:schemeClr>
+              </a:solidFill>
+              <a:effectLst/>
+              <a:uLnTx/>
+              <a:uFillTx/>
+              <a:latin typeface="Arial" panose="020B0604020202020204" pitchFamily="34" charset="0"/>
+              <a:cs typeface="Arial" panose="020B0604020202020204" pitchFamily="34" charset="0"/>
+            </a:endParaRPr>
+          </a:p>
+        </p:txBody>
+      </p:sp>
+      <p:sp>
+        <p:nvSpPr>
+          <p:cNvPr id="9" name="TextBox 8">
+            <a:extLst>
+              <a:ext uri="{FF2B5EF4-FFF2-40B4-BE49-F238E27FC236}">
+                <a16:creationId xmlns:a16="http://schemas.microsoft.com/office/drawing/2014/main" id="{68778FF0-D8DC-4E79-A031-36756AC12555}"/>
+              </a:ext>
+            </a:extLst>
+          </p:cNvPr>
+          <p:cNvSpPr txBox="1"/>
+          <p:nvPr/>
+        </p:nvSpPr>
+        <p:spPr>
+          <a:xfrm>
+            <a:off x="69006" y="5580559"/>
+            <a:ext cx="3451440" cy="769441"/>
+          </a:xfrm>
+          <a:prstGeom prst="rect">
+            <a:avLst/>
+          </a:prstGeom>
+          <a:noFill/>
+        </p:spPr>
+        <p:txBody>
+          <a:bodyPr wrap="square" rtlCol="0">
+            <a:spAutoFit/>
+          </a:bodyPr>
+          <a:lstStyle/>
+          <a:p>
+            <a:pPr marL="0" marR="0" lvl="0" indent="0" defTabSz="914400" rtl="0" eaLnBrk="1" fontAlgn="auto" latinLnBrk="0" hangingPunct="1">
+              <a:lnSpc>
+                <a:spcPct val="100000"/>
+              </a:lnSpc>
+              <a:spcBef>
+                <a:spcPts val="0"/>
+              </a:spcBef>
+              <a:spcAft>
+                <a:spcPts val="0"/>
+              </a:spcAft>
+              <a:buClrTx/>
+              <a:buSzTx/>
+              <a:buFontTx/>
+              <a:buNone/>
+              <a:tabLst/>
+              <a:defRPr/>
+            </a:pPr>
+            <a:r>
+              <a:rPr kumimoji="0" lang="en-US" sz="4400" b="1" i="0" u="none" strike="noStrike" kern="1200" cap="none" spc="0" normalizeH="0" baseline="0" noProof="0" dirty="0">
+                <a:ln>
+                  <a:noFill/>
+                </a:ln>
+                <a:solidFill>
+                  <a:schemeClr val="bg1">
+                    <a:lumMod val="75000"/>
+                  </a:schemeClr>
+                </a:solidFill>
+                <a:effectLst/>
+                <a:uLnTx/>
+                <a:uFillTx/>
+                <a:latin typeface="Arial" panose="020B0604020202020204" pitchFamily="34" charset="0"/>
+                <a:cs typeface="Arial" panose="020B0604020202020204" pitchFamily="34" charset="0"/>
+              </a:rPr>
+              <a:t>Thank you. </a:t>
+            </a:r>
+            <a:endParaRPr kumimoji="0" lang="en-US" sz="2800" b="0" i="0" u="none" strike="noStrike" kern="1200" cap="none" spc="0" normalizeH="0" baseline="0" noProof="0" dirty="0">
+              <a:ln>
+                <a:noFill/>
+              </a:ln>
+              <a:solidFill>
+                <a:schemeClr val="bg1">
+                  <a:lumMod val="75000"/>
+                </a:schemeClr>
+              </a:solidFill>
+              <a:effectLst/>
+              <a:uLnTx/>
+              <a:uFillTx/>
+              <a:latin typeface="Arial" panose="020B0604020202020204" pitchFamily="34" charset="0"/>
+              <a:cs typeface="Arial" panose="020B0604020202020204" pitchFamily="34" charset="0"/>
+            </a:endParaRPr>
+          </a:p>
+        </p:txBody>
+      </p:sp>
+      <p:sp>
+        <p:nvSpPr>
+          <p:cNvPr id="3" name="Rectangle 2">
+            <a:extLst>
+              <a:ext uri="{FF2B5EF4-FFF2-40B4-BE49-F238E27FC236}">
+                <a16:creationId xmlns:a16="http://schemas.microsoft.com/office/drawing/2014/main" id="{A31BFD49-2A3D-4FBC-BC91-6CEAE644A49A}"/>
+              </a:ext>
+            </a:extLst>
+          </p:cNvPr>
+          <p:cNvSpPr/>
+          <p:nvPr/>
+        </p:nvSpPr>
+        <p:spPr>
+          <a:xfrm>
+            <a:off x="138376" y="508000"/>
+            <a:ext cx="45719" cy="790575"/>
+          </a:xfrm>
+          <a:prstGeom prst="rect">
+            <a:avLst/>
+          </a:prstGeom>
+          <a:solidFill>
+            <a:srgbClr val="C00000"/>
+          </a:solidFill>
+          <a:ln w="9525">
+            <a:solidFill>
+              <a:srgbClr val="C00000"/>
+            </a:solidFill>
+          </a:ln>
+        </p:spPr>
+        <p:style>
+          <a:lnRef idx="2">
+            <a:schemeClr val="accent1">
+              <a:shade val="50000"/>
+            </a:schemeClr>
+          </a:lnRef>
+          <a:fillRef idx="1">
+            <a:schemeClr val="accent1"/>
+          </a:fillRef>
+          <a:effectRef idx="0">
+            <a:schemeClr val="accent1"/>
+          </a:effectRef>
+          <a:fontRef idx="minor">
+            <a:schemeClr val="lt1"/>
+          </a:fontRef>
+        </p:style>
+        <p:txBody>
+          <a:bodyPr rtlCol="0" anchor="ctr"/>
+          <a:lstStyle/>
+          <a:p>
+            <a:pPr algn="ctr"/>
+            <a:endParaRPr lang="en-US" dirty="0">
+              <a:latin typeface="Arial" panose="020B0604020202020204" pitchFamily="34" charset="0"/>
+              <a:cs typeface="Arial" panose="020B0604020202020204" pitchFamily="34" charset="0"/>
+            </a:endParaRPr>
+          </a:p>
+        </p:txBody>
+      </p:sp>
+      <p:sp>
+        <p:nvSpPr>
+          <p:cNvPr id="10" name="Rectangle 9">
+            <a:extLst>
+              <a:ext uri="{FF2B5EF4-FFF2-40B4-BE49-F238E27FC236}">
+                <a16:creationId xmlns:a16="http://schemas.microsoft.com/office/drawing/2014/main" id="{C13547AB-58A3-4634-A3F9-4E05FDC81666}"/>
+              </a:ext>
+            </a:extLst>
+          </p:cNvPr>
+          <p:cNvSpPr/>
+          <p:nvPr/>
+        </p:nvSpPr>
+        <p:spPr>
+          <a:xfrm>
+            <a:off x="127395" y="1511665"/>
+            <a:ext cx="45719" cy="317093"/>
+          </a:xfrm>
+          <a:prstGeom prst="rect">
+            <a:avLst/>
+          </a:prstGeom>
+          <a:solidFill>
+            <a:srgbClr val="00B050"/>
+          </a:solidFill>
+          <a:ln w="9525">
+            <a:solidFill>
+              <a:srgbClr val="00B050"/>
+            </a:solidFill>
+          </a:ln>
+        </p:spPr>
+        <p:style>
+          <a:lnRef idx="2">
+            <a:schemeClr val="accent1">
+              <a:shade val="50000"/>
+            </a:schemeClr>
+          </a:lnRef>
+          <a:fillRef idx="1">
+            <a:schemeClr val="accent1"/>
+          </a:fillRef>
+          <a:effectRef idx="0">
+            <a:schemeClr val="accent1"/>
+          </a:effectRef>
+          <a:fontRef idx="minor">
+            <a:schemeClr val="lt1"/>
+          </a:fontRef>
+        </p:style>
+        <p:txBody>
+          <a:bodyPr rtlCol="0" anchor="ctr"/>
+          <a:lstStyle/>
+          <a:p>
+            <a:pPr algn="ctr"/>
+            <a:endParaRPr lang="en-US" dirty="0">
+              <a:latin typeface="Arial" panose="020B0604020202020204" pitchFamily="34" charset="0"/>
+              <a:cs typeface="Arial" panose="020B0604020202020204" pitchFamily="34" charset="0"/>
+            </a:endParaRPr>
+          </a:p>
+        </p:txBody>
+      </p:sp>
+      <p:sp>
+        <p:nvSpPr>
+          <p:cNvPr id="11" name="TextBox 10">
+            <a:extLst>
+              <a:ext uri="{FF2B5EF4-FFF2-40B4-BE49-F238E27FC236}">
+                <a16:creationId xmlns:a16="http://schemas.microsoft.com/office/drawing/2014/main" id="{044A6A2C-A893-466D-A464-9B614B8C4D83}"/>
+              </a:ext>
+            </a:extLst>
+          </p:cNvPr>
+          <p:cNvSpPr txBox="1"/>
+          <p:nvPr/>
+        </p:nvSpPr>
+        <p:spPr>
+          <a:xfrm>
+            <a:off x="5670233" y="5202783"/>
+            <a:ext cx="4616386" cy="1443152"/>
+          </a:xfrm>
+          <a:prstGeom prst="rect">
+            <a:avLst/>
+          </a:prstGeom>
+          <a:noFill/>
+        </p:spPr>
+        <p:txBody>
+          <a:bodyPr wrap="square" rtlCol="0">
+            <a:spAutoFit/>
+          </a:bodyPr>
+          <a:lstStyle/>
+          <a:p>
+            <a:pPr marR="0" lvl="0" defTabSz="914400" rtl="0" eaLnBrk="1" fontAlgn="auto" latinLnBrk="0" hangingPunct="1">
+              <a:lnSpc>
+                <a:spcPct val="150000"/>
+              </a:lnSpc>
+              <a:spcBef>
+                <a:spcPts val="0"/>
+              </a:spcBef>
+              <a:spcAft>
+                <a:spcPts val="0"/>
+              </a:spcAft>
+              <a:buClrTx/>
+              <a:buSzTx/>
+              <a:tabLst/>
+              <a:defRPr/>
+            </a:pPr>
+            <a:r>
+              <a:rPr lang="en-US" sz="1600" i="1" dirty="0">
+                <a:solidFill>
+                  <a:schemeClr val="tx1">
+                    <a:lumMod val="50000"/>
+                    <a:lumOff val="50000"/>
+                  </a:schemeClr>
+                </a:solidFill>
+                <a:latin typeface="Arial" panose="020B0604020202020204" pitchFamily="34" charset="0"/>
+                <a:cs typeface="Arial" panose="020B0604020202020204" pitchFamily="34" charset="0"/>
+              </a:rPr>
+              <a:t>Q. How to get into Data Science?</a:t>
+            </a:r>
+          </a:p>
+          <a:p>
+            <a:pPr marR="0" lvl="0" defTabSz="914400" rtl="0" eaLnBrk="1" fontAlgn="auto" latinLnBrk="0" hangingPunct="1">
+              <a:lnSpc>
+                <a:spcPct val="150000"/>
+              </a:lnSpc>
+              <a:spcBef>
+                <a:spcPts val="0"/>
+              </a:spcBef>
+              <a:spcAft>
+                <a:spcPts val="0"/>
+              </a:spcAft>
+              <a:buClrTx/>
+              <a:buSzTx/>
+              <a:tabLst/>
+              <a:defRPr/>
+            </a:pPr>
+            <a:r>
+              <a:rPr lang="en-US" sz="1600" dirty="0">
+                <a:solidFill>
+                  <a:schemeClr val="tx1">
+                    <a:lumMod val="50000"/>
+                    <a:lumOff val="50000"/>
+                  </a:schemeClr>
+                </a:solidFill>
+                <a:latin typeface="Arial" panose="020B0604020202020204" pitchFamily="34" charset="0"/>
+                <a:cs typeface="Arial" panose="020B0604020202020204" pitchFamily="34" charset="0"/>
+              </a:rPr>
+              <a:t>A.</a:t>
+            </a:r>
+            <a:r>
+              <a:rPr lang="en-US" sz="1600" i="1" dirty="0">
+                <a:solidFill>
+                  <a:schemeClr val="tx1">
+                    <a:lumMod val="50000"/>
+                    <a:lumOff val="50000"/>
+                  </a:schemeClr>
+                </a:solidFill>
+                <a:latin typeface="Arial" panose="020B0604020202020204" pitchFamily="34" charset="0"/>
+                <a:cs typeface="Arial" panose="020B0604020202020204" pitchFamily="34" charset="0"/>
+              </a:rPr>
+              <a:t> </a:t>
+            </a:r>
+            <a:r>
+              <a:rPr lang="en-US" sz="1600" dirty="0">
+                <a:solidFill>
+                  <a:schemeClr val="tx1">
+                    <a:lumMod val="50000"/>
+                    <a:lumOff val="50000"/>
+                  </a:schemeClr>
+                </a:solidFill>
+                <a:latin typeface="Arial" panose="020B0604020202020204" pitchFamily="34" charset="0"/>
+                <a:cs typeface="Arial" panose="020B0604020202020204" pitchFamily="34" charset="0"/>
+              </a:rPr>
+              <a:t>Simple, ask a real-world Data Scientist</a:t>
+            </a:r>
+            <a:r>
+              <a:rPr lang="en-US" sz="1600" i="1" dirty="0">
+                <a:solidFill>
+                  <a:schemeClr val="tx1">
+                    <a:lumMod val="50000"/>
+                    <a:lumOff val="50000"/>
+                  </a:schemeClr>
+                </a:solidFill>
+                <a:latin typeface="Arial" panose="020B0604020202020204" pitchFamily="34" charset="0"/>
+                <a:cs typeface="Arial" panose="020B0604020202020204" pitchFamily="34" charset="0"/>
+              </a:rPr>
+              <a:t>.</a:t>
+            </a:r>
+          </a:p>
+          <a:p>
+            <a:pPr marR="0" lvl="0" defTabSz="914400" rtl="0" eaLnBrk="1" fontAlgn="auto" latinLnBrk="0" hangingPunct="1">
+              <a:lnSpc>
+                <a:spcPct val="150000"/>
+              </a:lnSpc>
+              <a:spcBef>
+                <a:spcPts val="0"/>
+              </a:spcBef>
+              <a:spcAft>
+                <a:spcPts val="0"/>
+              </a:spcAft>
+              <a:buClrTx/>
+              <a:buSzTx/>
+              <a:tabLst/>
+              <a:defRPr/>
+            </a:pPr>
+            <a:endParaRPr lang="en-US" sz="1600" i="1" dirty="0">
+              <a:solidFill>
+                <a:schemeClr val="tx1">
+                  <a:lumMod val="50000"/>
+                  <a:lumOff val="50000"/>
+                </a:schemeClr>
+              </a:solidFill>
+              <a:latin typeface="Arial" panose="020B0604020202020204" pitchFamily="34" charset="0"/>
+              <a:cs typeface="Arial" panose="020B0604020202020204" pitchFamily="34" charset="0"/>
+            </a:endParaRPr>
+          </a:p>
+          <a:p>
+            <a:pPr marR="0" lvl="0" defTabSz="914400" rtl="0" eaLnBrk="1" fontAlgn="auto" latinLnBrk="0" hangingPunct="1">
+              <a:lnSpc>
+                <a:spcPct val="150000"/>
+              </a:lnSpc>
+              <a:spcBef>
+                <a:spcPts val="0"/>
+              </a:spcBef>
+              <a:spcAft>
+                <a:spcPts val="0"/>
+              </a:spcAft>
+              <a:buClrTx/>
+              <a:buSzTx/>
+              <a:tabLst/>
+              <a:defRPr/>
+            </a:pPr>
+            <a:r>
+              <a:rPr lang="en-US" sz="1200" dirty="0">
+                <a:solidFill>
+                  <a:schemeClr val="tx1">
+                    <a:lumMod val="50000"/>
+                    <a:lumOff val="50000"/>
+                  </a:schemeClr>
+                </a:solidFill>
+                <a:latin typeface="Arial" panose="020B0604020202020204" pitchFamily="34" charset="0"/>
+                <a:cs typeface="Arial" panose="020B0604020202020204" pitchFamily="34" charset="0"/>
+              </a:rPr>
+              <a:t>Email: anishmahapatra01@gmail.com</a:t>
+            </a:r>
+          </a:p>
+        </p:txBody>
+      </p:sp>
+    </p:spTree>
+    <p:extLst>
+      <p:ext uri="{BB962C8B-B14F-4D97-AF65-F5344CB8AC3E}">
+        <p14:creationId xmlns:p14="http://schemas.microsoft.com/office/powerpoint/2010/main" val="2988580744"/>
+      </p:ext>
+    </p:extLst>
+  </p:cSld>
+  <p:clrMapOvr>
+    <a:masterClrMapping/>
+  </p:clrMapOvr>
+</p:sld>
+</file>
+
 <file path=ppt/slides/slide2.xml><?xml version="1.0" encoding="utf-8"?>
 <p:sld xmlns:a="http://schemas.openxmlformats.org/drawingml/2006/main" xmlns:r="http://schemas.openxmlformats.org/officeDocument/2006/relationships" xmlns:p="http://schemas.openxmlformats.org/presentationml/2006/main">
   <p:cSld>
@@ -5279,51 +6193,83 @@
           </a:prstGeom>
         </p:spPr>
       </p:pic>
-      <p:sp>
-        <p:nvSpPr>
-          <p:cNvPr id="27" name="TextBox 26">
+      <p:grpSp>
+        <p:nvGrpSpPr>
+          <p:cNvPr id="3" name="Group 2">
             <a:extLst>
               <a:ext uri="{FF2B5EF4-FFF2-40B4-BE49-F238E27FC236}">
-                <a16:creationId xmlns:a16="http://schemas.microsoft.com/office/drawing/2014/main" id="{9CB15A08-447B-47C9-A717-79FA893DD707}"/>
+                <a16:creationId xmlns:a16="http://schemas.microsoft.com/office/drawing/2014/main" id="{E93020E1-61BC-41F0-A9EF-165E220E5D33}"/>
               </a:ext>
             </a:extLst>
           </p:cNvPr>
-          <p:cNvSpPr txBox="1"/>
+          <p:cNvGrpSpPr/>
           <p:nvPr/>
-        </p:nvSpPr>
-        <p:spPr>
+        </p:nvGrpSpPr>
+        <p:grpSpPr>
           <a:xfrm>
-            <a:off x="396852" y="4309258"/>
-            <a:ext cx="8972231" cy="2354812"/>
+            <a:off x="396852" y="4430730"/>
+            <a:ext cx="5699148" cy="2009890"/>
+            <a:chOff x="396853" y="4309258"/>
+            <a:chExt cx="5699148" cy="2009890"/>
           </a:xfrm>
-          <a:prstGeom prst="rect">
-            <a:avLst/>
-          </a:prstGeom>
-          <a:noFill/>
-        </p:spPr>
-        <p:txBody>
-          <a:bodyPr wrap="square" rtlCol="0">
-            <a:spAutoFit/>
-          </a:bodyPr>
-          <a:lstStyle/>
-          <a:p>
-            <a:pPr marR="0" lvl="0" defTabSz="914400" rtl="0" eaLnBrk="1" fontAlgn="auto" latinLnBrk="0" hangingPunct="1">
-              <a:lnSpc>
-                <a:spcPct val="150000"/>
-              </a:lnSpc>
-              <a:spcBef>
-                <a:spcPts val="0"/>
-              </a:spcBef>
-              <a:spcAft>
-                <a:spcPts val="0"/>
-              </a:spcAft>
-              <a:buClrTx/>
-              <a:buSzTx/>
-              <a:tabLst/>
-              <a:defRPr/>
-            </a:pPr>
-            <a:r>
-              <a:rPr lang="en-US" sz="2000" b="1" dirty="0">
+        </p:grpSpPr>
+        <p:sp>
+          <p:nvSpPr>
+            <p:cNvPr id="27" name="TextBox 26">
+              <a:extLst>
+                <a:ext uri="{FF2B5EF4-FFF2-40B4-BE49-F238E27FC236}">
+                  <a16:creationId xmlns:a16="http://schemas.microsoft.com/office/drawing/2014/main" id="{9CB15A08-447B-47C9-A717-79FA893DD707}"/>
+                </a:ext>
+              </a:extLst>
+            </p:cNvPr>
+            <p:cNvSpPr txBox="1"/>
+            <p:nvPr/>
+          </p:nvSpPr>
+          <p:spPr>
+            <a:xfrm>
+              <a:off x="396853" y="4309258"/>
+              <a:ext cx="5699148" cy="1985672"/>
+            </a:xfrm>
+            <a:prstGeom prst="rect">
+              <a:avLst/>
+            </a:prstGeom>
+            <a:noFill/>
+          </p:spPr>
+          <p:txBody>
+            <a:bodyPr wrap="square" rtlCol="0">
+              <a:spAutoFit/>
+            </a:bodyPr>
+            <a:lstStyle/>
+            <a:p>
+              <a:pPr marR="0" lvl="0" defTabSz="914400" rtl="0" eaLnBrk="1" fontAlgn="auto" latinLnBrk="0" hangingPunct="1">
+                <a:lnSpc>
+                  <a:spcPct val="150000"/>
+                </a:lnSpc>
+                <a:spcBef>
+                  <a:spcPts val="0"/>
+                </a:spcBef>
+                <a:spcAft>
+                  <a:spcPts val="0"/>
+                </a:spcAft>
+                <a:buClrTx/>
+                <a:buSzTx/>
+                <a:tabLst/>
+                <a:defRPr/>
+              </a:pPr>
+              <a:r>
+                <a:rPr lang="en-US" sz="2000" b="1" dirty="0">
+                  <a:solidFill>
+                    <a:schemeClr val="tx1">
+                      <a:lumMod val="85000"/>
+                      <a:lumOff val="15000"/>
+                    </a:schemeClr>
+                  </a:solidFill>
+                  <a:latin typeface="Arial" panose="020B0604020202020204" pitchFamily="34" charset="0"/>
+                  <a:cs typeface="Arial" panose="020B0604020202020204" pitchFamily="34" charset="0"/>
+                </a:rPr>
+                <a:t>Senior Data Scientist </a:t>
+              </a:r>
+              <a:endParaRPr lang="en-US" sz="1600" b="1" dirty="0">
                 <a:solidFill>
                   <a:schemeClr val="tx1">
                     <a:lumMod val="85000"/>
@@ -5332,720 +6278,597 @@
                 </a:solidFill>
                 <a:latin typeface="Arial" panose="020B0604020202020204" pitchFamily="34" charset="0"/>
                 <a:cs typeface="Arial" panose="020B0604020202020204" pitchFamily="34" charset="0"/>
-              </a:rPr>
-              <a:t>Senior Data Scientist </a:t>
-            </a:r>
-            <a:endParaRPr lang="en-US" sz="1600" b="1" dirty="0">
-              <a:solidFill>
-                <a:schemeClr val="tx1">
-                  <a:lumMod val="85000"/>
-                  <a:lumOff val="15000"/>
-                </a:schemeClr>
-              </a:solidFill>
-              <a:latin typeface="Arial" panose="020B0604020202020204" pitchFamily="34" charset="0"/>
-              <a:cs typeface="Arial" panose="020B0604020202020204" pitchFamily="34" charset="0"/>
-            </a:endParaRPr>
-          </a:p>
-          <a:p>
-            <a:pPr marR="0" lvl="0" defTabSz="914400" rtl="0" eaLnBrk="1" fontAlgn="auto" latinLnBrk="0" hangingPunct="1">
-              <a:lnSpc>
-                <a:spcPct val="150000"/>
-              </a:lnSpc>
-              <a:spcBef>
-                <a:spcPts val="0"/>
-              </a:spcBef>
-              <a:spcAft>
-                <a:spcPts val="0"/>
-              </a:spcAft>
-              <a:buClrTx/>
-              <a:buSzTx/>
-              <a:tabLst/>
-              <a:defRPr/>
-            </a:pPr>
-            <a:r>
-              <a:rPr kumimoji="0" lang="en-US" sz="1600" b="1" u="none" strike="noStrike" kern="1200" cap="none" spc="0" normalizeH="0" baseline="0" noProof="0" dirty="0">
-                <a:ln>
-                  <a:noFill/>
-                </a:ln>
-                <a:solidFill>
-                  <a:schemeClr val="tx1">
-                    <a:lumMod val="85000"/>
-                    <a:lumOff val="15000"/>
-                  </a:schemeClr>
-                </a:solidFill>
-                <a:effectLst/>
-                <a:uLnTx/>
-                <a:uFillTx/>
-                <a:latin typeface="Arial" panose="020B0604020202020204" pitchFamily="34" charset="0"/>
-                <a:cs typeface="Arial" panose="020B0604020202020204" pitchFamily="34" charset="0"/>
-              </a:rPr>
-              <a:t>	</a:t>
-            </a:r>
-            <a:r>
-              <a:rPr kumimoji="0" lang="en-US" sz="1600" b="1" u="none" strike="noStrike" kern="1200" cap="none" spc="0" normalizeH="0" baseline="0" noProof="0" dirty="0">
-                <a:ln>
-                  <a:noFill/>
-                </a:ln>
-                <a:solidFill>
-                  <a:schemeClr val="tx1">
-                    <a:lumMod val="50000"/>
-                    <a:lumOff val="50000"/>
-                  </a:schemeClr>
-                </a:solidFill>
-                <a:effectLst/>
-                <a:uLnTx/>
-                <a:uFillTx/>
-                <a:latin typeface="Arial" panose="020B0604020202020204" pitchFamily="34" charset="0"/>
-                <a:cs typeface="Arial" panose="020B0604020202020204" pitchFamily="34" charset="0"/>
-              </a:rPr>
-              <a:t>LinkedIn</a:t>
-            </a:r>
-            <a:r>
-              <a:rPr kumimoji="0" lang="en-US" sz="1600" b="1" u="none" strike="noStrike" kern="1200" cap="none" spc="0" normalizeH="0" baseline="0" noProof="0" dirty="0">
-                <a:ln>
-                  <a:noFill/>
-                </a:ln>
-                <a:solidFill>
-                  <a:schemeClr val="tx1">
-                    <a:lumMod val="85000"/>
-                    <a:lumOff val="15000"/>
-                  </a:schemeClr>
-                </a:solidFill>
-                <a:effectLst/>
-                <a:uLnTx/>
-                <a:uFillTx/>
-                <a:latin typeface="Arial" panose="020B0604020202020204" pitchFamily="34" charset="0"/>
-                <a:cs typeface="Arial" panose="020B0604020202020204" pitchFamily="34" charset="0"/>
-              </a:rPr>
-              <a:t>: </a:t>
-            </a:r>
-            <a:r>
-              <a:rPr kumimoji="0" lang="en-US" sz="1600" strike="noStrike" kern="1200" cap="none" spc="0" normalizeH="0" baseline="0" noProof="0" dirty="0">
-                <a:ln>
-                  <a:noFill/>
-                </a:ln>
-                <a:solidFill>
-                  <a:schemeClr val="tx1">
-                    <a:lumMod val="85000"/>
-                    <a:lumOff val="15000"/>
-                  </a:schemeClr>
-                </a:solidFill>
-                <a:effectLst/>
-                <a:uLnTx/>
-                <a:uFillTx/>
-                <a:latin typeface="Arial" panose="020B0604020202020204" pitchFamily="34" charset="0"/>
-                <a:cs typeface="Arial" panose="020B0604020202020204" pitchFamily="34" charset="0"/>
-              </a:rPr>
-              <a:t>www.linkedin.com/in/</a:t>
-            </a:r>
-            <a:r>
-              <a:rPr kumimoji="0" lang="en-US" sz="1600" b="1" strike="noStrike" kern="1200" cap="none" spc="0" normalizeH="0" baseline="0" noProof="0" dirty="0">
-                <a:ln>
-                  <a:noFill/>
-                </a:ln>
-                <a:solidFill>
-                  <a:schemeClr val="tx1">
-                    <a:lumMod val="85000"/>
-                    <a:lumOff val="15000"/>
-                  </a:schemeClr>
-                </a:solidFill>
-                <a:effectLst/>
-                <a:uLnTx/>
-                <a:uFillTx/>
-                <a:latin typeface="Arial" panose="020B0604020202020204" pitchFamily="34" charset="0"/>
-                <a:cs typeface="Arial" panose="020B0604020202020204" pitchFamily="34" charset="0"/>
-              </a:rPr>
-              <a:t>anishmahapatra</a:t>
-            </a:r>
-            <a:br>
-              <a:rPr kumimoji="0" lang="en-US" sz="1600" b="1" strike="noStrike" kern="1200" cap="none" spc="0" normalizeH="0" baseline="0" noProof="0" dirty="0">
-                <a:ln>
-                  <a:noFill/>
-                </a:ln>
-                <a:solidFill>
-                  <a:srgbClr val="00B050"/>
-                </a:solidFill>
-                <a:effectLst/>
-                <a:uLnTx/>
-                <a:uFillTx/>
-                <a:latin typeface="Arial" panose="020B0604020202020204" pitchFamily="34" charset="0"/>
-                <a:cs typeface="Arial" panose="020B0604020202020204" pitchFamily="34" charset="0"/>
-              </a:rPr>
-            </a:br>
-            <a:r>
-              <a:rPr kumimoji="0" lang="en-US" sz="1600" b="1" strike="noStrike" kern="1200" cap="none" spc="0" normalizeH="0" baseline="0" noProof="0" dirty="0">
-                <a:ln>
-                  <a:noFill/>
-                </a:ln>
-                <a:solidFill>
-                  <a:srgbClr val="00B050"/>
-                </a:solidFill>
-                <a:effectLst/>
-                <a:uLnTx/>
-                <a:uFillTx/>
-                <a:latin typeface="Arial" panose="020B0604020202020204" pitchFamily="34" charset="0"/>
-                <a:cs typeface="Arial" panose="020B0604020202020204" pitchFamily="34" charset="0"/>
-              </a:rPr>
-              <a:t>	</a:t>
-            </a:r>
-            <a:r>
-              <a:rPr lang="en-US" sz="1600" b="1" dirty="0">
-                <a:solidFill>
-                  <a:schemeClr val="tx1">
-                    <a:lumMod val="50000"/>
-                    <a:lumOff val="50000"/>
-                  </a:schemeClr>
-                </a:solidFill>
-                <a:latin typeface="Arial" panose="020B0604020202020204" pitchFamily="34" charset="0"/>
-                <a:cs typeface="Arial" panose="020B0604020202020204" pitchFamily="34" charset="0"/>
-              </a:rPr>
-              <a:t>Medium</a:t>
-            </a:r>
-            <a:r>
-              <a:rPr lang="en-US" sz="1600" b="1" dirty="0">
-                <a:solidFill>
-                  <a:schemeClr val="tx1">
-                    <a:lumMod val="85000"/>
-                    <a:lumOff val="15000"/>
-                  </a:schemeClr>
-                </a:solidFill>
-                <a:latin typeface="Arial" panose="020B0604020202020204" pitchFamily="34" charset="0"/>
-                <a:cs typeface="Arial" panose="020B0604020202020204" pitchFamily="34" charset="0"/>
-              </a:rPr>
-              <a:t>: anishmahapatra</a:t>
-            </a:r>
-            <a:r>
-              <a:rPr lang="en-US" sz="1600" dirty="0">
-                <a:solidFill>
-                  <a:schemeClr val="tx1">
-                    <a:lumMod val="85000"/>
-                    <a:lumOff val="15000"/>
-                  </a:schemeClr>
-                </a:solidFill>
-                <a:latin typeface="Arial" panose="020B0604020202020204" pitchFamily="34" charset="0"/>
-                <a:cs typeface="Arial" panose="020B0604020202020204" pitchFamily="34" charset="0"/>
-              </a:rPr>
-              <a:t>.medium.com</a:t>
-            </a:r>
-            <a:br>
-              <a:rPr kumimoji="0" lang="en-US" sz="1600" u="none" strike="noStrike" kern="1200" cap="none" spc="0" normalizeH="0" baseline="0" noProof="0" dirty="0">
-                <a:ln>
-                  <a:noFill/>
-                </a:ln>
-                <a:solidFill>
-                  <a:schemeClr val="tx1">
-                    <a:lumMod val="85000"/>
-                    <a:lumOff val="15000"/>
-                  </a:schemeClr>
-                </a:solidFill>
-                <a:effectLst/>
-                <a:uLnTx/>
-                <a:uFillTx/>
-                <a:latin typeface="Arial" panose="020B0604020202020204" pitchFamily="34" charset="0"/>
-                <a:cs typeface="Arial" panose="020B0604020202020204" pitchFamily="34" charset="0"/>
-              </a:rPr>
-            </a:br>
-            <a:r>
-              <a:rPr kumimoji="0" lang="en-US" sz="1600" u="none" strike="noStrike" kern="1200" cap="none" spc="0" normalizeH="0" baseline="0" noProof="0" dirty="0">
-                <a:ln>
-                  <a:noFill/>
-                </a:ln>
-                <a:solidFill>
-                  <a:schemeClr val="tx1">
-                    <a:lumMod val="85000"/>
-                    <a:lumOff val="15000"/>
-                  </a:schemeClr>
-                </a:solidFill>
-                <a:effectLst/>
-                <a:uLnTx/>
-                <a:uFillTx/>
-                <a:latin typeface="Arial" panose="020B0604020202020204" pitchFamily="34" charset="0"/>
-                <a:cs typeface="Arial" panose="020B0604020202020204" pitchFamily="34" charset="0"/>
-              </a:rPr>
-              <a:t>	</a:t>
-            </a:r>
-            <a:r>
-              <a:rPr lang="en-US" sz="1600" b="1" dirty="0">
-                <a:solidFill>
-                  <a:schemeClr val="tx1">
-                    <a:lumMod val="50000"/>
-                    <a:lumOff val="50000"/>
-                  </a:schemeClr>
-                </a:solidFill>
-                <a:latin typeface="Arial" panose="020B0604020202020204" pitchFamily="34" charset="0"/>
-                <a:cs typeface="Arial" panose="020B0604020202020204" pitchFamily="34" charset="0"/>
-              </a:rPr>
-              <a:t>Twitter</a:t>
-            </a:r>
-            <a:r>
-              <a:rPr kumimoji="0" lang="en-US" sz="1600" u="none" strike="noStrike" kern="1200" cap="none" spc="0" normalizeH="0" baseline="0" noProof="0" dirty="0">
-                <a:ln>
-                  <a:noFill/>
-                </a:ln>
-                <a:solidFill>
-                  <a:schemeClr val="tx1">
-                    <a:lumMod val="85000"/>
-                    <a:lumOff val="15000"/>
-                  </a:schemeClr>
-                </a:solidFill>
-                <a:effectLst/>
-                <a:uLnTx/>
-                <a:uFillTx/>
-                <a:latin typeface="Arial" panose="020B0604020202020204" pitchFamily="34" charset="0"/>
-                <a:cs typeface="Arial" panose="020B0604020202020204" pitchFamily="34" charset="0"/>
-              </a:rPr>
-              <a:t>: </a:t>
-            </a:r>
-            <a:r>
-              <a:rPr kumimoji="0" lang="en-US" sz="1600" b="1" u="none" strike="noStrike" kern="1200" cap="none" spc="0" normalizeH="0" baseline="0" noProof="0" dirty="0">
-                <a:ln>
-                  <a:noFill/>
-                </a:ln>
-                <a:solidFill>
-                  <a:schemeClr val="tx1">
-                    <a:lumMod val="85000"/>
-                    <a:lumOff val="15000"/>
-                  </a:schemeClr>
-                </a:solidFill>
-                <a:effectLst/>
-                <a:uLnTx/>
-                <a:uFillTx/>
-                <a:latin typeface="Arial" panose="020B0604020202020204" pitchFamily="34" charset="0"/>
-                <a:cs typeface="Arial" panose="020B0604020202020204" pitchFamily="34" charset="0"/>
-              </a:rPr>
-              <a:t>@_anishmahapatra</a:t>
-            </a:r>
-          </a:p>
-          <a:p>
-            <a:pPr marR="0" lvl="0" defTabSz="914400" rtl="0" eaLnBrk="1" fontAlgn="auto" latinLnBrk="0" hangingPunct="1">
-              <a:lnSpc>
-                <a:spcPct val="150000"/>
-              </a:lnSpc>
-              <a:spcBef>
-                <a:spcPts val="0"/>
-              </a:spcBef>
-              <a:spcAft>
-                <a:spcPts val="0"/>
-              </a:spcAft>
-              <a:buClrTx/>
-              <a:buSzTx/>
-              <a:tabLst/>
-              <a:defRPr/>
-            </a:pPr>
-            <a:r>
-              <a:rPr lang="en-US" sz="1600" b="1" dirty="0">
-                <a:solidFill>
-                  <a:srgbClr val="00B050"/>
-                </a:solidFill>
-                <a:latin typeface="Arial" panose="020B0604020202020204" pitchFamily="34" charset="0"/>
-                <a:cs typeface="Arial" panose="020B0604020202020204" pitchFamily="34" charset="0"/>
-              </a:rPr>
-              <a:t>	</a:t>
-            </a:r>
-            <a:r>
-              <a:rPr lang="en-US" sz="1600" b="1" dirty="0">
-                <a:solidFill>
-                  <a:schemeClr val="tx1">
-                    <a:lumMod val="50000"/>
-                    <a:lumOff val="50000"/>
-                  </a:schemeClr>
-                </a:solidFill>
-                <a:latin typeface="Arial" panose="020B0604020202020204" pitchFamily="34" charset="0"/>
-                <a:cs typeface="Arial" panose="020B0604020202020204" pitchFamily="34" charset="0"/>
-              </a:rPr>
-              <a:t>GitHub</a:t>
-            </a:r>
-            <a:r>
-              <a:rPr lang="en-US" sz="1600" b="1" dirty="0">
-                <a:solidFill>
-                  <a:schemeClr val="tx1">
-                    <a:lumMod val="85000"/>
-                    <a:lumOff val="15000"/>
-                  </a:schemeClr>
-                </a:solidFill>
-                <a:latin typeface="Arial" panose="020B0604020202020204" pitchFamily="34" charset="0"/>
-                <a:cs typeface="Arial" panose="020B0604020202020204" pitchFamily="34" charset="0"/>
-              </a:rPr>
-              <a:t>:</a:t>
-            </a:r>
-            <a:r>
-              <a:rPr lang="en-US" sz="1600" b="1" dirty="0">
-                <a:solidFill>
-                  <a:srgbClr val="00B050"/>
-                </a:solidFill>
-                <a:latin typeface="Arial" panose="020B0604020202020204" pitchFamily="34" charset="0"/>
-                <a:cs typeface="Arial" panose="020B0604020202020204" pitchFamily="34" charset="0"/>
-              </a:rPr>
-              <a:t> </a:t>
-            </a:r>
-            <a:r>
-              <a:rPr lang="en-US" sz="1600" dirty="0">
-                <a:solidFill>
-                  <a:schemeClr val="tx1">
-                    <a:lumMod val="85000"/>
-                    <a:lumOff val="15000"/>
-                  </a:schemeClr>
-                </a:solidFill>
-                <a:latin typeface="Arial" panose="020B0604020202020204" pitchFamily="34" charset="0"/>
-                <a:cs typeface="Arial" panose="020B0604020202020204" pitchFamily="34" charset="0"/>
-              </a:rPr>
-              <a:t>www.github.com/</a:t>
-            </a:r>
-            <a:r>
-              <a:rPr lang="en-US" sz="1600" b="1" dirty="0">
-                <a:solidFill>
-                  <a:schemeClr val="tx1">
-                    <a:lumMod val="85000"/>
-                    <a:lumOff val="15000"/>
-                  </a:schemeClr>
-                </a:solidFill>
-                <a:latin typeface="Arial" panose="020B0604020202020204" pitchFamily="34" charset="0"/>
-                <a:cs typeface="Arial" panose="020B0604020202020204" pitchFamily="34" charset="0"/>
-              </a:rPr>
-              <a:t>anishmahapatra</a:t>
-            </a:r>
-          </a:p>
-          <a:p>
-            <a:pPr marR="0" lvl="0" defTabSz="914400" rtl="0" eaLnBrk="1" fontAlgn="auto" latinLnBrk="0" hangingPunct="1">
-              <a:lnSpc>
-                <a:spcPct val="150000"/>
-              </a:lnSpc>
-              <a:spcBef>
-                <a:spcPts val="0"/>
-              </a:spcBef>
-              <a:spcAft>
-                <a:spcPts val="0"/>
-              </a:spcAft>
-              <a:buClrTx/>
-              <a:buSzTx/>
-              <a:tabLst/>
-              <a:defRPr/>
-            </a:pPr>
-            <a:r>
-              <a:rPr kumimoji="0" lang="en-US" sz="1600" b="1" u="none" strike="noStrike" kern="1200" cap="none" spc="0" normalizeH="0" baseline="0" noProof="0" dirty="0">
-                <a:ln>
-                  <a:noFill/>
-                </a:ln>
-                <a:solidFill>
-                  <a:schemeClr val="tx1">
-                    <a:lumMod val="65000"/>
-                    <a:lumOff val="35000"/>
-                  </a:schemeClr>
-                </a:solidFill>
-                <a:effectLst/>
-                <a:uLnTx/>
-                <a:uFillTx/>
-                <a:latin typeface="Arial" panose="020B0604020202020204" pitchFamily="34" charset="0"/>
-                <a:cs typeface="Arial" panose="020B0604020202020204" pitchFamily="34" charset="0"/>
-              </a:rPr>
-              <a:t>				   Email</a:t>
-            </a:r>
-            <a:r>
-              <a:rPr kumimoji="0" lang="en-US" sz="1600" b="1" u="none" strike="noStrike" kern="1200" cap="none" spc="0" normalizeH="0" baseline="0" noProof="0" dirty="0">
-                <a:ln>
-                  <a:noFill/>
-                </a:ln>
-                <a:solidFill>
-                  <a:schemeClr val="tx1">
-                    <a:lumMod val="85000"/>
-                    <a:lumOff val="15000"/>
-                  </a:schemeClr>
-                </a:solidFill>
-                <a:effectLst/>
-                <a:uLnTx/>
-                <a:uFillTx/>
-                <a:latin typeface="Arial" panose="020B0604020202020204" pitchFamily="34" charset="0"/>
-                <a:cs typeface="Arial" panose="020B0604020202020204" pitchFamily="34" charset="0"/>
-              </a:rPr>
-              <a:t>:</a:t>
-            </a:r>
-            <a:r>
-              <a:rPr kumimoji="0" lang="en-US" sz="1600" u="none" strike="noStrike" kern="1200" cap="none" spc="0" normalizeH="0" baseline="0" noProof="0" dirty="0">
-                <a:ln>
-                  <a:noFill/>
-                </a:ln>
-                <a:solidFill>
-                  <a:schemeClr val="tx1">
-                    <a:lumMod val="85000"/>
-                    <a:lumOff val="15000"/>
-                  </a:schemeClr>
-                </a:solidFill>
-                <a:effectLst/>
-                <a:uLnTx/>
-                <a:uFillTx/>
-                <a:latin typeface="Arial" panose="020B0604020202020204" pitchFamily="34" charset="0"/>
-                <a:cs typeface="Arial" panose="020B0604020202020204" pitchFamily="34" charset="0"/>
-              </a:rPr>
-              <a:t> </a:t>
-            </a:r>
-            <a:r>
-              <a:rPr kumimoji="0" lang="en-US" sz="1600" b="1" u="none" strike="noStrike" kern="1200" cap="none" spc="0" normalizeH="0" baseline="0" noProof="0" dirty="0">
-                <a:ln>
-                  <a:noFill/>
-                </a:ln>
-                <a:solidFill>
-                  <a:schemeClr val="tx1">
-                    <a:lumMod val="85000"/>
-                    <a:lumOff val="15000"/>
-                  </a:schemeClr>
-                </a:solidFill>
-                <a:effectLst/>
-                <a:uLnTx/>
-                <a:uFillTx/>
-                <a:latin typeface="Arial" panose="020B0604020202020204" pitchFamily="34" charset="0"/>
-                <a:cs typeface="Arial" panose="020B0604020202020204" pitchFamily="34" charset="0"/>
-              </a:rPr>
-              <a:t>anishmahapatra01</a:t>
-            </a:r>
-            <a:r>
-              <a:rPr kumimoji="0" lang="en-US" sz="1600" u="none" strike="noStrike" kern="1200" cap="none" spc="0" normalizeH="0" baseline="0" noProof="0" dirty="0">
-                <a:ln>
-                  <a:noFill/>
-                </a:ln>
-                <a:solidFill>
-                  <a:schemeClr val="tx1">
-                    <a:lumMod val="85000"/>
-                    <a:lumOff val="15000"/>
-                  </a:schemeClr>
-                </a:solidFill>
-                <a:effectLst/>
-                <a:uLnTx/>
-                <a:uFillTx/>
-                <a:latin typeface="Arial" panose="020B0604020202020204" pitchFamily="34" charset="0"/>
-                <a:cs typeface="Arial" panose="020B0604020202020204" pitchFamily="34" charset="0"/>
-              </a:rPr>
-              <a:t>@gmail.com</a:t>
-            </a:r>
-          </a:p>
-        </p:txBody>
-      </p:sp>
-      <p:pic>
-        <p:nvPicPr>
-          <p:cNvPr id="5122" name="Picture 2" descr="Linkedin - Free social media icons">
-            <a:extLst>
-              <a:ext uri="{FF2B5EF4-FFF2-40B4-BE49-F238E27FC236}">
-                <a16:creationId xmlns:a16="http://schemas.microsoft.com/office/drawing/2014/main" id="{4D5F61CE-74F4-4A82-8CE5-2510AA48CC29}"/>
-              </a:ext>
-            </a:extLst>
-          </p:cNvPr>
-          <p:cNvPicPr>
-            <a:picLocks noChangeAspect="1" noChangeArrowheads="1"/>
-          </p:cNvPicPr>
-          <p:nvPr/>
-        </p:nvPicPr>
-        <p:blipFill rotWithShape="1">
-          <a:blip r:embed="rId3">
-            <a:extLst>
-              <a:ext uri="{28A0092B-C50C-407E-A947-70E740481C1C}">
-                <a14:useLocalDpi xmlns:a14="http://schemas.microsoft.com/office/drawing/2010/main" val="0"/>
-              </a:ext>
-            </a:extLst>
-          </a:blip>
-          <a:srcRect l="23130" t="-1031" r="23755"/>
-          <a:stretch/>
-        </p:blipFill>
-        <p:spPr bwMode="auto">
-          <a:xfrm>
-            <a:off x="963623" y="4880415"/>
-            <a:ext cx="280429" cy="280035"/>
-          </a:xfrm>
-          <a:prstGeom prst="rect">
-            <a:avLst/>
-          </a:prstGeom>
-          <a:noFill/>
-          <a:extLst>
-            <a:ext uri="{909E8E84-426E-40DD-AFC4-6F175D3DCCD1}">
-              <a14:hiddenFill xmlns:a14="http://schemas.microsoft.com/office/drawing/2010/main">
-                <a:solidFill>
-                  <a:srgbClr val="FFFFFF"/>
-                </a:solidFill>
-              </a14:hiddenFill>
-            </a:ext>
-          </a:extLst>
-        </p:spPr>
-      </p:pic>
-      <p:pic>
-        <p:nvPicPr>
-          <p:cNvPr id="5128" name="Picture 8" descr="Medium logo | Logok">
-            <a:extLst>
-              <a:ext uri="{FF2B5EF4-FFF2-40B4-BE49-F238E27FC236}">
-                <a16:creationId xmlns:a16="http://schemas.microsoft.com/office/drawing/2014/main" id="{7E7A7376-C94C-4B53-9B29-28C9969C02C8}"/>
-              </a:ext>
-            </a:extLst>
-          </p:cNvPr>
-          <p:cNvPicPr>
-            <a:picLocks noChangeAspect="1" noChangeArrowheads="1"/>
-          </p:cNvPicPr>
-          <p:nvPr/>
-        </p:nvPicPr>
-        <p:blipFill rotWithShape="1">
-          <a:blip r:embed="rId4">
-            <a:extLst>
-              <a:ext uri="{28A0092B-C50C-407E-A947-70E740481C1C}">
-                <a14:useLocalDpi xmlns:a14="http://schemas.microsoft.com/office/drawing/2010/main" val="0"/>
-              </a:ext>
-            </a:extLst>
-          </a:blip>
-          <a:srcRect l="19831" t="28005" r="19918" b="27804"/>
-          <a:stretch/>
-        </p:blipFill>
-        <p:spPr bwMode="auto">
-          <a:xfrm>
-            <a:off x="885199" y="5252814"/>
-            <a:ext cx="425103" cy="233850"/>
-          </a:xfrm>
-          <a:prstGeom prst="rect">
-            <a:avLst/>
-          </a:prstGeom>
-          <a:noFill/>
-          <a:extLst>
-            <a:ext uri="{909E8E84-426E-40DD-AFC4-6F175D3DCCD1}">
-              <a14:hiddenFill xmlns:a14="http://schemas.microsoft.com/office/drawing/2010/main">
-                <a:solidFill>
-                  <a:srgbClr val="FFFFFF"/>
-                </a:solidFill>
-              </a14:hiddenFill>
-            </a:ext>
-          </a:extLst>
-        </p:spPr>
-      </p:pic>
-      <p:pic>
-        <p:nvPicPr>
-          <p:cNvPr id="5130" name="Picture 10" descr="Twitter Logo transparent PNG - StickPNG">
-            <a:extLst>
-              <a:ext uri="{FF2B5EF4-FFF2-40B4-BE49-F238E27FC236}">
-                <a16:creationId xmlns:a16="http://schemas.microsoft.com/office/drawing/2014/main" id="{D0410767-7D82-445A-9664-7510342FFA9E}"/>
-              </a:ext>
-            </a:extLst>
-          </p:cNvPr>
-          <p:cNvPicPr>
-            <a:picLocks noChangeAspect="1" noChangeArrowheads="1"/>
-          </p:cNvPicPr>
-          <p:nvPr/>
-        </p:nvPicPr>
-        <p:blipFill rotWithShape="1">
-          <a:blip r:embed="rId5">
-            <a:extLst>
-              <a:ext uri="{28A0092B-C50C-407E-A947-70E740481C1C}">
-                <a14:useLocalDpi xmlns:a14="http://schemas.microsoft.com/office/drawing/2010/main" val="0"/>
-              </a:ext>
-            </a:extLst>
-          </a:blip>
-          <a:srcRect l="14874" t="19570" r="13943" b="19996"/>
-          <a:stretch/>
-        </p:blipFill>
-        <p:spPr bwMode="auto">
-          <a:xfrm>
-            <a:off x="914677" y="5579028"/>
-            <a:ext cx="366146" cy="310857"/>
-          </a:xfrm>
-          <a:prstGeom prst="rect">
-            <a:avLst/>
-          </a:prstGeom>
-          <a:noFill/>
-          <a:extLst>
-            <a:ext uri="{909E8E84-426E-40DD-AFC4-6F175D3DCCD1}">
-              <a14:hiddenFill xmlns:a14="http://schemas.microsoft.com/office/drawing/2010/main">
-                <a:solidFill>
-                  <a:srgbClr val="FFFFFF"/>
-                </a:solidFill>
-              </a14:hiddenFill>
-            </a:ext>
-          </a:extLst>
-        </p:spPr>
-      </p:pic>
-      <p:pic>
-        <p:nvPicPr>
-          <p:cNvPr id="5132" name="Picture 12" descr="Github Logo - Free social media icons">
-            <a:extLst>
-              <a:ext uri="{FF2B5EF4-FFF2-40B4-BE49-F238E27FC236}">
-                <a16:creationId xmlns:a16="http://schemas.microsoft.com/office/drawing/2014/main" id="{638E600F-B535-4F24-88FA-3874A3F86288}"/>
-              </a:ext>
-            </a:extLst>
-          </p:cNvPr>
-          <p:cNvPicPr>
-            <a:picLocks noChangeAspect="1" noChangeArrowheads="1"/>
-          </p:cNvPicPr>
-          <p:nvPr/>
-        </p:nvPicPr>
-        <p:blipFill>
-          <a:blip r:embed="rId6">
-            <a:extLst>
-              <a:ext uri="{28A0092B-C50C-407E-A947-70E740481C1C}">
-                <a14:useLocalDpi xmlns:a14="http://schemas.microsoft.com/office/drawing/2010/main" val="0"/>
-              </a:ext>
-            </a:extLst>
-          </a:blip>
-          <a:srcRect/>
-          <a:stretch>
-            <a:fillRect/>
-          </a:stretch>
-        </p:blipFill>
-        <p:spPr bwMode="auto">
-          <a:xfrm>
-            <a:off x="920764" y="5953002"/>
-            <a:ext cx="366146" cy="366146"/>
-          </a:xfrm>
-          <a:prstGeom prst="rect">
-            <a:avLst/>
-          </a:prstGeom>
-          <a:noFill/>
-          <a:extLst>
-            <a:ext uri="{909E8E84-426E-40DD-AFC4-6F175D3DCCD1}">
-              <a14:hiddenFill xmlns:a14="http://schemas.microsoft.com/office/drawing/2010/main">
-                <a:solidFill>
-                  <a:srgbClr val="FFFFFF"/>
-                </a:solidFill>
-              </a14:hiddenFill>
-            </a:ext>
-          </a:extLst>
-        </p:spPr>
-      </p:pic>
-      <p:pic>
-        <p:nvPicPr>
-          <p:cNvPr id="5138" name="Picture 18" descr="Ninja, emoji, smiley, emoticon icon - Download on Iconfinder">
-            <a:extLst>
-              <a:ext uri="{FF2B5EF4-FFF2-40B4-BE49-F238E27FC236}">
-                <a16:creationId xmlns:a16="http://schemas.microsoft.com/office/drawing/2014/main" id="{0F5DE76F-0D81-4A35-A4F5-CA04A5DC65A9}"/>
-              </a:ext>
-            </a:extLst>
-          </p:cNvPr>
-          <p:cNvPicPr>
-            <a:picLocks noChangeAspect="1" noChangeArrowheads="1"/>
-          </p:cNvPicPr>
-          <p:nvPr/>
-        </p:nvPicPr>
-        <p:blipFill rotWithShape="1">
-          <a:blip r:embed="rId7">
-            <a:extLst>
-              <a:ext uri="{28A0092B-C50C-407E-A947-70E740481C1C}">
-                <a14:useLocalDpi xmlns:a14="http://schemas.microsoft.com/office/drawing/2010/main" val="0"/>
-              </a:ext>
-            </a:extLst>
-          </a:blip>
-          <a:srcRect l="2604" t="4688" r="2865" b="10676"/>
-          <a:stretch/>
-        </p:blipFill>
-        <p:spPr bwMode="auto">
-          <a:xfrm>
-            <a:off x="3053911" y="4389376"/>
-            <a:ext cx="425103" cy="380602"/>
-          </a:xfrm>
-          <a:prstGeom prst="rect">
-            <a:avLst/>
-          </a:prstGeom>
-          <a:noFill/>
-          <a:extLst>
-            <a:ext uri="{909E8E84-426E-40DD-AFC4-6F175D3DCCD1}">
-              <a14:hiddenFill xmlns:a14="http://schemas.microsoft.com/office/drawing/2010/main">
-                <a:solidFill>
-                  <a:srgbClr val="FFFFFF"/>
-                </a:solidFill>
-              </a14:hiddenFill>
-            </a:ext>
-          </a:extLst>
-        </p:spPr>
-      </p:pic>
+              </a:endParaRPr>
+            </a:p>
+            <a:p>
+              <a:pPr marR="0" lvl="0" defTabSz="914400" rtl="0" eaLnBrk="1" fontAlgn="auto" latinLnBrk="0" hangingPunct="1">
+                <a:lnSpc>
+                  <a:spcPct val="150000"/>
+                </a:lnSpc>
+                <a:spcBef>
+                  <a:spcPts val="0"/>
+                </a:spcBef>
+                <a:spcAft>
+                  <a:spcPts val="0"/>
+                </a:spcAft>
+                <a:buClrTx/>
+                <a:buSzTx/>
+                <a:tabLst/>
+                <a:defRPr/>
+              </a:pPr>
+              <a:r>
+                <a:rPr kumimoji="0" lang="en-US" sz="1600" b="1" u="none" strike="noStrike" kern="1200" cap="none" spc="0" normalizeH="0" baseline="0" noProof="0" dirty="0">
+                  <a:ln>
+                    <a:noFill/>
+                  </a:ln>
+                  <a:solidFill>
+                    <a:schemeClr val="tx1">
+                      <a:lumMod val="85000"/>
+                      <a:lumOff val="15000"/>
+                    </a:schemeClr>
+                  </a:solidFill>
+                  <a:effectLst/>
+                  <a:uLnTx/>
+                  <a:uFillTx/>
+                  <a:latin typeface="Arial" panose="020B0604020202020204" pitchFamily="34" charset="0"/>
+                  <a:cs typeface="Arial" panose="020B0604020202020204" pitchFamily="34" charset="0"/>
+                </a:rPr>
+                <a:t>	</a:t>
+              </a:r>
+              <a:r>
+                <a:rPr kumimoji="0" lang="en-US" sz="1600" b="1" u="none" strike="noStrike" kern="1200" cap="none" spc="0" normalizeH="0" baseline="0" noProof="0" dirty="0">
+                  <a:ln>
+                    <a:noFill/>
+                  </a:ln>
+                  <a:solidFill>
+                    <a:schemeClr val="tx1">
+                      <a:lumMod val="50000"/>
+                      <a:lumOff val="50000"/>
+                    </a:schemeClr>
+                  </a:solidFill>
+                  <a:effectLst/>
+                  <a:uLnTx/>
+                  <a:uFillTx/>
+                  <a:latin typeface="Arial" panose="020B0604020202020204" pitchFamily="34" charset="0"/>
+                  <a:cs typeface="Arial" panose="020B0604020202020204" pitchFamily="34" charset="0"/>
+                </a:rPr>
+                <a:t>LinkedIn</a:t>
+              </a:r>
+              <a:r>
+                <a:rPr kumimoji="0" lang="en-US" sz="1600" b="1" u="none" strike="noStrike" kern="1200" cap="none" spc="0" normalizeH="0" baseline="0" noProof="0" dirty="0">
+                  <a:ln>
+                    <a:noFill/>
+                  </a:ln>
+                  <a:solidFill>
+                    <a:schemeClr val="tx1">
+                      <a:lumMod val="85000"/>
+                      <a:lumOff val="15000"/>
+                    </a:schemeClr>
+                  </a:solidFill>
+                  <a:effectLst/>
+                  <a:uLnTx/>
+                  <a:uFillTx/>
+                  <a:latin typeface="Arial" panose="020B0604020202020204" pitchFamily="34" charset="0"/>
+                  <a:cs typeface="Arial" panose="020B0604020202020204" pitchFamily="34" charset="0"/>
+                </a:rPr>
+                <a:t>: </a:t>
+              </a:r>
+              <a:r>
+                <a:rPr kumimoji="0" lang="en-US" sz="1600" strike="noStrike" kern="1200" cap="none" spc="0" normalizeH="0" baseline="0" noProof="0" dirty="0">
+                  <a:ln>
+                    <a:noFill/>
+                  </a:ln>
+                  <a:solidFill>
+                    <a:schemeClr val="tx1">
+                      <a:lumMod val="85000"/>
+                      <a:lumOff val="15000"/>
+                    </a:schemeClr>
+                  </a:solidFill>
+                  <a:effectLst/>
+                  <a:uLnTx/>
+                  <a:uFillTx/>
+                  <a:latin typeface="Arial" panose="020B0604020202020204" pitchFamily="34" charset="0"/>
+                  <a:cs typeface="Arial" panose="020B0604020202020204" pitchFamily="34" charset="0"/>
+                </a:rPr>
+                <a:t>www.linkedin.com/in/</a:t>
+              </a:r>
+              <a:r>
+                <a:rPr kumimoji="0" lang="en-US" sz="1600" b="1" strike="noStrike" kern="1200" cap="none" spc="0" normalizeH="0" baseline="0" noProof="0" dirty="0">
+                  <a:ln>
+                    <a:noFill/>
+                  </a:ln>
+                  <a:solidFill>
+                    <a:schemeClr val="tx1">
+                      <a:lumMod val="85000"/>
+                      <a:lumOff val="15000"/>
+                    </a:schemeClr>
+                  </a:solidFill>
+                  <a:effectLst/>
+                  <a:uLnTx/>
+                  <a:uFillTx/>
+                  <a:latin typeface="Arial" panose="020B0604020202020204" pitchFamily="34" charset="0"/>
+                  <a:cs typeface="Arial" panose="020B0604020202020204" pitchFamily="34" charset="0"/>
+                </a:rPr>
+                <a:t>anishmahapatra</a:t>
+              </a:r>
+              <a:br>
+                <a:rPr kumimoji="0" lang="en-US" sz="1600" b="1" strike="noStrike" kern="1200" cap="none" spc="0" normalizeH="0" baseline="0" noProof="0" dirty="0">
+                  <a:ln>
+                    <a:noFill/>
+                  </a:ln>
+                  <a:solidFill>
+                    <a:srgbClr val="00B050"/>
+                  </a:solidFill>
+                  <a:effectLst/>
+                  <a:uLnTx/>
+                  <a:uFillTx/>
+                  <a:latin typeface="Arial" panose="020B0604020202020204" pitchFamily="34" charset="0"/>
+                  <a:cs typeface="Arial" panose="020B0604020202020204" pitchFamily="34" charset="0"/>
+                </a:rPr>
+              </a:br>
+              <a:r>
+                <a:rPr kumimoji="0" lang="en-US" sz="1600" b="1" strike="noStrike" kern="1200" cap="none" spc="0" normalizeH="0" baseline="0" noProof="0" dirty="0">
+                  <a:ln>
+                    <a:noFill/>
+                  </a:ln>
+                  <a:solidFill>
+                    <a:srgbClr val="00B050"/>
+                  </a:solidFill>
+                  <a:effectLst/>
+                  <a:uLnTx/>
+                  <a:uFillTx/>
+                  <a:latin typeface="Arial" panose="020B0604020202020204" pitchFamily="34" charset="0"/>
+                  <a:cs typeface="Arial" panose="020B0604020202020204" pitchFamily="34" charset="0"/>
+                </a:rPr>
+                <a:t>	</a:t>
+              </a:r>
+              <a:r>
+                <a:rPr lang="en-US" sz="1600" b="1" dirty="0">
+                  <a:solidFill>
+                    <a:schemeClr val="tx1">
+                      <a:lumMod val="50000"/>
+                      <a:lumOff val="50000"/>
+                    </a:schemeClr>
+                  </a:solidFill>
+                  <a:latin typeface="Arial" panose="020B0604020202020204" pitchFamily="34" charset="0"/>
+                  <a:cs typeface="Arial" panose="020B0604020202020204" pitchFamily="34" charset="0"/>
+                </a:rPr>
+                <a:t>Medium</a:t>
+              </a:r>
+              <a:r>
+                <a:rPr lang="en-US" sz="1600" b="1" dirty="0">
+                  <a:solidFill>
+                    <a:schemeClr val="tx1">
+                      <a:lumMod val="85000"/>
+                      <a:lumOff val="15000"/>
+                    </a:schemeClr>
+                  </a:solidFill>
+                  <a:latin typeface="Arial" panose="020B0604020202020204" pitchFamily="34" charset="0"/>
+                  <a:cs typeface="Arial" panose="020B0604020202020204" pitchFamily="34" charset="0"/>
+                </a:rPr>
+                <a:t>: anishmahapatra</a:t>
+              </a:r>
+              <a:r>
+                <a:rPr lang="en-US" sz="1600" dirty="0">
+                  <a:solidFill>
+                    <a:schemeClr val="tx1">
+                      <a:lumMod val="85000"/>
+                      <a:lumOff val="15000"/>
+                    </a:schemeClr>
+                  </a:solidFill>
+                  <a:latin typeface="Arial" panose="020B0604020202020204" pitchFamily="34" charset="0"/>
+                  <a:cs typeface="Arial" panose="020B0604020202020204" pitchFamily="34" charset="0"/>
+                </a:rPr>
+                <a:t>.medium.com</a:t>
+              </a:r>
+              <a:br>
+                <a:rPr kumimoji="0" lang="en-US" sz="1600" u="none" strike="noStrike" kern="1200" cap="none" spc="0" normalizeH="0" baseline="0" noProof="0" dirty="0">
+                  <a:ln>
+                    <a:noFill/>
+                  </a:ln>
+                  <a:solidFill>
+                    <a:schemeClr val="tx1">
+                      <a:lumMod val="85000"/>
+                      <a:lumOff val="15000"/>
+                    </a:schemeClr>
+                  </a:solidFill>
+                  <a:effectLst/>
+                  <a:uLnTx/>
+                  <a:uFillTx/>
+                  <a:latin typeface="Arial" panose="020B0604020202020204" pitchFamily="34" charset="0"/>
+                  <a:cs typeface="Arial" panose="020B0604020202020204" pitchFamily="34" charset="0"/>
+                </a:rPr>
+              </a:br>
+              <a:r>
+                <a:rPr kumimoji="0" lang="en-US" sz="1600" u="none" strike="noStrike" kern="1200" cap="none" spc="0" normalizeH="0" baseline="0" noProof="0" dirty="0">
+                  <a:ln>
+                    <a:noFill/>
+                  </a:ln>
+                  <a:solidFill>
+                    <a:schemeClr val="tx1">
+                      <a:lumMod val="85000"/>
+                      <a:lumOff val="15000"/>
+                    </a:schemeClr>
+                  </a:solidFill>
+                  <a:effectLst/>
+                  <a:uLnTx/>
+                  <a:uFillTx/>
+                  <a:latin typeface="Arial" panose="020B0604020202020204" pitchFamily="34" charset="0"/>
+                  <a:cs typeface="Arial" panose="020B0604020202020204" pitchFamily="34" charset="0"/>
+                </a:rPr>
+                <a:t>	</a:t>
+              </a:r>
+              <a:r>
+                <a:rPr lang="en-US" sz="1600" b="1" dirty="0">
+                  <a:solidFill>
+                    <a:schemeClr val="tx1">
+                      <a:lumMod val="50000"/>
+                      <a:lumOff val="50000"/>
+                    </a:schemeClr>
+                  </a:solidFill>
+                  <a:latin typeface="Arial" panose="020B0604020202020204" pitchFamily="34" charset="0"/>
+                  <a:cs typeface="Arial" panose="020B0604020202020204" pitchFamily="34" charset="0"/>
+                </a:rPr>
+                <a:t>Twitter</a:t>
+              </a:r>
+              <a:r>
+                <a:rPr kumimoji="0" lang="en-US" sz="1600" u="none" strike="noStrike" kern="1200" cap="none" spc="0" normalizeH="0" baseline="0" noProof="0" dirty="0">
+                  <a:ln>
+                    <a:noFill/>
+                  </a:ln>
+                  <a:solidFill>
+                    <a:schemeClr val="tx1">
+                      <a:lumMod val="85000"/>
+                      <a:lumOff val="15000"/>
+                    </a:schemeClr>
+                  </a:solidFill>
+                  <a:effectLst/>
+                  <a:uLnTx/>
+                  <a:uFillTx/>
+                  <a:latin typeface="Arial" panose="020B0604020202020204" pitchFamily="34" charset="0"/>
+                  <a:cs typeface="Arial" panose="020B0604020202020204" pitchFamily="34" charset="0"/>
+                </a:rPr>
+                <a:t>: </a:t>
+              </a:r>
+              <a:r>
+                <a:rPr kumimoji="0" lang="en-US" sz="1600" b="1" u="none" strike="noStrike" kern="1200" cap="none" spc="0" normalizeH="0" baseline="0" noProof="0" dirty="0">
+                  <a:ln>
+                    <a:noFill/>
+                  </a:ln>
+                  <a:solidFill>
+                    <a:schemeClr val="tx1">
+                      <a:lumMod val="85000"/>
+                      <a:lumOff val="15000"/>
+                    </a:schemeClr>
+                  </a:solidFill>
+                  <a:effectLst/>
+                  <a:uLnTx/>
+                  <a:uFillTx/>
+                  <a:latin typeface="Arial" panose="020B0604020202020204" pitchFamily="34" charset="0"/>
+                  <a:cs typeface="Arial" panose="020B0604020202020204" pitchFamily="34" charset="0"/>
+                </a:rPr>
+                <a:t>@_anishmahapatra</a:t>
+              </a:r>
+            </a:p>
+            <a:p>
+              <a:pPr marR="0" lvl="0" defTabSz="914400" rtl="0" eaLnBrk="1" fontAlgn="auto" latinLnBrk="0" hangingPunct="1">
+                <a:lnSpc>
+                  <a:spcPct val="150000"/>
+                </a:lnSpc>
+                <a:spcBef>
+                  <a:spcPts val="0"/>
+                </a:spcBef>
+                <a:spcAft>
+                  <a:spcPts val="0"/>
+                </a:spcAft>
+                <a:buClrTx/>
+                <a:buSzTx/>
+                <a:tabLst/>
+                <a:defRPr/>
+              </a:pPr>
+              <a:r>
+                <a:rPr lang="en-US" sz="1600" b="1" dirty="0">
+                  <a:solidFill>
+                    <a:srgbClr val="00B050"/>
+                  </a:solidFill>
+                  <a:latin typeface="Arial" panose="020B0604020202020204" pitchFamily="34" charset="0"/>
+                  <a:cs typeface="Arial" panose="020B0604020202020204" pitchFamily="34" charset="0"/>
+                </a:rPr>
+                <a:t>	</a:t>
+              </a:r>
+              <a:r>
+                <a:rPr lang="en-US" sz="1600" b="1" dirty="0">
+                  <a:solidFill>
+                    <a:schemeClr val="tx1">
+                      <a:lumMod val="50000"/>
+                      <a:lumOff val="50000"/>
+                    </a:schemeClr>
+                  </a:solidFill>
+                  <a:latin typeface="Arial" panose="020B0604020202020204" pitchFamily="34" charset="0"/>
+                  <a:cs typeface="Arial" panose="020B0604020202020204" pitchFamily="34" charset="0"/>
+                </a:rPr>
+                <a:t>GitHub</a:t>
+              </a:r>
+              <a:r>
+                <a:rPr lang="en-US" sz="1600" b="1" dirty="0">
+                  <a:solidFill>
+                    <a:schemeClr val="tx1">
+                      <a:lumMod val="85000"/>
+                      <a:lumOff val="15000"/>
+                    </a:schemeClr>
+                  </a:solidFill>
+                  <a:latin typeface="Arial" panose="020B0604020202020204" pitchFamily="34" charset="0"/>
+                  <a:cs typeface="Arial" panose="020B0604020202020204" pitchFamily="34" charset="0"/>
+                </a:rPr>
+                <a:t>:</a:t>
+              </a:r>
+              <a:r>
+                <a:rPr lang="en-US" sz="1600" b="1" dirty="0">
+                  <a:solidFill>
+                    <a:srgbClr val="00B050"/>
+                  </a:solidFill>
+                  <a:latin typeface="Arial" panose="020B0604020202020204" pitchFamily="34" charset="0"/>
+                  <a:cs typeface="Arial" panose="020B0604020202020204" pitchFamily="34" charset="0"/>
+                </a:rPr>
+                <a:t> </a:t>
+              </a:r>
+              <a:r>
+                <a:rPr lang="en-US" sz="1600" dirty="0">
+                  <a:solidFill>
+                    <a:schemeClr val="tx1">
+                      <a:lumMod val="85000"/>
+                      <a:lumOff val="15000"/>
+                    </a:schemeClr>
+                  </a:solidFill>
+                  <a:latin typeface="Arial" panose="020B0604020202020204" pitchFamily="34" charset="0"/>
+                  <a:cs typeface="Arial" panose="020B0604020202020204" pitchFamily="34" charset="0"/>
+                </a:rPr>
+                <a:t>www.github.com/</a:t>
+              </a:r>
+              <a:r>
+                <a:rPr lang="en-US" sz="1600" b="1" dirty="0">
+                  <a:solidFill>
+                    <a:schemeClr val="tx1">
+                      <a:lumMod val="85000"/>
+                      <a:lumOff val="15000"/>
+                    </a:schemeClr>
+                  </a:solidFill>
+                  <a:latin typeface="Arial" panose="020B0604020202020204" pitchFamily="34" charset="0"/>
+                  <a:cs typeface="Arial" panose="020B0604020202020204" pitchFamily="34" charset="0"/>
+                </a:rPr>
+                <a:t>anishmahapatra</a:t>
+              </a:r>
+            </a:p>
+          </p:txBody>
+        </p:sp>
+        <p:pic>
+          <p:nvPicPr>
+            <p:cNvPr id="5122" name="Picture 2" descr="Linkedin - Free social media icons">
+              <a:extLst>
+                <a:ext uri="{FF2B5EF4-FFF2-40B4-BE49-F238E27FC236}">
+                  <a16:creationId xmlns:a16="http://schemas.microsoft.com/office/drawing/2014/main" id="{4D5F61CE-74F4-4A82-8CE5-2510AA48CC29}"/>
+                </a:ext>
+              </a:extLst>
+            </p:cNvPr>
+            <p:cNvPicPr>
+              <a:picLocks noChangeAspect="1" noChangeArrowheads="1"/>
+            </p:cNvPicPr>
+            <p:nvPr/>
+          </p:nvPicPr>
+          <p:blipFill rotWithShape="1">
+            <a:blip r:embed="rId3">
+              <a:extLst>
+                <a:ext uri="{28A0092B-C50C-407E-A947-70E740481C1C}">
+                  <a14:useLocalDpi xmlns:a14="http://schemas.microsoft.com/office/drawing/2010/main" val="0"/>
+                </a:ext>
+              </a:extLst>
+            </a:blip>
+            <a:srcRect l="23130" t="-1031" r="23755"/>
+            <a:stretch/>
+          </p:blipFill>
+          <p:spPr bwMode="auto">
+            <a:xfrm>
+              <a:off x="963623" y="4880415"/>
+              <a:ext cx="280429" cy="280035"/>
+            </a:xfrm>
+            <a:prstGeom prst="rect">
+              <a:avLst/>
+            </a:prstGeom>
+            <a:noFill/>
+            <a:extLst>
+              <a:ext uri="{909E8E84-426E-40DD-AFC4-6F175D3DCCD1}">
+                <a14:hiddenFill xmlns:a14="http://schemas.microsoft.com/office/drawing/2010/main">
+                  <a:solidFill>
+                    <a:srgbClr val="FFFFFF"/>
+                  </a:solidFill>
+                </a14:hiddenFill>
+              </a:ext>
+            </a:extLst>
+          </p:spPr>
+        </p:pic>
+        <p:pic>
+          <p:nvPicPr>
+            <p:cNvPr id="5128" name="Picture 8" descr="Medium logo | Logok">
+              <a:extLst>
+                <a:ext uri="{FF2B5EF4-FFF2-40B4-BE49-F238E27FC236}">
+                  <a16:creationId xmlns:a16="http://schemas.microsoft.com/office/drawing/2014/main" id="{7E7A7376-C94C-4B53-9B29-28C9969C02C8}"/>
+                </a:ext>
+              </a:extLst>
+            </p:cNvPr>
+            <p:cNvPicPr>
+              <a:picLocks noChangeAspect="1" noChangeArrowheads="1"/>
+            </p:cNvPicPr>
+            <p:nvPr/>
+          </p:nvPicPr>
+          <p:blipFill rotWithShape="1">
+            <a:blip r:embed="rId4">
+              <a:extLst>
+                <a:ext uri="{28A0092B-C50C-407E-A947-70E740481C1C}">
+                  <a14:useLocalDpi xmlns:a14="http://schemas.microsoft.com/office/drawing/2010/main" val="0"/>
+                </a:ext>
+              </a:extLst>
+            </a:blip>
+            <a:srcRect l="19831" t="28005" r="19918" b="27804"/>
+            <a:stretch/>
+          </p:blipFill>
+          <p:spPr bwMode="auto">
+            <a:xfrm>
+              <a:off x="885199" y="5252814"/>
+              <a:ext cx="425103" cy="233850"/>
+            </a:xfrm>
+            <a:prstGeom prst="rect">
+              <a:avLst/>
+            </a:prstGeom>
+            <a:noFill/>
+            <a:extLst>
+              <a:ext uri="{909E8E84-426E-40DD-AFC4-6F175D3DCCD1}">
+                <a14:hiddenFill xmlns:a14="http://schemas.microsoft.com/office/drawing/2010/main">
+                  <a:solidFill>
+                    <a:srgbClr val="FFFFFF"/>
+                  </a:solidFill>
+                </a14:hiddenFill>
+              </a:ext>
+            </a:extLst>
+          </p:spPr>
+        </p:pic>
+        <p:pic>
+          <p:nvPicPr>
+            <p:cNvPr id="5130" name="Picture 10" descr="Twitter Logo transparent PNG - StickPNG">
+              <a:extLst>
+                <a:ext uri="{FF2B5EF4-FFF2-40B4-BE49-F238E27FC236}">
+                  <a16:creationId xmlns:a16="http://schemas.microsoft.com/office/drawing/2014/main" id="{D0410767-7D82-445A-9664-7510342FFA9E}"/>
+                </a:ext>
+              </a:extLst>
+            </p:cNvPr>
+            <p:cNvPicPr>
+              <a:picLocks noChangeAspect="1" noChangeArrowheads="1"/>
+            </p:cNvPicPr>
+            <p:nvPr/>
+          </p:nvPicPr>
+          <p:blipFill rotWithShape="1">
+            <a:blip r:embed="rId5">
+              <a:extLst>
+                <a:ext uri="{28A0092B-C50C-407E-A947-70E740481C1C}">
+                  <a14:useLocalDpi xmlns:a14="http://schemas.microsoft.com/office/drawing/2010/main" val="0"/>
+                </a:ext>
+              </a:extLst>
+            </a:blip>
+            <a:srcRect l="14874" t="19570" r="13943" b="19996"/>
+            <a:stretch/>
+          </p:blipFill>
+          <p:spPr bwMode="auto">
+            <a:xfrm>
+              <a:off x="914677" y="5579028"/>
+              <a:ext cx="366146" cy="310857"/>
+            </a:xfrm>
+            <a:prstGeom prst="rect">
+              <a:avLst/>
+            </a:prstGeom>
+            <a:noFill/>
+            <a:extLst>
+              <a:ext uri="{909E8E84-426E-40DD-AFC4-6F175D3DCCD1}">
+                <a14:hiddenFill xmlns:a14="http://schemas.microsoft.com/office/drawing/2010/main">
+                  <a:solidFill>
+                    <a:srgbClr val="FFFFFF"/>
+                  </a:solidFill>
+                </a14:hiddenFill>
+              </a:ext>
+            </a:extLst>
+          </p:spPr>
+        </p:pic>
+        <p:pic>
+          <p:nvPicPr>
+            <p:cNvPr id="5132" name="Picture 12" descr="Github Logo - Free social media icons">
+              <a:extLst>
+                <a:ext uri="{FF2B5EF4-FFF2-40B4-BE49-F238E27FC236}">
+                  <a16:creationId xmlns:a16="http://schemas.microsoft.com/office/drawing/2014/main" id="{638E600F-B535-4F24-88FA-3874A3F86288}"/>
+                </a:ext>
+              </a:extLst>
+            </p:cNvPr>
+            <p:cNvPicPr>
+              <a:picLocks noChangeAspect="1" noChangeArrowheads="1"/>
+            </p:cNvPicPr>
+            <p:nvPr/>
+          </p:nvPicPr>
+          <p:blipFill>
+            <a:blip r:embed="rId6">
+              <a:extLst>
+                <a:ext uri="{28A0092B-C50C-407E-A947-70E740481C1C}">
+                  <a14:useLocalDpi xmlns:a14="http://schemas.microsoft.com/office/drawing/2010/main" val="0"/>
+                </a:ext>
+              </a:extLst>
+            </a:blip>
+            <a:srcRect/>
+            <a:stretch>
+              <a:fillRect/>
+            </a:stretch>
+          </p:blipFill>
+          <p:spPr bwMode="auto">
+            <a:xfrm>
+              <a:off x="920764" y="5953002"/>
+              <a:ext cx="366146" cy="366146"/>
+            </a:xfrm>
+            <a:prstGeom prst="rect">
+              <a:avLst/>
+            </a:prstGeom>
+            <a:noFill/>
+            <a:extLst>
+              <a:ext uri="{909E8E84-426E-40DD-AFC4-6F175D3DCCD1}">
+                <a14:hiddenFill xmlns:a14="http://schemas.microsoft.com/office/drawing/2010/main">
+                  <a:solidFill>
+                    <a:srgbClr val="FFFFFF"/>
+                  </a:solidFill>
+                </a14:hiddenFill>
+              </a:ext>
+            </a:extLst>
+          </p:spPr>
+        </p:pic>
+        <p:pic>
+          <p:nvPicPr>
+            <p:cNvPr id="5138" name="Picture 18" descr="Ninja, emoji, smiley, emoticon icon - Download on Iconfinder">
+              <a:extLst>
+                <a:ext uri="{FF2B5EF4-FFF2-40B4-BE49-F238E27FC236}">
+                  <a16:creationId xmlns:a16="http://schemas.microsoft.com/office/drawing/2014/main" id="{0F5DE76F-0D81-4A35-A4F5-CA04A5DC65A9}"/>
+                </a:ext>
+              </a:extLst>
+            </p:cNvPr>
+            <p:cNvPicPr>
+              <a:picLocks noChangeAspect="1" noChangeArrowheads="1"/>
+            </p:cNvPicPr>
+            <p:nvPr/>
+          </p:nvPicPr>
+          <p:blipFill rotWithShape="1">
+            <a:blip r:embed="rId7">
+              <a:extLst>
+                <a:ext uri="{28A0092B-C50C-407E-A947-70E740481C1C}">
+                  <a14:useLocalDpi xmlns:a14="http://schemas.microsoft.com/office/drawing/2010/main" val="0"/>
+                </a:ext>
+              </a:extLst>
+            </a:blip>
+            <a:srcRect l="2604" t="4688" r="2865" b="10676"/>
+            <a:stretch/>
+          </p:blipFill>
+          <p:spPr bwMode="auto">
+            <a:xfrm>
+              <a:off x="3053911" y="4389376"/>
+              <a:ext cx="425103" cy="380602"/>
+            </a:xfrm>
+            <a:prstGeom prst="rect">
+              <a:avLst/>
+            </a:prstGeom>
+            <a:noFill/>
+            <a:extLst>
+              <a:ext uri="{909E8E84-426E-40DD-AFC4-6F175D3DCCD1}">
+                <a14:hiddenFill xmlns:a14="http://schemas.microsoft.com/office/drawing/2010/main">
+                  <a:solidFill>
+                    <a:srgbClr val="FFFFFF"/>
+                  </a:solidFill>
+                </a14:hiddenFill>
+              </a:ext>
+            </a:extLst>
+          </p:spPr>
+        </p:pic>
+      </p:grpSp>
       <p:sp>
         <p:nvSpPr>
           <p:cNvPr id="39" name="TextBox 38">
@@ -6141,7 +6964,7 @@
         </p:nvSpPr>
         <p:spPr>
           <a:xfrm>
-            <a:off x="8136482" y="5043100"/>
+            <a:off x="7210080" y="4294644"/>
             <a:ext cx="4055518" cy="785151"/>
           </a:xfrm>
           <a:prstGeom prst="rect">
@@ -6255,6 +7078,333 @@
           </a:p>
         </p:txBody>
       </p:sp>
+      <p:grpSp>
+        <p:nvGrpSpPr>
+          <p:cNvPr id="4" name="Group 3">
+            <a:extLst>
+              <a:ext uri="{FF2B5EF4-FFF2-40B4-BE49-F238E27FC236}">
+                <a16:creationId xmlns:a16="http://schemas.microsoft.com/office/drawing/2014/main" id="{6DBF6F85-4B77-418B-A024-8E7655314032}"/>
+              </a:ext>
+            </a:extLst>
+          </p:cNvPr>
+          <p:cNvGrpSpPr/>
+          <p:nvPr/>
+        </p:nvGrpSpPr>
+        <p:grpSpPr>
+          <a:xfrm>
+            <a:off x="7210080" y="5750012"/>
+            <a:ext cx="3752701" cy="675537"/>
+            <a:chOff x="7637634" y="4219855"/>
+            <a:chExt cx="3752701" cy="675537"/>
+          </a:xfrm>
+        </p:grpSpPr>
+        <p:pic>
+          <p:nvPicPr>
+            <p:cNvPr id="2050" name="Picture 2" descr="International Institute of Information Technology, Bangalore - Wikipedia">
+              <a:extLst>
+                <a:ext uri="{FF2B5EF4-FFF2-40B4-BE49-F238E27FC236}">
+                  <a16:creationId xmlns:a16="http://schemas.microsoft.com/office/drawing/2014/main" id="{5DDAA93B-B836-48AA-A725-F7A0AC81A612}"/>
+                </a:ext>
+              </a:extLst>
+            </p:cNvPr>
+            <p:cNvPicPr>
+              <a:picLocks noChangeAspect="1" noChangeArrowheads="1"/>
+            </p:cNvPicPr>
+            <p:nvPr/>
+          </p:nvPicPr>
+          <p:blipFill>
+            <a:blip r:embed="rId8">
+              <a:extLst>
+                <a:ext uri="{28A0092B-C50C-407E-A947-70E740481C1C}">
+                  <a14:useLocalDpi xmlns:a14="http://schemas.microsoft.com/office/drawing/2010/main" val="0"/>
+                </a:ext>
+              </a:extLst>
+            </a:blip>
+            <a:srcRect/>
+            <a:stretch>
+              <a:fillRect/>
+            </a:stretch>
+          </p:blipFill>
+          <p:spPr bwMode="auto">
+            <a:xfrm>
+              <a:off x="8233283" y="4219855"/>
+              <a:ext cx="825500" cy="675537"/>
+            </a:xfrm>
+            <a:prstGeom prst="rect">
+              <a:avLst/>
+            </a:prstGeom>
+            <a:noFill/>
+            <a:extLst>
+              <a:ext uri="{909E8E84-426E-40DD-AFC4-6F175D3DCCD1}">
+                <a14:hiddenFill xmlns:a14="http://schemas.microsoft.com/office/drawing/2010/main">
+                  <a:solidFill>
+                    <a:srgbClr val="FFFFFF"/>
+                  </a:solidFill>
+                </a14:hiddenFill>
+              </a:ext>
+            </a:extLst>
+          </p:spPr>
+        </p:pic>
+        <p:pic>
+          <p:nvPicPr>
+            <p:cNvPr id="2054" name="Picture 6" descr="King&amp;#39;s College London Clinical Research Fellowship 2021 | Opportunity Desk">
+              <a:extLst>
+                <a:ext uri="{FF2B5EF4-FFF2-40B4-BE49-F238E27FC236}">
+                  <a16:creationId xmlns:a16="http://schemas.microsoft.com/office/drawing/2014/main" id="{84A6F731-F67D-4675-A915-71FAE1B1D0CD}"/>
+                </a:ext>
+              </a:extLst>
+            </p:cNvPr>
+            <p:cNvPicPr>
+              <a:picLocks noChangeAspect="1" noChangeArrowheads="1"/>
+            </p:cNvPicPr>
+            <p:nvPr/>
+          </p:nvPicPr>
+          <p:blipFill>
+            <a:blip r:embed="rId9">
+              <a:extLst>
+                <a:ext uri="{28A0092B-C50C-407E-A947-70E740481C1C}">
+                  <a14:useLocalDpi xmlns:a14="http://schemas.microsoft.com/office/drawing/2010/main" val="0"/>
+                </a:ext>
+              </a:extLst>
+            </a:blip>
+            <a:srcRect/>
+            <a:stretch>
+              <a:fillRect/>
+            </a:stretch>
+          </p:blipFill>
+          <p:spPr bwMode="auto">
+            <a:xfrm>
+              <a:off x="10359918" y="4287943"/>
+              <a:ext cx="1030417" cy="539359"/>
+            </a:xfrm>
+            <a:prstGeom prst="rect">
+              <a:avLst/>
+            </a:prstGeom>
+            <a:noFill/>
+            <a:extLst>
+              <a:ext uri="{909E8E84-426E-40DD-AFC4-6F175D3DCCD1}">
+                <a14:hiddenFill xmlns:a14="http://schemas.microsoft.com/office/drawing/2010/main">
+                  <a:solidFill>
+                    <a:srgbClr val="FFFFFF"/>
+                  </a:solidFill>
+                </a14:hiddenFill>
+              </a:ext>
+            </a:extLst>
+          </p:spPr>
+        </p:pic>
+        <p:pic>
+          <p:nvPicPr>
+            <p:cNvPr id="2056" name="Picture 8" descr="Manipal Academy of Higher Education (MAHEMET) My Careers View - India&amp;#39;s  Best College, School and Consultant">
+              <a:extLst>
+                <a:ext uri="{FF2B5EF4-FFF2-40B4-BE49-F238E27FC236}">
+                  <a16:creationId xmlns:a16="http://schemas.microsoft.com/office/drawing/2014/main" id="{0A9DF6BE-3E93-4F7D-A5B7-0A7F48AD1129}"/>
+                </a:ext>
+              </a:extLst>
+            </p:cNvPr>
+            <p:cNvPicPr>
+              <a:picLocks noChangeAspect="1" noChangeArrowheads="1"/>
+            </p:cNvPicPr>
+            <p:nvPr/>
+          </p:nvPicPr>
+          <p:blipFill>
+            <a:blip r:embed="rId10">
+              <a:extLst>
+                <a:ext uri="{28A0092B-C50C-407E-A947-70E740481C1C}">
+                  <a14:useLocalDpi xmlns:a14="http://schemas.microsoft.com/office/drawing/2010/main" val="0"/>
+                </a:ext>
+              </a:extLst>
+            </a:blip>
+            <a:srcRect/>
+            <a:stretch>
+              <a:fillRect/>
+            </a:stretch>
+          </p:blipFill>
+          <p:spPr bwMode="auto">
+            <a:xfrm>
+              <a:off x="7637634" y="4279500"/>
+              <a:ext cx="548493" cy="548493"/>
+            </a:xfrm>
+            <a:prstGeom prst="rect">
+              <a:avLst/>
+            </a:prstGeom>
+            <a:noFill/>
+            <a:extLst>
+              <a:ext uri="{909E8E84-426E-40DD-AFC4-6F175D3DCCD1}">
+                <a14:hiddenFill xmlns:a14="http://schemas.microsoft.com/office/drawing/2010/main">
+                  <a:solidFill>
+                    <a:srgbClr val="FFFFFF"/>
+                  </a:solidFill>
+                </a14:hiddenFill>
+              </a:ext>
+            </a:extLst>
+          </p:spPr>
+        </p:pic>
+        <p:pic>
+          <p:nvPicPr>
+            <p:cNvPr id="2058" name="Picture 10" descr="Liverpool John Moores University - Rankings, Courses, Acceptance Rate">
+              <a:extLst>
+                <a:ext uri="{FF2B5EF4-FFF2-40B4-BE49-F238E27FC236}">
+                  <a16:creationId xmlns:a16="http://schemas.microsoft.com/office/drawing/2014/main" id="{A8D7814D-E5D1-42D5-8152-3A796B623889}"/>
+                </a:ext>
+              </a:extLst>
+            </p:cNvPr>
+            <p:cNvPicPr>
+              <a:picLocks noChangeAspect="1" noChangeArrowheads="1"/>
+            </p:cNvPicPr>
+            <p:nvPr/>
+          </p:nvPicPr>
+          <p:blipFill>
+            <a:blip r:embed="rId11">
+              <a:extLst>
+                <a:ext uri="{28A0092B-C50C-407E-A947-70E740481C1C}">
+                  <a14:useLocalDpi xmlns:a14="http://schemas.microsoft.com/office/drawing/2010/main" val="0"/>
+                </a:ext>
+              </a:extLst>
+            </a:blip>
+            <a:srcRect/>
+            <a:stretch>
+              <a:fillRect/>
+            </a:stretch>
+          </p:blipFill>
+          <p:spPr bwMode="auto">
+            <a:xfrm>
+              <a:off x="9058783" y="4278809"/>
+              <a:ext cx="1301135" cy="539359"/>
+            </a:xfrm>
+            <a:prstGeom prst="rect">
+              <a:avLst/>
+            </a:prstGeom>
+            <a:noFill/>
+            <a:extLst>
+              <a:ext uri="{909E8E84-426E-40DD-AFC4-6F175D3DCCD1}">
+                <a14:hiddenFill xmlns:a14="http://schemas.microsoft.com/office/drawing/2010/main">
+                  <a:solidFill>
+                    <a:srgbClr val="FFFFFF"/>
+                  </a:solidFill>
+                </a14:hiddenFill>
+              </a:ext>
+            </a:extLst>
+          </p:spPr>
+        </p:pic>
+      </p:grpSp>
+      <p:sp>
+        <p:nvSpPr>
+          <p:cNvPr id="28" name="Rectangle 27">
+            <a:extLst>
+              <a:ext uri="{FF2B5EF4-FFF2-40B4-BE49-F238E27FC236}">
+                <a16:creationId xmlns:a16="http://schemas.microsoft.com/office/drawing/2014/main" id="{FB8BC6AF-9A6B-46DF-9CB9-BC6FECD39643}"/>
+              </a:ext>
+            </a:extLst>
+          </p:cNvPr>
+          <p:cNvSpPr/>
+          <p:nvPr/>
+        </p:nvSpPr>
+        <p:spPr>
+          <a:xfrm>
+            <a:off x="7235479" y="5767068"/>
+            <a:ext cx="3892580" cy="581257"/>
+          </a:xfrm>
+          <a:prstGeom prst="rect">
+            <a:avLst/>
+          </a:prstGeom>
+          <a:solidFill>
+            <a:schemeClr val="bg1">
+              <a:alpha val="18000"/>
+            </a:schemeClr>
+          </a:solidFill>
+          <a:ln>
+            <a:solidFill>
+              <a:schemeClr val="bg1"/>
+            </a:solidFill>
+          </a:ln>
+        </p:spPr>
+        <p:style>
+          <a:lnRef idx="2">
+            <a:schemeClr val="accent1">
+              <a:shade val="50000"/>
+            </a:schemeClr>
+          </a:lnRef>
+          <a:fillRef idx="1">
+            <a:schemeClr val="accent1"/>
+          </a:fillRef>
+          <a:effectRef idx="0">
+            <a:schemeClr val="accent1"/>
+          </a:effectRef>
+          <a:fontRef idx="minor">
+            <a:schemeClr val="lt1"/>
+          </a:fontRef>
+        </p:style>
+        <p:txBody>
+          <a:bodyPr rtlCol="0" anchor="ctr"/>
+          <a:lstStyle/>
+          <a:p>
+            <a:pPr algn="ctr"/>
+            <a:endParaRPr lang="en-US" dirty="0">
+              <a:latin typeface="Arial" panose="020B0604020202020204" pitchFamily="34" charset="0"/>
+              <a:cs typeface="Arial" panose="020B0604020202020204" pitchFamily="34" charset="0"/>
+            </a:endParaRPr>
+          </a:p>
+        </p:txBody>
+      </p:sp>
+      <p:sp>
+        <p:nvSpPr>
+          <p:cNvPr id="30" name="Rectangle 29">
+            <a:extLst>
+              <a:ext uri="{FF2B5EF4-FFF2-40B4-BE49-F238E27FC236}">
+                <a16:creationId xmlns:a16="http://schemas.microsoft.com/office/drawing/2014/main" id="{72282F46-A8BC-4545-9816-24CD5214F82D}"/>
+              </a:ext>
+            </a:extLst>
+          </p:cNvPr>
+          <p:cNvSpPr/>
+          <p:nvPr/>
+        </p:nvSpPr>
+        <p:spPr>
+          <a:xfrm>
+            <a:off x="7235479" y="5720728"/>
+            <a:ext cx="3892580" cy="581257"/>
+          </a:xfrm>
+          <a:prstGeom prst="rect">
+            <a:avLst/>
+          </a:prstGeom>
+          <a:solidFill>
+            <a:schemeClr val="bg1">
+              <a:alpha val="18000"/>
+            </a:schemeClr>
+          </a:solidFill>
+          <a:ln>
+            <a:solidFill>
+              <a:schemeClr val="bg1"/>
+            </a:solidFill>
+          </a:ln>
+        </p:spPr>
+        <p:style>
+          <a:lnRef idx="2">
+            <a:schemeClr val="accent1">
+              <a:shade val="50000"/>
+            </a:schemeClr>
+          </a:lnRef>
+          <a:fillRef idx="1">
+            <a:schemeClr val="accent1"/>
+          </a:fillRef>
+          <a:effectRef idx="0">
+            <a:schemeClr val="accent1"/>
+          </a:effectRef>
+          <a:fontRef idx="minor">
+            <a:schemeClr val="lt1"/>
+          </a:fontRef>
+        </p:style>
+        <p:txBody>
+          <a:bodyPr rtlCol="0" anchor="ctr"/>
+          <a:lstStyle/>
+          <a:p>
+            <a:pPr algn="ctr"/>
+            <a:endParaRPr lang="en-US" dirty="0">
+              <a:latin typeface="Arial" panose="020B0604020202020204" pitchFamily="34" charset="0"/>
+              <a:cs typeface="Arial" panose="020B0604020202020204" pitchFamily="34" charset="0"/>
+            </a:endParaRPr>
+          </a:p>
+        </p:txBody>
+      </p:sp>
     </p:spTree>
     <p:extLst>
       <p:ext uri="{BB962C8B-B14F-4D97-AF65-F5344CB8AC3E}">
@@ -7121,7 +8271,7 @@
                   <a:latin typeface="Arial" panose="020B0604020202020204" pitchFamily="34" charset="0"/>
                   <a:cs typeface="Arial" panose="020B0604020202020204" pitchFamily="34" charset="0"/>
                 </a:rPr>
-                <a:t>Phase 0, Phase 1, Phase 2 and Phase 3 followed by evaluation of Marketing Authorization</a:t>
+                <a:t>Phase 1, Phase 2, Phase 3 and Phase 4 followed by evaluation of Marketing Authorization</a:t>
               </a:r>
             </a:p>
           </p:txBody>
@@ -7397,7 +8547,6 @@
             </a:bodyPr>
             <a:lstStyle/>
             <a:p>
-              <a:pPr algn="just"/>
               <a:r>
                 <a:rPr lang="en-US" sz="1330" dirty="0">
                   <a:solidFill>
@@ -7596,7 +8745,6 @@
             </a:bodyPr>
             <a:lstStyle/>
             <a:p>
-              <a:pPr algn="just"/>
               <a:r>
                 <a:rPr lang="en-US" sz="1330" dirty="0">
                   <a:solidFill>
@@ -9279,6 +10427,410 @@
           <p:cNvPr id="3" name="TextBox 2">
             <a:extLst>
               <a:ext uri="{FF2B5EF4-FFF2-40B4-BE49-F238E27FC236}">
+                <a16:creationId xmlns:a16="http://schemas.microsoft.com/office/drawing/2014/main" id="{7CADEC2A-1BDB-4059-95B4-EED0F6442762}"/>
+              </a:ext>
+            </a:extLst>
+          </p:cNvPr>
+          <p:cNvSpPr txBox="1"/>
+          <p:nvPr/>
+        </p:nvSpPr>
+        <p:spPr>
+          <a:xfrm>
+            <a:off x="396852" y="283882"/>
+            <a:ext cx="6383775" cy="707886"/>
+          </a:xfrm>
+          <a:prstGeom prst="rect">
+            <a:avLst/>
+          </a:prstGeom>
+          <a:noFill/>
+        </p:spPr>
+        <p:txBody>
+          <a:bodyPr wrap="square" rtlCol="0">
+            <a:spAutoFit/>
+          </a:bodyPr>
+          <a:lstStyle/>
+          <a:p>
+            <a:pPr marL="0" marR="0" lvl="0" indent="0" defTabSz="914400" rtl="0" eaLnBrk="1" fontAlgn="auto" latinLnBrk="0" hangingPunct="1">
+              <a:lnSpc>
+                <a:spcPct val="100000"/>
+              </a:lnSpc>
+              <a:spcBef>
+                <a:spcPts val="0"/>
+              </a:spcBef>
+              <a:spcAft>
+                <a:spcPts val="0"/>
+              </a:spcAft>
+              <a:buClrTx/>
+              <a:buSzTx/>
+              <a:buFontTx/>
+              <a:buNone/>
+              <a:tabLst/>
+              <a:defRPr/>
+            </a:pPr>
+            <a:r>
+              <a:rPr kumimoji="0" lang="en-US" sz="3900" b="1" i="0" u="none" strike="noStrike" kern="1200" cap="none" spc="0" normalizeH="0" baseline="0" noProof="0" dirty="0">
+                <a:ln>
+                  <a:noFill/>
+                </a:ln>
+                <a:solidFill>
+                  <a:schemeClr val="accent1">
+                    <a:lumMod val="75000"/>
+                  </a:schemeClr>
+                </a:solidFill>
+                <a:effectLst/>
+                <a:uLnTx/>
+                <a:uFillTx/>
+                <a:latin typeface="Arial" panose="020B0604020202020204" pitchFamily="34" charset="0"/>
+                <a:cs typeface="Arial" panose="020B0604020202020204" pitchFamily="34" charset="0"/>
+              </a:rPr>
+              <a:t>The Pharma Industry</a:t>
+            </a:r>
+            <a:endParaRPr kumimoji="0" lang="en-US" sz="3900" b="0" i="0" u="none" strike="noStrike" kern="1200" cap="none" spc="0" normalizeH="0" baseline="0" noProof="0" dirty="0">
+              <a:ln>
+                <a:noFill/>
+              </a:ln>
+              <a:solidFill>
+                <a:schemeClr val="accent1">
+                  <a:lumMod val="75000"/>
+                </a:schemeClr>
+              </a:solidFill>
+              <a:effectLst/>
+              <a:uLnTx/>
+              <a:uFillTx/>
+              <a:latin typeface="Arial" panose="020B0604020202020204" pitchFamily="34" charset="0"/>
+              <a:cs typeface="Arial" panose="020B0604020202020204" pitchFamily="34" charset="0"/>
+            </a:endParaRPr>
+          </a:p>
+        </p:txBody>
+      </p:sp>
+      <p:sp>
+        <p:nvSpPr>
+          <p:cNvPr id="114" name="Rectangle 113">
+            <a:extLst>
+              <a:ext uri="{FF2B5EF4-FFF2-40B4-BE49-F238E27FC236}">
+                <a16:creationId xmlns:a16="http://schemas.microsoft.com/office/drawing/2014/main" id="{7C4D96D9-1C53-4FFF-98F4-377B26168DC9}"/>
+              </a:ext>
+            </a:extLst>
+          </p:cNvPr>
+          <p:cNvSpPr/>
+          <p:nvPr/>
+        </p:nvSpPr>
+        <p:spPr>
+          <a:xfrm>
+            <a:off x="1" y="862"/>
+            <a:ext cx="755650" cy="219832"/>
+          </a:xfrm>
+          <a:prstGeom prst="rect">
+            <a:avLst/>
+          </a:prstGeom>
+          <a:solidFill>
+            <a:schemeClr val="accent3">
+              <a:lumMod val="75000"/>
+              <a:alpha val="16000"/>
+            </a:schemeClr>
+          </a:solidFill>
+          <a:ln>
+            <a:solidFill>
+              <a:schemeClr val="accent3">
+                <a:lumMod val="75000"/>
+                <a:alpha val="10000"/>
+              </a:schemeClr>
+            </a:solidFill>
+          </a:ln>
+        </p:spPr>
+        <p:style>
+          <a:lnRef idx="2">
+            <a:schemeClr val="accent1">
+              <a:shade val="50000"/>
+            </a:schemeClr>
+          </a:lnRef>
+          <a:fillRef idx="1">
+            <a:schemeClr val="accent1"/>
+          </a:fillRef>
+          <a:effectRef idx="0">
+            <a:schemeClr val="accent1"/>
+          </a:effectRef>
+          <a:fontRef idx="minor">
+            <a:schemeClr val="lt1"/>
+          </a:fontRef>
+        </p:style>
+        <p:txBody>
+          <a:bodyPr rtlCol="0" anchor="ctr"/>
+          <a:lstStyle/>
+          <a:p>
+            <a:pPr algn="ctr"/>
+            <a:endParaRPr lang="en-US" dirty="0">
+              <a:latin typeface="Arial" panose="020B0604020202020204" pitchFamily="34" charset="0"/>
+              <a:cs typeface="Arial" panose="020B0604020202020204" pitchFamily="34" charset="0"/>
+            </a:endParaRPr>
+          </a:p>
+        </p:txBody>
+      </p:sp>
+      <p:sp>
+        <p:nvSpPr>
+          <p:cNvPr id="115" name="TextBox 114">
+            <a:extLst>
+              <a:ext uri="{FF2B5EF4-FFF2-40B4-BE49-F238E27FC236}">
+                <a16:creationId xmlns:a16="http://schemas.microsoft.com/office/drawing/2014/main" id="{2FFB4B09-C828-4C39-B911-7834712B60D7}"/>
+              </a:ext>
+            </a:extLst>
+          </p:cNvPr>
+          <p:cNvSpPr txBox="1"/>
+          <p:nvPr/>
+        </p:nvSpPr>
+        <p:spPr>
+          <a:xfrm>
+            <a:off x="19027" y="-34170"/>
+            <a:ext cx="736624" cy="254109"/>
+          </a:xfrm>
+          <a:prstGeom prst="rect">
+            <a:avLst/>
+          </a:prstGeom>
+          <a:noFill/>
+        </p:spPr>
+        <p:txBody>
+          <a:bodyPr wrap="square" rtlCol="0">
+            <a:spAutoFit/>
+          </a:bodyPr>
+          <a:lstStyle/>
+          <a:p>
+            <a:pPr marR="0" lvl="0" defTabSz="914400" rtl="0" eaLnBrk="1" fontAlgn="auto" latinLnBrk="0" hangingPunct="1">
+              <a:lnSpc>
+                <a:spcPct val="150000"/>
+              </a:lnSpc>
+              <a:spcBef>
+                <a:spcPts val="0"/>
+              </a:spcBef>
+              <a:spcAft>
+                <a:spcPts val="0"/>
+              </a:spcAft>
+              <a:buClrTx/>
+              <a:buSzTx/>
+              <a:tabLst/>
+              <a:defRPr/>
+            </a:pPr>
+            <a:r>
+              <a:rPr lang="en-US" sz="800" dirty="0">
+                <a:solidFill>
+                  <a:schemeClr val="tx1">
+                    <a:lumMod val="65000"/>
+                    <a:lumOff val="35000"/>
+                  </a:schemeClr>
+                </a:solidFill>
+                <a:latin typeface="Arial" panose="020B0604020202020204" pitchFamily="34" charset="0"/>
+                <a:cs typeface="Arial" panose="020B0604020202020204" pitchFamily="34" charset="0"/>
+              </a:rPr>
+              <a:t>Topic 2 of 6</a:t>
+            </a:r>
+          </a:p>
+        </p:txBody>
+      </p:sp>
+      <p:grpSp>
+        <p:nvGrpSpPr>
+          <p:cNvPr id="4" name="Group 3">
+            <a:extLst>
+              <a:ext uri="{FF2B5EF4-FFF2-40B4-BE49-F238E27FC236}">
+                <a16:creationId xmlns:a16="http://schemas.microsoft.com/office/drawing/2014/main" id="{2E5160B4-06D3-4ACC-8966-8ABFFD22D597}"/>
+              </a:ext>
+            </a:extLst>
+          </p:cNvPr>
+          <p:cNvGrpSpPr/>
+          <p:nvPr/>
+        </p:nvGrpSpPr>
+        <p:grpSpPr>
+          <a:xfrm>
+            <a:off x="1045028" y="1364566"/>
+            <a:ext cx="10054381" cy="4670474"/>
+            <a:chOff x="1045028" y="1364566"/>
+            <a:chExt cx="10054381" cy="4670474"/>
+          </a:xfrm>
+        </p:grpSpPr>
+        <p:pic>
+          <p:nvPicPr>
+            <p:cNvPr id="1026" name="Picture 2" descr="Pharmacy Benefit Managers cut access to necessary treatments">
+              <a:extLst>
+                <a:ext uri="{FF2B5EF4-FFF2-40B4-BE49-F238E27FC236}">
+                  <a16:creationId xmlns:a16="http://schemas.microsoft.com/office/drawing/2014/main" id="{57A6D54E-9843-41FB-B92F-DEAE193B6604}"/>
+                </a:ext>
+              </a:extLst>
+            </p:cNvPr>
+            <p:cNvPicPr>
+              <a:picLocks noChangeAspect="1" noChangeArrowheads="1"/>
+            </p:cNvPicPr>
+            <p:nvPr/>
+          </p:nvPicPr>
+          <p:blipFill rotWithShape="1">
+            <a:blip r:embed="rId3">
+              <a:extLst>
+                <a:ext uri="{28A0092B-C50C-407E-A947-70E740481C1C}">
+                  <a14:useLocalDpi xmlns:a14="http://schemas.microsoft.com/office/drawing/2010/main" val="0"/>
+                </a:ext>
+              </a:extLst>
+            </a:blip>
+            <a:srcRect t="2695" r="471" b="1088"/>
+            <a:stretch/>
+          </p:blipFill>
+          <p:spPr bwMode="auto">
+            <a:xfrm>
+              <a:off x="1045028" y="1364566"/>
+              <a:ext cx="10054381" cy="4670474"/>
+            </a:xfrm>
+            <a:prstGeom prst="rect">
+              <a:avLst/>
+            </a:prstGeom>
+            <a:noFill/>
+            <a:extLst>
+              <a:ext uri="{909E8E84-426E-40DD-AFC4-6F175D3DCCD1}">
+                <a14:hiddenFill xmlns:a14="http://schemas.microsoft.com/office/drawing/2010/main">
+                  <a:solidFill>
+                    <a:srgbClr val="FFFFFF"/>
+                  </a:solidFill>
+                </a14:hiddenFill>
+              </a:ext>
+            </a:extLst>
+          </p:spPr>
+        </p:pic>
+        <p:pic>
+          <p:nvPicPr>
+            <p:cNvPr id="2" name="Picture 1">
+              <a:extLst>
+                <a:ext uri="{FF2B5EF4-FFF2-40B4-BE49-F238E27FC236}">
+                  <a16:creationId xmlns:a16="http://schemas.microsoft.com/office/drawing/2014/main" id="{A04969E2-A7C4-4888-9F93-3128C339E1BD}"/>
+                </a:ext>
+              </a:extLst>
+            </p:cNvPr>
+            <p:cNvPicPr>
+              <a:picLocks noChangeAspect="1"/>
+            </p:cNvPicPr>
+            <p:nvPr/>
+          </p:nvPicPr>
+          <p:blipFill>
+            <a:blip r:embed="rId4"/>
+            <a:stretch>
+              <a:fillRect/>
+            </a:stretch>
+          </p:blipFill>
+          <p:spPr>
+            <a:xfrm>
+              <a:off x="8636000" y="5715000"/>
+              <a:ext cx="2463409" cy="320040"/>
+            </a:xfrm>
+            <a:prstGeom prst="rect">
+              <a:avLst/>
+            </a:prstGeom>
+          </p:spPr>
+        </p:pic>
+        <p:pic>
+          <p:nvPicPr>
+            <p:cNvPr id="37" name="Picture 36">
+              <a:extLst>
+                <a:ext uri="{FF2B5EF4-FFF2-40B4-BE49-F238E27FC236}">
+                  <a16:creationId xmlns:a16="http://schemas.microsoft.com/office/drawing/2014/main" id="{8C0B03A1-5495-415C-B89C-834518183610}"/>
+                </a:ext>
+              </a:extLst>
+            </p:cNvPr>
+            <p:cNvPicPr>
+              <a:picLocks noChangeAspect="1"/>
+            </p:cNvPicPr>
+            <p:nvPr/>
+          </p:nvPicPr>
+          <p:blipFill>
+            <a:blip r:embed="rId4"/>
+            <a:stretch>
+              <a:fillRect/>
+            </a:stretch>
+          </p:blipFill>
+          <p:spPr>
+            <a:xfrm>
+              <a:off x="1145401" y="5715000"/>
+              <a:ext cx="2463409" cy="320040"/>
+            </a:xfrm>
+            <a:prstGeom prst="rect">
+              <a:avLst/>
+            </a:prstGeom>
+          </p:spPr>
+        </p:pic>
+      </p:grpSp>
+      <p:sp>
+        <p:nvSpPr>
+          <p:cNvPr id="39" name="Footer Text">
+            <a:extLst>
+              <a:ext uri="{FF2B5EF4-FFF2-40B4-BE49-F238E27FC236}">
+                <a16:creationId xmlns:a16="http://schemas.microsoft.com/office/drawing/2014/main" id="{78810A51-6E0B-4229-91A9-C3942399E66F}"/>
+              </a:ext>
+            </a:extLst>
+          </p:cNvPr>
+          <p:cNvSpPr txBox="1"/>
+          <p:nvPr/>
+        </p:nvSpPr>
+        <p:spPr>
+          <a:xfrm>
+            <a:off x="4463344" y="6146079"/>
+            <a:ext cx="3265311" cy="276999"/>
+          </a:xfrm>
+          <a:prstGeom prst="rect">
+            <a:avLst/>
+          </a:prstGeom>
+          <a:noFill/>
+        </p:spPr>
+        <p:txBody>
+          <a:bodyPr wrap="square" lIns="0" tIns="0" rIns="0" bIns="0" rtlCol="0">
+            <a:spAutoFit/>
+          </a:bodyPr>
+          <a:lstStyle/>
+          <a:p>
+            <a:pPr algn="ctr"/>
+            <a:r>
+              <a:rPr lang="en-US" b="1" dirty="0">
+                <a:solidFill>
+                  <a:schemeClr val="tx1">
+                    <a:lumMod val="85000"/>
+                    <a:lumOff val="15000"/>
+                  </a:schemeClr>
+                </a:solidFill>
+                <a:latin typeface="Arial" panose="020B0604020202020204" pitchFamily="34" charset="0"/>
+                <a:cs typeface="Arial" panose="020B0604020202020204" pitchFamily="34" charset="0"/>
+              </a:rPr>
+              <a:t>The Pharma pricing lifecycle</a:t>
+            </a:r>
+          </a:p>
+        </p:txBody>
+      </p:sp>
+    </p:spTree>
+    <p:extLst>
+      <p:ext uri="{BB962C8B-B14F-4D97-AF65-F5344CB8AC3E}">
+        <p14:creationId xmlns:p14="http://schemas.microsoft.com/office/powerpoint/2010/main" val="2504362630"/>
+      </p:ext>
+    </p:extLst>
+  </p:cSld>
+  <p:clrMapOvr>
+    <a:masterClrMapping/>
+  </p:clrMapOvr>
+</p:sld>
+</file>
+
+<file path=ppt/slides/slide6.xml><?xml version="1.0" encoding="utf-8"?>
+<p:sld xmlns:a="http://schemas.openxmlformats.org/drawingml/2006/main" xmlns:r="http://schemas.openxmlformats.org/officeDocument/2006/relationships" xmlns:p="http://schemas.openxmlformats.org/presentationml/2006/main">
+  <p:cSld>
+    <p:spTree>
+      <p:nvGrpSpPr>
+        <p:cNvPr id="1" name=""/>
+        <p:cNvGrpSpPr/>
+        <p:nvPr/>
+      </p:nvGrpSpPr>
+      <p:grpSpPr>
+        <a:xfrm>
+          <a:off x="0" y="0"/>
+          <a:ext cx="0" cy="0"/>
+          <a:chOff x="0" y="0"/>
+          <a:chExt cx="0" cy="0"/>
+        </a:xfrm>
+      </p:grpSpPr>
+      <p:sp>
+        <p:nvSpPr>
+          <p:cNvPr id="3" name="TextBox 2">
+            <a:extLst>
+              <a:ext uri="{FF2B5EF4-FFF2-40B4-BE49-F238E27FC236}">
                 <a16:creationId xmlns:a16="http://schemas.microsoft.com/office/drawing/2014/main" id="{8F11F78B-85E5-4BAF-AB3B-897FE9E807C5}"/>
               </a:ext>
             </a:extLst>
@@ -10320,7 +11872,7 @@
               <a:defRPr/>
             </a:pPr>
             <a:r>
-              <a:rPr lang="en-US" sz="1400" b="1" dirty="0">
+              <a:rPr lang="en-US" sz="1400" dirty="0">
                 <a:solidFill>
                   <a:schemeClr val="tx1">
                     <a:lumMod val="65000"/>
@@ -10341,7 +11893,7 @@
               <a:defRPr/>
             </a:pPr>
             <a:r>
-              <a:rPr lang="en-US" sz="1400" b="1" dirty="0">
+              <a:rPr lang="en-US" sz="1400" dirty="0">
                 <a:solidFill>
                   <a:schemeClr val="tx1">
                     <a:lumMod val="65000"/>
@@ -10362,7 +11914,7 @@
               <a:defRPr/>
             </a:pPr>
             <a:r>
-              <a:rPr lang="en-US" sz="1400" b="1" dirty="0">
+              <a:rPr lang="en-US" sz="1400" dirty="0">
                 <a:solidFill>
                   <a:schemeClr val="tx1">
                     <a:lumMod val="65000"/>
@@ -10392,7 +11944,7 @@
         <p:spPr>
           <a:xfrm>
             <a:off x="3655900" y="4505894"/>
-            <a:ext cx="2480274" cy="1345048"/>
+            <a:ext cx="2480274" cy="1021883"/>
           </a:xfrm>
           <a:prstGeom prst="rect">
             <a:avLst/>
@@ -10412,7 +11964,7 @@
               <a:defRPr/>
             </a:pPr>
             <a:r>
-              <a:rPr lang="en-US" sz="1400" b="1" dirty="0">
+              <a:rPr lang="en-US" sz="1400" dirty="0">
                 <a:solidFill>
                   <a:schemeClr val="tx1">
                     <a:lumMod val="65000"/>
@@ -10433,7 +11985,7 @@
               <a:defRPr/>
             </a:pPr>
             <a:r>
-              <a:rPr lang="en-US" sz="1400" b="1" dirty="0">
+              <a:rPr lang="en-US" sz="1400" dirty="0">
                 <a:solidFill>
                   <a:schemeClr val="tx1">
                     <a:lumMod val="65000"/>
@@ -10454,7 +12006,7 @@
               <a:defRPr/>
             </a:pPr>
             <a:r>
-              <a:rPr lang="en-US" sz="1400" b="1" dirty="0">
+              <a:rPr lang="en-US" sz="1400" dirty="0">
                 <a:solidFill>
                   <a:schemeClr val="tx1">
                     <a:lumMod val="65000"/>
@@ -10504,7 +12056,7 @@
               <a:defRPr/>
             </a:pPr>
             <a:r>
-              <a:rPr lang="en-US" sz="1400" b="1" dirty="0">
+              <a:rPr lang="en-US" sz="1400" dirty="0">
                 <a:solidFill>
                   <a:schemeClr val="tx1">
                     <a:lumMod val="65000"/>
@@ -10525,7 +12077,7 @@
               <a:defRPr/>
             </a:pPr>
             <a:r>
-              <a:rPr lang="en-US" sz="1400" b="1" dirty="0">
+              <a:rPr lang="en-US" sz="1400" dirty="0">
                 <a:solidFill>
                   <a:schemeClr val="tx1">
                     <a:lumMod val="65000"/>
@@ -10546,7 +12098,7 @@
               <a:defRPr/>
             </a:pPr>
             <a:r>
-              <a:rPr lang="en-US" sz="1400" b="1" dirty="0">
+              <a:rPr lang="en-US" sz="1400" dirty="0">
                 <a:solidFill>
                   <a:schemeClr val="tx1">
                     <a:lumMod val="65000"/>
@@ -10596,7 +12148,7 @@
               <a:defRPr/>
             </a:pPr>
             <a:r>
-              <a:rPr lang="en-US" sz="1400" b="1" dirty="0">
+              <a:rPr lang="en-US" sz="1400" dirty="0">
                 <a:solidFill>
                   <a:schemeClr val="tx1">
                     <a:lumMod val="65000"/>
@@ -10617,7 +12169,7 @@
               <a:defRPr/>
             </a:pPr>
             <a:r>
-              <a:rPr lang="en-US" sz="1400" b="1" dirty="0">
+              <a:rPr lang="en-US" sz="1400" dirty="0">
                 <a:solidFill>
                   <a:schemeClr val="tx1">
                     <a:lumMod val="65000"/>
@@ -10638,7 +12190,7 @@
               <a:defRPr/>
             </a:pPr>
             <a:r>
-              <a:rPr lang="en-US" sz="1400" b="1" dirty="0">
+              <a:rPr lang="en-US" sz="1400" dirty="0">
                 <a:solidFill>
                   <a:schemeClr val="tx1">
                     <a:lumMod val="65000"/>
@@ -12304,7 +13856,7 @@
 </p:sld>
 </file>
 
-<file path=ppt/slides/slide6.xml><?xml version="1.0" encoding="utf-8"?>
+<file path=ppt/slides/slide7.xml><?xml version="1.0" encoding="utf-8"?>
 <p:sld xmlns:a="http://schemas.openxmlformats.org/drawingml/2006/main" xmlns:r="http://schemas.openxmlformats.org/officeDocument/2006/relationships" xmlns:p="http://schemas.openxmlformats.org/presentationml/2006/main">
   <p:cSld>
     <p:spTree>
@@ -12512,7 +14064,7 @@
         </p:nvSpPr>
         <p:spPr>
           <a:xfrm>
-            <a:off x="4048205" y="1462373"/>
+            <a:off x="4198255" y="1513173"/>
             <a:ext cx="3915359" cy="3915359"/>
           </a:xfrm>
           <a:prstGeom prst="ellipse">
@@ -12573,7 +14125,7 @@
         </p:nvGrpSpPr>
         <p:grpSpPr>
           <a:xfrm>
-            <a:off x="3547985" y="2857549"/>
+            <a:off x="3698035" y="2908349"/>
             <a:ext cx="1124065" cy="1125007"/>
             <a:chOff x="2779491" y="2517212"/>
             <a:chExt cx="648499" cy="649042"/>
@@ -12716,7 +14268,7 @@
         </p:nvGrpSpPr>
         <p:grpSpPr>
           <a:xfrm>
-            <a:off x="4267344" y="4471524"/>
+            <a:off x="4417394" y="4522324"/>
             <a:ext cx="1124065" cy="1125007"/>
             <a:chOff x="3287425" y="3613920"/>
             <a:chExt cx="648499" cy="649042"/>
@@ -12859,7 +14411,7 @@
         </p:nvGrpSpPr>
         <p:grpSpPr>
           <a:xfrm>
-            <a:off x="6697168" y="1448826"/>
+            <a:off x="6847218" y="1499626"/>
             <a:ext cx="1124065" cy="1125007"/>
             <a:chOff x="5249342" y="1406453"/>
             <a:chExt cx="648499" cy="649042"/>
@@ -13002,7 +14554,7 @@
         </p:nvGrpSpPr>
         <p:grpSpPr>
           <a:xfrm>
-            <a:off x="7311643" y="2857549"/>
+            <a:off x="7461693" y="2908349"/>
             <a:ext cx="1124065" cy="1125007"/>
             <a:chOff x="5716010" y="2517212"/>
             <a:chExt cx="648499" cy="649042"/>
@@ -13145,7 +14697,7 @@
         </p:nvGrpSpPr>
         <p:grpSpPr>
           <a:xfrm>
-            <a:off x="6697168" y="4471524"/>
+            <a:off x="6847218" y="4522324"/>
             <a:ext cx="1124065" cy="1125007"/>
             <a:chOff x="5244691" y="3613920"/>
             <a:chExt cx="648499" cy="649042"/>
@@ -13290,7 +14842,7 @@
         </p:nvGrpSpPr>
         <p:grpSpPr>
           <a:xfrm>
-            <a:off x="4190535" y="1464066"/>
+            <a:off x="4340585" y="1514866"/>
             <a:ext cx="1124065" cy="1125007"/>
             <a:chOff x="3287425" y="1417883"/>
             <a:chExt cx="648499" cy="649042"/>
@@ -13434,7 +14986,7 @@
         </p:nvGrpSpPr>
         <p:grpSpPr>
           <a:xfrm>
-            <a:off x="7963564" y="4599674"/>
+            <a:off x="8113614" y="4650474"/>
             <a:ext cx="3034927" cy="740645"/>
             <a:chOff x="7154104" y="3206176"/>
             <a:chExt cx="2276195" cy="555483"/>
@@ -13561,7 +15113,7 @@
         </p:nvGrpSpPr>
         <p:grpSpPr>
           <a:xfrm>
-            <a:off x="7963564" y="1366840"/>
+            <a:off x="8113614" y="1417640"/>
             <a:ext cx="3034927" cy="740645"/>
             <a:chOff x="7174424" y="1352592"/>
             <a:chExt cx="2276195" cy="555483"/>
@@ -13669,7 +15221,7 @@
         </p:nvGrpSpPr>
         <p:grpSpPr>
           <a:xfrm>
-            <a:off x="1023628" y="1425556"/>
+            <a:off x="1173678" y="1476356"/>
             <a:ext cx="3034928" cy="752294"/>
             <a:chOff x="-296509" y="1363501"/>
             <a:chExt cx="2276196" cy="336830"/>
@@ -13778,7 +15330,7 @@
         </p:nvGrpSpPr>
         <p:grpSpPr>
           <a:xfrm>
-            <a:off x="884474" y="4599671"/>
+            <a:off x="1034524" y="4650471"/>
             <a:ext cx="3174083" cy="740645"/>
             <a:chOff x="-296510" y="1363501"/>
             <a:chExt cx="2276197" cy="555483"/>
@@ -13887,7 +15439,7 @@
         </p:nvGrpSpPr>
         <p:grpSpPr>
           <a:xfrm>
-            <a:off x="8463784" y="2678421"/>
+            <a:off x="8613834" y="2729221"/>
             <a:ext cx="3578166" cy="1222300"/>
             <a:chOff x="7174424" y="1352592"/>
             <a:chExt cx="2276195" cy="563816"/>
@@ -14012,101 +15564,6 @@
           </p:txBody>
         </p:sp>
       </p:grpSp>
-      <p:pic>
-        <p:nvPicPr>
-          <p:cNvPr id="45" name="Picture 44">
-            <a:extLst>
-              <a:ext uri="{FF2B5EF4-FFF2-40B4-BE49-F238E27FC236}">
-                <a16:creationId xmlns:a16="http://schemas.microsoft.com/office/drawing/2014/main" id="{F4AFCE63-0B56-44DA-B011-C17E0EE8F13B}"/>
-              </a:ext>
-            </a:extLst>
-          </p:cNvPr>
-          <p:cNvPicPr>
-            <a:picLocks noChangeAspect="1"/>
-          </p:cNvPicPr>
-          <p:nvPr/>
-        </p:nvPicPr>
-        <p:blipFill>
-          <a:blip r:embed="rId2">
-            <a:extLst>
-              <a:ext uri="{28A0092B-C50C-407E-A947-70E740481C1C}">
-                <a14:useLocalDpi xmlns:a14="http://schemas.microsoft.com/office/drawing/2010/main" val="0"/>
-              </a:ext>
-            </a:extLst>
-          </a:blip>
-          <a:stretch>
-            <a:fillRect/>
-          </a:stretch>
-        </p:blipFill>
-        <p:spPr>
-          <a:xfrm>
-            <a:off x="5370242" y="2631104"/>
-            <a:ext cx="1273437" cy="1273437"/>
-          </a:xfrm>
-          <a:prstGeom prst="rect">
-            <a:avLst/>
-          </a:prstGeom>
-        </p:spPr>
-      </p:pic>
-      <p:sp>
-        <p:nvSpPr>
-          <p:cNvPr id="46" name="Rectangle 45">
-            <a:extLst>
-              <a:ext uri="{FF2B5EF4-FFF2-40B4-BE49-F238E27FC236}">
-                <a16:creationId xmlns:a16="http://schemas.microsoft.com/office/drawing/2014/main" id="{96914446-5C4B-41F4-AE74-C3D8311B5A74}"/>
-              </a:ext>
-            </a:extLst>
-          </p:cNvPr>
-          <p:cNvSpPr/>
-          <p:nvPr/>
-        </p:nvSpPr>
-        <p:spPr>
-          <a:xfrm>
-            <a:off x="5283978" y="2500645"/>
-            <a:ext cx="1448090" cy="1486456"/>
-          </a:xfrm>
-          <a:prstGeom prst="rect">
-            <a:avLst/>
-          </a:prstGeom>
-          <a:solidFill>
-            <a:schemeClr val="bg1">
-              <a:alpha val="66000"/>
-            </a:schemeClr>
-          </a:solidFill>
-          <a:ln>
-            <a:solidFill>
-              <a:schemeClr val="bg1"/>
-            </a:solidFill>
-          </a:ln>
-        </p:spPr>
-        <p:style>
-          <a:lnRef idx="2">
-            <a:schemeClr val="accent1">
-              <a:shade val="50000"/>
-            </a:schemeClr>
-          </a:lnRef>
-          <a:fillRef idx="1">
-            <a:schemeClr val="accent1"/>
-          </a:fillRef>
-          <a:effectRef idx="0">
-            <a:schemeClr val="accent1"/>
-          </a:effectRef>
-          <a:fontRef idx="minor">
-            <a:schemeClr val="lt1"/>
-          </a:fontRef>
-        </p:style>
-        <p:txBody>
-          <a:bodyPr rtlCol="0" anchor="ctr"/>
-          <a:lstStyle/>
-          <a:p>
-            <a:pPr algn="ctr"/>
-            <a:endParaRPr lang="en-US" dirty="0">
-              <a:latin typeface="Arial" panose="020B0604020202020204" pitchFamily="34" charset="0"/>
-              <a:cs typeface="Arial" panose="020B0604020202020204" pitchFamily="34" charset="0"/>
-            </a:endParaRPr>
-          </a:p>
-        </p:txBody>
-      </p:sp>
       <p:grpSp>
         <p:nvGrpSpPr>
           <p:cNvPr id="53" name="Group 57">
@@ -14121,7 +15578,7 @@
         </p:nvGrpSpPr>
         <p:grpSpPr>
           <a:xfrm>
-            <a:off x="396852" y="2672473"/>
+            <a:off x="546902" y="2723273"/>
             <a:ext cx="2996119" cy="1214692"/>
             <a:chOff x="-267404" y="3168889"/>
             <a:chExt cx="2247089" cy="502235"/>
@@ -14288,7 +15745,7 @@
           <p:nvPr/>
         </p:nvPicPr>
         <p:blipFill rotWithShape="1">
-          <a:blip r:embed="rId3">
+          <a:blip r:embed="rId2">
             <a:extLst>
               <a:ext uri="{28A0092B-C50C-407E-A947-70E740481C1C}">
                 <a14:useLocalDpi xmlns:a14="http://schemas.microsoft.com/office/drawing/2010/main" val="0"/>
@@ -14300,7 +15757,7 @@
         </p:blipFill>
         <p:spPr bwMode="auto">
           <a:xfrm>
-            <a:off x="520896" y="5567978"/>
+            <a:off x="670946" y="5618778"/>
             <a:ext cx="1421884" cy="220520"/>
           </a:xfrm>
           <a:prstGeom prst="rect">
@@ -14333,7 +15790,7 @@
           <p:nvPr/>
         </p:nvPicPr>
         <p:blipFill rotWithShape="1">
-          <a:blip r:embed="rId4">
+          <a:blip r:embed="rId3">
             <a:extLst>
               <a:ext uri="{28A0092B-C50C-407E-A947-70E740481C1C}">
                 <a14:useLocalDpi xmlns:a14="http://schemas.microsoft.com/office/drawing/2010/main" val="0"/>
@@ -14345,7 +15802,7 @@
         </p:blipFill>
         <p:spPr bwMode="auto">
           <a:xfrm>
-            <a:off x="2030151" y="5504109"/>
+            <a:off x="2180201" y="5554909"/>
             <a:ext cx="1068852" cy="329213"/>
           </a:xfrm>
           <a:prstGeom prst="rect">
@@ -14378,7 +15835,7 @@
           <p:nvPr/>
         </p:nvPicPr>
         <p:blipFill>
-          <a:blip r:embed="rId5">
+          <a:blip r:embed="rId4">
             <a:extLst>
               <a:ext uri="{28A0092B-C50C-407E-A947-70E740481C1C}">
                 <a14:useLocalDpi xmlns:a14="http://schemas.microsoft.com/office/drawing/2010/main" val="0"/>
@@ -14392,7 +15849,7 @@
         </p:blipFill>
         <p:spPr bwMode="auto">
           <a:xfrm>
-            <a:off x="3275469" y="5472784"/>
+            <a:off x="3425519" y="5523584"/>
             <a:ext cx="915066" cy="398316"/>
           </a:xfrm>
           <a:prstGeom prst="rect">
@@ -14424,7 +15881,7 @@
         </p:nvSpPr>
         <p:spPr>
           <a:xfrm flipV="1">
-            <a:off x="441670" y="5917649"/>
+            <a:off x="591720" y="5968449"/>
             <a:ext cx="3793974" cy="438011"/>
           </a:xfrm>
           <a:prstGeom prst="rect">
@@ -14483,7 +15940,7 @@
         </p:nvGrpSpPr>
         <p:grpSpPr>
           <a:xfrm>
-            <a:off x="8813798" y="4028209"/>
+            <a:off x="8963848" y="4079009"/>
             <a:ext cx="1782765" cy="351080"/>
             <a:chOff x="8490945" y="4148023"/>
             <a:chExt cx="2225481" cy="478567"/>
@@ -14504,7 +15961,7 @@
             <p:nvPr/>
           </p:nvPicPr>
           <p:blipFill rotWithShape="1">
-            <a:blip r:embed="rId6">
+            <a:blip r:embed="rId5">
               <a:extLst>
                 <a:ext uri="{28A0092B-C50C-407E-A947-70E740481C1C}">
                   <a14:useLocalDpi xmlns:a14="http://schemas.microsoft.com/office/drawing/2010/main" val="0"/>
@@ -14549,7 +16006,7 @@
             <p:nvPr/>
           </p:nvPicPr>
           <p:blipFill rotWithShape="1">
-            <a:blip r:embed="rId7">
+            <a:blip r:embed="rId6">
               <a:extLst>
                 <a:ext uri="{28A0092B-C50C-407E-A947-70E740481C1C}">
                   <a14:useLocalDpi xmlns:a14="http://schemas.microsoft.com/office/drawing/2010/main" val="0"/>
@@ -14594,7 +16051,7 @@
             <p:nvPr/>
           </p:nvPicPr>
           <p:blipFill rotWithShape="1">
-            <a:blip r:embed="rId8">
+            <a:blip r:embed="rId7">
               <a:extLst>
                 <a:ext uri="{28A0092B-C50C-407E-A947-70E740481C1C}">
                   <a14:useLocalDpi xmlns:a14="http://schemas.microsoft.com/office/drawing/2010/main" val="0"/>
@@ -14640,7 +16097,7 @@
           <p:nvPr/>
         </p:nvPicPr>
         <p:blipFill rotWithShape="1">
-          <a:blip r:embed="rId9">
+          <a:blip r:embed="rId8">
             <a:extLst>
               <a:ext uri="{28A0092B-C50C-407E-A947-70E740481C1C}">
                 <a14:useLocalDpi xmlns:a14="http://schemas.microsoft.com/office/drawing/2010/main" val="0"/>
@@ -14652,7 +16109,7 @@
         </p:blipFill>
         <p:spPr bwMode="auto">
           <a:xfrm>
-            <a:off x="7980185" y="5478546"/>
+            <a:off x="8130235" y="5529346"/>
             <a:ext cx="1124065" cy="320484"/>
           </a:xfrm>
           <a:prstGeom prst="rect">
@@ -14685,7 +16142,7 @@
           <p:nvPr/>
         </p:nvPicPr>
         <p:blipFill>
-          <a:blip r:embed="rId10">
+          <a:blip r:embed="rId9">
             <a:extLst>
               <a:ext uri="{28A0092B-C50C-407E-A947-70E740481C1C}">
                 <a14:useLocalDpi xmlns:a14="http://schemas.microsoft.com/office/drawing/2010/main" val="0"/>
@@ -14699,7 +16156,7 @@
         </p:blipFill>
         <p:spPr bwMode="auto">
           <a:xfrm>
-            <a:off x="9285718" y="5394454"/>
+            <a:off x="9435768" y="5445254"/>
             <a:ext cx="690288" cy="358626"/>
           </a:xfrm>
           <a:prstGeom prst="rect">
@@ -14732,7 +16189,7 @@
           <p:nvPr/>
         </p:nvPicPr>
         <p:blipFill>
-          <a:blip r:embed="rId11">
+          <a:blip r:embed="rId10">
             <a:extLst>
               <a:ext uri="{28A0092B-C50C-407E-A947-70E740481C1C}">
                 <a14:useLocalDpi xmlns:a14="http://schemas.microsoft.com/office/drawing/2010/main" val="0"/>
@@ -14746,7 +16203,7 @@
         </p:blipFill>
         <p:spPr bwMode="auto">
           <a:xfrm>
-            <a:off x="10066284" y="5441170"/>
+            <a:off x="10216334" y="5491970"/>
             <a:ext cx="457755" cy="354773"/>
           </a:xfrm>
           <a:prstGeom prst="rect">
@@ -14778,7 +16235,7 @@
         </p:nvSpPr>
         <p:spPr>
           <a:xfrm flipV="1">
-            <a:off x="7522763" y="5908791"/>
+            <a:off x="7672813" y="5959591"/>
             <a:ext cx="2891016" cy="438010"/>
           </a:xfrm>
           <a:prstGeom prst="rect">
@@ -14837,7 +16294,7 @@
         </p:nvGrpSpPr>
         <p:grpSpPr>
           <a:xfrm>
-            <a:off x="810780" y="2089076"/>
+            <a:off x="960830" y="2139876"/>
             <a:ext cx="1030987" cy="354949"/>
             <a:chOff x="810780" y="2089076"/>
             <a:chExt cx="1268984" cy="438011"/>
@@ -14858,7 +16315,7 @@
             <p:nvPr/>
           </p:nvPicPr>
           <p:blipFill rotWithShape="1">
-            <a:blip r:embed="rId12">
+            <a:blip r:embed="rId11">
               <a:extLst>
                 <a:ext uri="{28A0092B-C50C-407E-A947-70E740481C1C}">
                   <a14:useLocalDpi xmlns:a14="http://schemas.microsoft.com/office/drawing/2010/main" val="0"/>
@@ -14903,7 +16360,7 @@
             <p:nvPr/>
           </p:nvPicPr>
           <p:blipFill rotWithShape="1">
-            <a:blip r:embed="rId13">
+            <a:blip r:embed="rId12">
               <a:extLst>
                 <a:ext uri="{28A0092B-C50C-407E-A947-70E740481C1C}">
                   <a14:useLocalDpi xmlns:a14="http://schemas.microsoft.com/office/drawing/2010/main" val="0"/>
@@ -14949,7 +16406,7 @@
           <p:nvPr/>
         </p:nvPicPr>
         <p:blipFill>
-          <a:blip r:embed="rId14">
+          <a:blip r:embed="rId13">
             <a:extLst>
               <a:ext uri="{28A0092B-C50C-407E-A947-70E740481C1C}">
                 <a14:useLocalDpi xmlns:a14="http://schemas.microsoft.com/office/drawing/2010/main" val="0"/>
@@ -14962,7 +16419,7 @@
         </p:blipFill>
         <p:spPr>
           <a:xfrm>
-            <a:off x="3816786" y="3150164"/>
+            <a:off x="3966836" y="3200964"/>
             <a:ext cx="557671" cy="557671"/>
           </a:xfrm>
           <a:prstGeom prst="rect">
@@ -14985,7 +16442,7 @@
           <p:nvPr/>
         </p:nvPicPr>
         <p:blipFill>
-          <a:blip r:embed="rId15">
+          <a:blip r:embed="rId14">
             <a:extLst>
               <a:ext uri="{28A0092B-C50C-407E-A947-70E740481C1C}">
                 <a14:useLocalDpi xmlns:a14="http://schemas.microsoft.com/office/drawing/2010/main" val="0"/>
@@ -14998,7 +16455,7 @@
         </p:blipFill>
         <p:spPr>
           <a:xfrm>
-            <a:off x="7597125" y="3111661"/>
+            <a:off x="7747175" y="3162461"/>
             <a:ext cx="611979" cy="611979"/>
           </a:xfrm>
           <a:prstGeom prst="rect">
@@ -15021,7 +16478,7 @@
           <p:nvPr/>
         </p:nvPicPr>
         <p:blipFill>
-          <a:blip r:embed="rId16">
+          <a:blip r:embed="rId15">
             <a:extLst>
               <a:ext uri="{28A0092B-C50C-407E-A947-70E740481C1C}">
                 <a14:useLocalDpi xmlns:a14="http://schemas.microsoft.com/office/drawing/2010/main" val="0"/>
@@ -15034,7 +16491,7 @@
         </p:blipFill>
         <p:spPr>
           <a:xfrm>
-            <a:off x="4477590" y="4715676"/>
+            <a:off x="4627640" y="4766476"/>
             <a:ext cx="647076" cy="647076"/>
           </a:xfrm>
           <a:prstGeom prst="rect">
@@ -15057,7 +16514,7 @@
           <p:nvPr/>
         </p:nvPicPr>
         <p:blipFill>
-          <a:blip r:embed="rId17">
+          <a:blip r:embed="rId16">
             <a:extLst>
               <a:ext uri="{28A0092B-C50C-407E-A947-70E740481C1C}">
                 <a14:useLocalDpi xmlns:a14="http://schemas.microsoft.com/office/drawing/2010/main" val="0"/>
@@ -15070,7 +16527,7 @@
         </p:blipFill>
         <p:spPr>
           <a:xfrm>
-            <a:off x="4490730" y="1765495"/>
+            <a:off x="4640780" y="1816295"/>
             <a:ext cx="516130" cy="516130"/>
           </a:xfrm>
           <a:prstGeom prst="rect">
@@ -15093,7 +16550,7 @@
           <p:nvPr/>
         </p:nvPicPr>
         <p:blipFill>
-          <a:blip r:embed="rId18">
+          <a:blip r:embed="rId17">
             <a:extLst>
               <a:ext uri="{28A0092B-C50C-407E-A947-70E740481C1C}">
                 <a14:useLocalDpi xmlns:a14="http://schemas.microsoft.com/office/drawing/2010/main" val="0"/>
@@ -15106,7 +16563,7 @@
         </p:blipFill>
         <p:spPr>
           <a:xfrm>
-            <a:off x="6966858" y="1696941"/>
+            <a:off x="7116908" y="1747741"/>
             <a:ext cx="584684" cy="584684"/>
           </a:xfrm>
           <a:prstGeom prst="rect">
@@ -15129,7 +16586,7 @@
           <p:nvPr/>
         </p:nvPicPr>
         <p:blipFill>
-          <a:blip r:embed="rId19">
+          <a:blip r:embed="rId18">
             <a:extLst>
               <a:ext uri="{28A0092B-C50C-407E-A947-70E740481C1C}">
                 <a14:useLocalDpi xmlns:a14="http://schemas.microsoft.com/office/drawing/2010/main" val="0"/>
@@ -15142,7 +16599,7 @@
         </p:blipFill>
         <p:spPr>
           <a:xfrm>
-            <a:off x="6956149" y="4732620"/>
+            <a:off x="7106199" y="4783420"/>
             <a:ext cx="566614" cy="566614"/>
           </a:xfrm>
           <a:prstGeom prst="rect">
@@ -15150,6 +16607,101 @@
           </a:prstGeom>
         </p:spPr>
       </p:pic>
+      <p:pic>
+        <p:nvPicPr>
+          <p:cNvPr id="70" name="Picture 69">
+            <a:extLst>
+              <a:ext uri="{FF2B5EF4-FFF2-40B4-BE49-F238E27FC236}">
+                <a16:creationId xmlns:a16="http://schemas.microsoft.com/office/drawing/2014/main" id="{A51EF500-71C0-4DBD-A4C0-A39F9B4C5161}"/>
+              </a:ext>
+            </a:extLst>
+          </p:cNvPr>
+          <p:cNvPicPr>
+            <a:picLocks noChangeAspect="1"/>
+          </p:cNvPicPr>
+          <p:nvPr/>
+        </p:nvPicPr>
+        <p:blipFill>
+          <a:blip r:embed="rId19">
+            <a:extLst>
+              <a:ext uri="{28A0092B-C50C-407E-A947-70E740481C1C}">
+                <a14:useLocalDpi xmlns:a14="http://schemas.microsoft.com/office/drawing/2010/main" val="0"/>
+              </a:ext>
+            </a:extLst>
+          </a:blip>
+          <a:stretch>
+            <a:fillRect/>
+          </a:stretch>
+        </p:blipFill>
+        <p:spPr>
+          <a:xfrm>
+            <a:off x="5509403" y="2727898"/>
+            <a:ext cx="1273437" cy="1273437"/>
+          </a:xfrm>
+          <a:prstGeom prst="rect">
+            <a:avLst/>
+          </a:prstGeom>
+        </p:spPr>
+      </p:pic>
+      <p:sp>
+        <p:nvSpPr>
+          <p:cNvPr id="71" name="Rectangle 70">
+            <a:extLst>
+              <a:ext uri="{FF2B5EF4-FFF2-40B4-BE49-F238E27FC236}">
+                <a16:creationId xmlns:a16="http://schemas.microsoft.com/office/drawing/2014/main" id="{A9A158D6-9B49-4AA8-B3FF-E760ED1935DF}"/>
+              </a:ext>
+            </a:extLst>
+          </p:cNvPr>
+          <p:cNvSpPr/>
+          <p:nvPr/>
+        </p:nvSpPr>
+        <p:spPr>
+          <a:xfrm>
+            <a:off x="5466414" y="2676690"/>
+            <a:ext cx="1448090" cy="1486456"/>
+          </a:xfrm>
+          <a:prstGeom prst="rect">
+            <a:avLst/>
+          </a:prstGeom>
+          <a:solidFill>
+            <a:schemeClr val="bg1">
+              <a:alpha val="66000"/>
+            </a:schemeClr>
+          </a:solidFill>
+          <a:ln>
+            <a:solidFill>
+              <a:schemeClr val="bg1"/>
+            </a:solidFill>
+          </a:ln>
+        </p:spPr>
+        <p:style>
+          <a:lnRef idx="2">
+            <a:schemeClr val="accent1">
+              <a:shade val="50000"/>
+            </a:schemeClr>
+          </a:lnRef>
+          <a:fillRef idx="1">
+            <a:schemeClr val="accent1"/>
+          </a:fillRef>
+          <a:effectRef idx="0">
+            <a:schemeClr val="accent1"/>
+          </a:effectRef>
+          <a:fontRef idx="minor">
+            <a:schemeClr val="lt1"/>
+          </a:fontRef>
+        </p:style>
+        <p:txBody>
+          <a:bodyPr rtlCol="0" anchor="ctr"/>
+          <a:lstStyle/>
+          <a:p>
+            <a:pPr algn="ctr"/>
+            <a:endParaRPr lang="en-US" dirty="0">
+              <a:latin typeface="Segoe UI" panose="020B0502040204020203" pitchFamily="34" charset="0"/>
+              <a:cs typeface="Segoe UI" panose="020B0502040204020203" pitchFamily="34" charset="0"/>
+            </a:endParaRPr>
+          </a:p>
+        </p:txBody>
+      </p:sp>
     </p:spTree>
     <p:extLst>
       <p:ext uri="{BB962C8B-B14F-4D97-AF65-F5344CB8AC3E}">
@@ -16075,7 +17627,7 @@
 </p:sld>
 </file>
 
-<file path=ppt/slides/slide7.xml><?xml version="1.0" encoding="utf-8"?>
+<file path=ppt/slides/slide8.xml><?xml version="1.0" encoding="utf-8"?>
 <p:sld xmlns:a="http://schemas.openxmlformats.org/drawingml/2006/main" xmlns:r="http://schemas.openxmlformats.org/officeDocument/2006/relationships" xmlns:p="http://schemas.openxmlformats.org/presentationml/2006/main">
   <p:cSld>
     <p:spTree>
@@ -18724,7 +20276,7 @@
 </p:sld>
 </file>
 
-<file path=ppt/slides/slide8.xml><?xml version="1.0" encoding="utf-8"?>
+<file path=ppt/slides/slide9.xml><?xml version="1.0" encoding="utf-8"?>
 <p:sld xmlns:a="http://schemas.openxmlformats.org/drawingml/2006/main" xmlns:r="http://schemas.openxmlformats.org/officeDocument/2006/relationships" xmlns:p="http://schemas.openxmlformats.org/presentationml/2006/main">
   <p:cSld>
     <p:spTree>
@@ -18958,25 +20510,11 @@
                 <a:ea typeface="+mn-ea"/>
                 <a:cs typeface="+mn-cs"/>
               </a:rPr>
-              <a:t>Data Science in </a:t>
+              <a:t>Application of Data Science in </a:t>
             </a:r>
           </a:p>
           <a:p>
-            <a:pPr marL="0" marR="0" lvl="0" indent="0" defTabSz="914400" rtl="0" eaLnBrk="1" fontAlgn="auto" latinLnBrk="0" hangingPunct="1">
-              <a:lnSpc>
-                <a:spcPct val="100000"/>
-              </a:lnSpc>
-              <a:spcBef>
-                <a:spcPts val="0"/>
-              </a:spcBef>
-              <a:spcAft>
-                <a:spcPts val="0"/>
-              </a:spcAft>
-              <a:buClrTx/>
-              <a:buSzTx/>
-              <a:buFontTx/>
-              <a:buNone/>
-              <a:tabLst/>
+            <a:pPr lvl="0">
               <a:defRPr/>
             </a:pPr>
             <a:r>
@@ -18986,7 +20524,7 @@
                 </a:solidFill>
                 <a:latin typeface="Segoe UI"/>
               </a:rPr>
-              <a:t>Healthcare &amp; Pharma</a:t>
+              <a:t>Pharma &amp; Healthcare</a:t>
             </a:r>
             <a:endParaRPr kumimoji="0" lang="en-US" sz="1600" i="0" u="none" strike="noStrike" kern="1200" cap="none" spc="0" normalizeH="0" baseline="0" noProof="0" dirty="0">
               <a:ln>
@@ -19542,603 +21080,6 @@
     <p:extLst>
       <p:ext uri="{BB962C8B-B14F-4D97-AF65-F5344CB8AC3E}">
         <p14:creationId xmlns:p14="http://schemas.microsoft.com/office/powerpoint/2010/main" val="2908492639"/>
-      </p:ext>
-    </p:extLst>
-  </p:cSld>
-  <p:clrMapOvr>
-    <a:masterClrMapping/>
-  </p:clrMapOvr>
-</p:sld>
-</file>
-
-<file path=ppt/slides/slide9.xml><?xml version="1.0" encoding="utf-8"?>
-<p:sld xmlns:a="http://schemas.openxmlformats.org/drawingml/2006/main" xmlns:r="http://schemas.openxmlformats.org/officeDocument/2006/relationships" xmlns:p="http://schemas.openxmlformats.org/presentationml/2006/main">
-  <p:cSld>
-    <p:spTree>
-      <p:nvGrpSpPr>
-        <p:cNvPr id="1" name=""/>
-        <p:cNvGrpSpPr/>
-        <p:nvPr/>
-      </p:nvGrpSpPr>
-      <p:grpSpPr>
-        <a:xfrm>
-          <a:off x="0" y="0"/>
-          <a:ext cx="0" cy="0"/>
-          <a:chOff x="0" y="0"/>
-          <a:chExt cx="0" cy="0"/>
-        </a:xfrm>
-      </p:grpSpPr>
-      <p:pic>
-        <p:nvPicPr>
-          <p:cNvPr id="4098" name="Picture 2" descr="blue white and yellow balloons">
-            <a:extLst>
-              <a:ext uri="{FF2B5EF4-FFF2-40B4-BE49-F238E27FC236}">
-                <a16:creationId xmlns:a16="http://schemas.microsoft.com/office/drawing/2014/main" id="{A3B31C90-4269-427A-B64B-7D4C804FDB83}"/>
-              </a:ext>
-            </a:extLst>
-          </p:cNvPr>
-          <p:cNvPicPr>
-            <a:picLocks noChangeAspect="1" noChangeArrowheads="1"/>
-          </p:cNvPicPr>
-          <p:nvPr/>
-        </p:nvPicPr>
-        <p:blipFill>
-          <a:blip r:embed="rId2">
-            <a:extLst>
-              <a:ext uri="{28A0092B-C50C-407E-A947-70E740481C1C}">
-                <a14:useLocalDpi xmlns:a14="http://schemas.microsoft.com/office/drawing/2010/main" val="0"/>
-              </a:ext>
-            </a:extLst>
-          </a:blip>
-          <a:srcRect/>
-          <a:stretch>
-            <a:fillRect/>
-          </a:stretch>
-        </p:blipFill>
-        <p:spPr bwMode="auto">
-          <a:xfrm>
-            <a:off x="-1" y="-3175"/>
-            <a:ext cx="10286619" cy="6861175"/>
-          </a:xfrm>
-          <a:prstGeom prst="rect">
-            <a:avLst/>
-          </a:prstGeom>
-          <a:noFill/>
-          <a:extLst>
-            <a:ext uri="{909E8E84-426E-40DD-AFC4-6F175D3DCCD1}">
-              <a14:hiddenFill xmlns:a14="http://schemas.microsoft.com/office/drawing/2010/main">
-                <a:solidFill>
-                  <a:srgbClr val="FFFFFF"/>
-                </a:solidFill>
-              </a14:hiddenFill>
-            </a:ext>
-          </a:extLst>
-        </p:spPr>
-      </p:pic>
-      <p:pic>
-        <p:nvPicPr>
-          <p:cNvPr id="2" name="Picture 1">
-            <a:extLst>
-              <a:ext uri="{FF2B5EF4-FFF2-40B4-BE49-F238E27FC236}">
-                <a16:creationId xmlns:a16="http://schemas.microsoft.com/office/drawing/2014/main" id="{7A146ED7-7A7C-4183-B744-408085A0D311}"/>
-              </a:ext>
-            </a:extLst>
-          </p:cNvPr>
-          <p:cNvPicPr>
-            <a:picLocks noChangeAspect="1"/>
-          </p:cNvPicPr>
-          <p:nvPr/>
-        </p:nvPicPr>
-        <p:blipFill>
-          <a:blip r:embed="rId3"/>
-          <a:stretch>
-            <a:fillRect/>
-          </a:stretch>
-        </p:blipFill>
-        <p:spPr>
-          <a:xfrm>
-            <a:off x="10286618" y="808390"/>
-            <a:ext cx="1625172" cy="885949"/>
-          </a:xfrm>
-          <a:prstGeom prst="rect">
-            <a:avLst/>
-          </a:prstGeom>
-        </p:spPr>
-      </p:pic>
-      <p:sp>
-        <p:nvSpPr>
-          <p:cNvPr id="7" name="Rectangle 6">
-            <a:extLst>
-              <a:ext uri="{FF2B5EF4-FFF2-40B4-BE49-F238E27FC236}">
-                <a16:creationId xmlns:a16="http://schemas.microsoft.com/office/drawing/2014/main" id="{B7382D50-F04C-4762-A55A-496A48347DF6}"/>
-              </a:ext>
-            </a:extLst>
-          </p:cNvPr>
-          <p:cNvSpPr/>
-          <p:nvPr/>
-        </p:nvSpPr>
-        <p:spPr>
-          <a:xfrm>
-            <a:off x="-1" y="-3175"/>
-            <a:ext cx="12192000" cy="6857990"/>
-          </a:xfrm>
-          <a:prstGeom prst="rect">
-            <a:avLst/>
-          </a:prstGeom>
-          <a:solidFill>
-            <a:schemeClr val="tx1">
-              <a:alpha val="68000"/>
-            </a:schemeClr>
-          </a:solidFill>
-        </p:spPr>
-        <p:style>
-          <a:lnRef idx="2">
-            <a:schemeClr val="accent1">
-              <a:shade val="50000"/>
-            </a:schemeClr>
-          </a:lnRef>
-          <a:fillRef idx="1">
-            <a:schemeClr val="accent1"/>
-          </a:fillRef>
-          <a:effectRef idx="0">
-            <a:schemeClr val="accent1"/>
-          </a:effectRef>
-          <a:fontRef idx="minor">
-            <a:schemeClr val="lt1"/>
-          </a:fontRef>
-        </p:style>
-        <p:txBody>
-          <a:bodyPr rtlCol="0" anchor="ctr"/>
-          <a:lstStyle/>
-          <a:p>
-            <a:pPr marL="0" marR="0" lvl="0" indent="0" algn="ctr" defTabSz="914400" rtl="0" eaLnBrk="1" fontAlgn="auto" latinLnBrk="0" hangingPunct="1">
-              <a:lnSpc>
-                <a:spcPct val="100000"/>
-              </a:lnSpc>
-              <a:spcBef>
-                <a:spcPts val="0"/>
-              </a:spcBef>
-              <a:spcAft>
-                <a:spcPts val="0"/>
-              </a:spcAft>
-              <a:buClrTx/>
-              <a:buSzTx/>
-              <a:buFontTx/>
-              <a:buNone/>
-              <a:tabLst/>
-              <a:defRPr/>
-            </a:pPr>
-            <a:endParaRPr kumimoji="0" lang="en-US" sz="1800" b="0" i="0" u="none" strike="noStrike" kern="1200" cap="none" spc="0" normalizeH="0" baseline="0" noProof="0" dirty="0">
-              <a:ln>
-                <a:noFill/>
-              </a:ln>
-              <a:solidFill>
-                <a:prstClr val="white"/>
-              </a:solidFill>
-              <a:effectLst/>
-              <a:uLnTx/>
-              <a:uFillTx/>
-              <a:latin typeface="Arial" panose="020B0604020202020204" pitchFamily="34" charset="0"/>
-              <a:cs typeface="Arial" panose="020B0604020202020204" pitchFamily="34" charset="0"/>
-            </a:endParaRPr>
-          </a:p>
-        </p:txBody>
-      </p:sp>
-      <p:sp>
-        <p:nvSpPr>
-          <p:cNvPr id="12" name="TextBox 11">
-            <a:extLst>
-              <a:ext uri="{FF2B5EF4-FFF2-40B4-BE49-F238E27FC236}">
-                <a16:creationId xmlns:a16="http://schemas.microsoft.com/office/drawing/2014/main" id="{1FF38FB6-D98F-4EDC-87DF-742731A3086C}"/>
-              </a:ext>
-            </a:extLst>
-          </p:cNvPr>
-          <p:cNvSpPr txBox="1"/>
-          <p:nvPr/>
-        </p:nvSpPr>
-        <p:spPr>
-          <a:xfrm>
-            <a:off x="173114" y="397598"/>
-            <a:ext cx="7214657" cy="954107"/>
-          </a:xfrm>
-          <a:prstGeom prst="rect">
-            <a:avLst/>
-          </a:prstGeom>
-          <a:noFill/>
-        </p:spPr>
-        <p:txBody>
-          <a:bodyPr wrap="square" rtlCol="0">
-            <a:spAutoFit/>
-          </a:bodyPr>
-          <a:lstStyle/>
-          <a:p>
-            <a:pPr marL="0" marR="0" lvl="0" indent="0" defTabSz="914400" rtl="0" eaLnBrk="1" fontAlgn="auto" latinLnBrk="0" hangingPunct="1">
-              <a:lnSpc>
-                <a:spcPct val="100000"/>
-              </a:lnSpc>
-              <a:spcBef>
-                <a:spcPts val="0"/>
-              </a:spcBef>
-              <a:spcAft>
-                <a:spcPts val="0"/>
-              </a:spcAft>
-              <a:buClrTx/>
-              <a:buSzTx/>
-              <a:buFontTx/>
-              <a:buNone/>
-              <a:tabLst/>
-              <a:defRPr/>
-            </a:pPr>
-            <a:r>
-              <a:rPr kumimoji="0" lang="en-US" sz="2800" i="0" u="none" strike="noStrike" kern="1200" cap="none" spc="0" normalizeH="0" baseline="0" noProof="0" dirty="0">
-                <a:ln>
-                  <a:noFill/>
-                </a:ln>
-                <a:solidFill>
-                  <a:prstClr val="white"/>
-                </a:solidFill>
-                <a:effectLst/>
-                <a:uLnTx/>
-                <a:uFillTx/>
-                <a:latin typeface="Arial" panose="020B0604020202020204" pitchFamily="34" charset="0"/>
-                <a:cs typeface="Arial" panose="020B0604020202020204" pitchFamily="34" charset="0"/>
-              </a:rPr>
-              <a:t>Data Science in </a:t>
-            </a:r>
-          </a:p>
-          <a:p>
-            <a:pPr marL="0" marR="0" lvl="0" indent="0" defTabSz="914400" rtl="0" eaLnBrk="1" fontAlgn="auto" latinLnBrk="0" hangingPunct="1">
-              <a:lnSpc>
-                <a:spcPct val="100000"/>
-              </a:lnSpc>
-              <a:spcBef>
-                <a:spcPts val="0"/>
-              </a:spcBef>
-              <a:spcAft>
-                <a:spcPts val="0"/>
-              </a:spcAft>
-              <a:buClrTx/>
-              <a:buSzTx/>
-              <a:buFontTx/>
-              <a:buNone/>
-              <a:tabLst/>
-              <a:defRPr/>
-            </a:pPr>
-            <a:r>
-              <a:rPr lang="en-US" sz="2800" dirty="0">
-                <a:solidFill>
-                  <a:prstClr val="white"/>
-                </a:solidFill>
-                <a:latin typeface="Arial" panose="020B0604020202020204" pitchFamily="34" charset="0"/>
-                <a:cs typeface="Arial" panose="020B0604020202020204" pitchFamily="34" charset="0"/>
-              </a:rPr>
-              <a:t>Healthcare &amp; Pharma</a:t>
-            </a:r>
-            <a:endParaRPr kumimoji="0" lang="en-US" sz="1600" i="0" u="none" strike="noStrike" kern="1200" cap="none" spc="0" normalizeH="0" baseline="0" noProof="0" dirty="0">
-              <a:ln>
-                <a:noFill/>
-              </a:ln>
-              <a:solidFill>
-                <a:prstClr val="white"/>
-              </a:solidFill>
-              <a:effectLst/>
-              <a:uLnTx/>
-              <a:uFillTx/>
-              <a:latin typeface="Arial" panose="020B0604020202020204" pitchFamily="34" charset="0"/>
-              <a:cs typeface="Arial" panose="020B0604020202020204" pitchFamily="34" charset="0"/>
-            </a:endParaRPr>
-          </a:p>
-        </p:txBody>
-      </p:sp>
-      <p:cxnSp>
-        <p:nvCxnSpPr>
-          <p:cNvPr id="13" name="Straight Connector 12">
-            <a:extLst>
-              <a:ext uri="{FF2B5EF4-FFF2-40B4-BE49-F238E27FC236}">
-                <a16:creationId xmlns:a16="http://schemas.microsoft.com/office/drawing/2014/main" id="{719DE22A-973E-49BC-BA5E-E323C8BE7983}"/>
-              </a:ext>
-            </a:extLst>
-          </p:cNvPr>
-          <p:cNvCxnSpPr>
-            <a:cxnSpLocks/>
-          </p:cNvCxnSpPr>
-          <p:nvPr/>
-        </p:nvCxnSpPr>
-        <p:spPr>
-          <a:xfrm flipH="1">
-            <a:off x="280210" y="1459426"/>
-            <a:ext cx="3812819" cy="0"/>
-          </a:xfrm>
-          <a:prstGeom prst="line">
-            <a:avLst/>
-          </a:prstGeom>
-          <a:ln>
-            <a:solidFill>
-              <a:schemeClr val="bg1"/>
-            </a:solidFill>
-          </a:ln>
-        </p:spPr>
-        <p:style>
-          <a:lnRef idx="1">
-            <a:schemeClr val="accent1"/>
-          </a:lnRef>
-          <a:fillRef idx="0">
-            <a:schemeClr val="accent1"/>
-          </a:fillRef>
-          <a:effectRef idx="0">
-            <a:schemeClr val="accent1"/>
-          </a:effectRef>
-          <a:fontRef idx="minor">
-            <a:schemeClr val="tx1"/>
-          </a:fontRef>
-        </p:style>
-      </p:cxnSp>
-      <p:sp>
-        <p:nvSpPr>
-          <p:cNvPr id="8" name="TextBox 7">
-            <a:extLst>
-              <a:ext uri="{FF2B5EF4-FFF2-40B4-BE49-F238E27FC236}">
-                <a16:creationId xmlns:a16="http://schemas.microsoft.com/office/drawing/2014/main" id="{5297BC12-3D7A-47D0-A42D-DB005B3C4B1A}"/>
-              </a:ext>
-            </a:extLst>
-          </p:cNvPr>
-          <p:cNvSpPr txBox="1"/>
-          <p:nvPr/>
-        </p:nvSpPr>
-        <p:spPr>
-          <a:xfrm>
-            <a:off x="173115" y="1459426"/>
-            <a:ext cx="2853128" cy="369332"/>
-          </a:xfrm>
-          <a:prstGeom prst="rect">
-            <a:avLst/>
-          </a:prstGeom>
-          <a:noFill/>
-        </p:spPr>
-        <p:txBody>
-          <a:bodyPr wrap="square" rtlCol="0">
-            <a:spAutoFit/>
-          </a:bodyPr>
-          <a:lstStyle/>
-          <a:p>
-            <a:pPr lvl="0">
-              <a:defRPr/>
-            </a:pPr>
-            <a:r>
-              <a:rPr kumimoji="0" lang="en-US" u="none" strike="noStrike" kern="1200" cap="none" spc="0" normalizeH="0" baseline="0" noProof="0" dirty="0">
-                <a:ln>
-                  <a:noFill/>
-                </a:ln>
-                <a:solidFill>
-                  <a:schemeClr val="bg1">
-                    <a:lumMod val="95000"/>
-                  </a:schemeClr>
-                </a:solidFill>
-                <a:effectLst/>
-                <a:uLnTx/>
-                <a:uFillTx/>
-                <a:latin typeface="Arial" panose="020B0604020202020204" pitchFamily="34" charset="0"/>
-                <a:cs typeface="Arial" panose="020B0604020202020204" pitchFamily="34" charset="0"/>
-              </a:rPr>
-              <a:t>Anish Mahapatra</a:t>
-            </a:r>
-            <a:endParaRPr kumimoji="0" lang="en-US" sz="1100" u="none" strike="noStrike" kern="1200" cap="none" spc="0" normalizeH="0" baseline="0" noProof="0" dirty="0">
-              <a:ln>
-                <a:noFill/>
-              </a:ln>
-              <a:solidFill>
-                <a:schemeClr val="bg1">
-                  <a:lumMod val="65000"/>
-                </a:schemeClr>
-              </a:solidFill>
-              <a:effectLst/>
-              <a:uLnTx/>
-              <a:uFillTx/>
-              <a:latin typeface="Arial" panose="020B0604020202020204" pitchFamily="34" charset="0"/>
-              <a:cs typeface="Arial" panose="020B0604020202020204" pitchFamily="34" charset="0"/>
-            </a:endParaRPr>
-          </a:p>
-        </p:txBody>
-      </p:sp>
-      <p:sp>
-        <p:nvSpPr>
-          <p:cNvPr id="9" name="TextBox 8">
-            <a:extLst>
-              <a:ext uri="{FF2B5EF4-FFF2-40B4-BE49-F238E27FC236}">
-                <a16:creationId xmlns:a16="http://schemas.microsoft.com/office/drawing/2014/main" id="{68778FF0-D8DC-4E79-A031-36756AC12555}"/>
-              </a:ext>
-            </a:extLst>
-          </p:cNvPr>
-          <p:cNvSpPr txBox="1"/>
-          <p:nvPr/>
-        </p:nvSpPr>
-        <p:spPr>
-          <a:xfrm>
-            <a:off x="69006" y="5580559"/>
-            <a:ext cx="3451440" cy="769441"/>
-          </a:xfrm>
-          <a:prstGeom prst="rect">
-            <a:avLst/>
-          </a:prstGeom>
-          <a:noFill/>
-        </p:spPr>
-        <p:txBody>
-          <a:bodyPr wrap="square" rtlCol="0">
-            <a:spAutoFit/>
-          </a:bodyPr>
-          <a:lstStyle/>
-          <a:p>
-            <a:pPr marL="0" marR="0" lvl="0" indent="0" defTabSz="914400" rtl="0" eaLnBrk="1" fontAlgn="auto" latinLnBrk="0" hangingPunct="1">
-              <a:lnSpc>
-                <a:spcPct val="100000"/>
-              </a:lnSpc>
-              <a:spcBef>
-                <a:spcPts val="0"/>
-              </a:spcBef>
-              <a:spcAft>
-                <a:spcPts val="0"/>
-              </a:spcAft>
-              <a:buClrTx/>
-              <a:buSzTx/>
-              <a:buFontTx/>
-              <a:buNone/>
-              <a:tabLst/>
-              <a:defRPr/>
-            </a:pPr>
-            <a:r>
-              <a:rPr kumimoji="0" lang="en-US" sz="4400" b="1" i="0" u="none" strike="noStrike" kern="1200" cap="none" spc="0" normalizeH="0" baseline="0" noProof="0" dirty="0">
-                <a:ln>
-                  <a:noFill/>
-                </a:ln>
-                <a:solidFill>
-                  <a:schemeClr val="bg1">
-                    <a:lumMod val="75000"/>
-                  </a:schemeClr>
-                </a:solidFill>
-                <a:effectLst/>
-                <a:uLnTx/>
-                <a:uFillTx/>
-                <a:latin typeface="Arial" panose="020B0604020202020204" pitchFamily="34" charset="0"/>
-                <a:cs typeface="Arial" panose="020B0604020202020204" pitchFamily="34" charset="0"/>
-              </a:rPr>
-              <a:t>Thank you. </a:t>
-            </a:r>
-            <a:endParaRPr kumimoji="0" lang="en-US" sz="2800" b="0" i="0" u="none" strike="noStrike" kern="1200" cap="none" spc="0" normalizeH="0" baseline="0" noProof="0" dirty="0">
-              <a:ln>
-                <a:noFill/>
-              </a:ln>
-              <a:solidFill>
-                <a:schemeClr val="bg1">
-                  <a:lumMod val="75000"/>
-                </a:schemeClr>
-              </a:solidFill>
-              <a:effectLst/>
-              <a:uLnTx/>
-              <a:uFillTx/>
-              <a:latin typeface="Arial" panose="020B0604020202020204" pitchFamily="34" charset="0"/>
-              <a:cs typeface="Arial" panose="020B0604020202020204" pitchFamily="34" charset="0"/>
-            </a:endParaRPr>
-          </a:p>
-        </p:txBody>
-      </p:sp>
-      <p:sp>
-        <p:nvSpPr>
-          <p:cNvPr id="3" name="Rectangle 2">
-            <a:extLst>
-              <a:ext uri="{FF2B5EF4-FFF2-40B4-BE49-F238E27FC236}">
-                <a16:creationId xmlns:a16="http://schemas.microsoft.com/office/drawing/2014/main" id="{A31BFD49-2A3D-4FBC-BC91-6CEAE644A49A}"/>
-              </a:ext>
-            </a:extLst>
-          </p:cNvPr>
-          <p:cNvSpPr/>
-          <p:nvPr/>
-        </p:nvSpPr>
-        <p:spPr>
-          <a:xfrm>
-            <a:off x="138376" y="508000"/>
-            <a:ext cx="45719" cy="790575"/>
-          </a:xfrm>
-          <a:prstGeom prst="rect">
-            <a:avLst/>
-          </a:prstGeom>
-          <a:solidFill>
-            <a:srgbClr val="C00000"/>
-          </a:solidFill>
-          <a:ln w="9525">
-            <a:solidFill>
-              <a:srgbClr val="C00000"/>
-            </a:solidFill>
-          </a:ln>
-        </p:spPr>
-        <p:style>
-          <a:lnRef idx="2">
-            <a:schemeClr val="accent1">
-              <a:shade val="50000"/>
-            </a:schemeClr>
-          </a:lnRef>
-          <a:fillRef idx="1">
-            <a:schemeClr val="accent1"/>
-          </a:fillRef>
-          <a:effectRef idx="0">
-            <a:schemeClr val="accent1"/>
-          </a:effectRef>
-          <a:fontRef idx="minor">
-            <a:schemeClr val="lt1"/>
-          </a:fontRef>
-        </p:style>
-        <p:txBody>
-          <a:bodyPr rtlCol="0" anchor="ctr"/>
-          <a:lstStyle/>
-          <a:p>
-            <a:pPr algn="ctr"/>
-            <a:endParaRPr lang="en-US" dirty="0">
-              <a:latin typeface="Arial" panose="020B0604020202020204" pitchFamily="34" charset="0"/>
-              <a:cs typeface="Arial" panose="020B0604020202020204" pitchFamily="34" charset="0"/>
-            </a:endParaRPr>
-          </a:p>
-        </p:txBody>
-      </p:sp>
-      <p:sp>
-        <p:nvSpPr>
-          <p:cNvPr id="10" name="Rectangle 9">
-            <a:extLst>
-              <a:ext uri="{FF2B5EF4-FFF2-40B4-BE49-F238E27FC236}">
-                <a16:creationId xmlns:a16="http://schemas.microsoft.com/office/drawing/2014/main" id="{C13547AB-58A3-4634-A3F9-4E05FDC81666}"/>
-              </a:ext>
-            </a:extLst>
-          </p:cNvPr>
-          <p:cNvSpPr/>
-          <p:nvPr/>
-        </p:nvSpPr>
-        <p:spPr>
-          <a:xfrm>
-            <a:off x="127395" y="1511665"/>
-            <a:ext cx="45719" cy="317093"/>
-          </a:xfrm>
-          <a:prstGeom prst="rect">
-            <a:avLst/>
-          </a:prstGeom>
-          <a:solidFill>
-            <a:srgbClr val="00B050"/>
-          </a:solidFill>
-          <a:ln w="9525">
-            <a:solidFill>
-              <a:srgbClr val="00B050"/>
-            </a:solidFill>
-          </a:ln>
-        </p:spPr>
-        <p:style>
-          <a:lnRef idx="2">
-            <a:schemeClr val="accent1">
-              <a:shade val="50000"/>
-            </a:schemeClr>
-          </a:lnRef>
-          <a:fillRef idx="1">
-            <a:schemeClr val="accent1"/>
-          </a:fillRef>
-          <a:effectRef idx="0">
-            <a:schemeClr val="accent1"/>
-          </a:effectRef>
-          <a:fontRef idx="minor">
-            <a:schemeClr val="lt1"/>
-          </a:fontRef>
-        </p:style>
-        <p:txBody>
-          <a:bodyPr rtlCol="0" anchor="ctr"/>
-          <a:lstStyle/>
-          <a:p>
-            <a:pPr algn="ctr"/>
-            <a:endParaRPr lang="en-US" dirty="0">
-              <a:latin typeface="Arial" panose="020B0604020202020204" pitchFamily="34" charset="0"/>
-              <a:cs typeface="Arial" panose="020B0604020202020204" pitchFamily="34" charset="0"/>
-            </a:endParaRPr>
-          </a:p>
-        </p:txBody>
-      </p:sp>
-    </p:spTree>
-    <p:extLst>
-      <p:ext uri="{BB962C8B-B14F-4D97-AF65-F5344CB8AC3E}">
-        <p14:creationId xmlns:p14="http://schemas.microsoft.com/office/powerpoint/2010/main" val="2988580744"/>
       </p:ext>
     </p:extLst>
   </p:cSld>

</xml_diff>